<commit_message>
added part on Friction calculation and improved fig. 1
</commit_message>
<xml_diff>
--- a/figure1.pptx
+++ b/figure1.pptx
@@ -2,12 +2,12 @@
 <file path=ppt/presentation.xml><?xml version="1.0" encoding="utf-8"?>
 <p:presentation xmlns:a="http://schemas.openxmlformats.org/drawingml/2006/main" xmlns:r="http://schemas.openxmlformats.org/officeDocument/2006/relationships" xmlns:p="http://schemas.openxmlformats.org/presentationml/2006/main" saveSubsetFonts="1">
   <p:sldMasterIdLst>
-    <p:sldMasterId id="2147483648" r:id="rId1"/>
+    <p:sldMasterId id="2147483660" r:id="rId1"/>
   </p:sldMasterIdLst>
   <p:sldIdLst>
     <p:sldId id="256" r:id="rId2"/>
   </p:sldIdLst>
-  <p:sldSz cx="12192000" cy="6858000"/>
+  <p:sldSz cx="12192000" cy="8869363"/>
   <p:notesSz cx="6858000" cy="9144000"/>
   <p:defaultTextStyle>
     <a:defPPr>
@@ -104,6 +104,11 @@
       </a:defRPr>
     </a:lvl9pPr>
   </p:defaultTextStyle>
+  <p:extLst>
+    <p:ext uri="{EFAFB233-063F-42B5-8137-9DF3F51BA10A}">
+      <p15:sldGuideLst xmlns:p15="http://schemas.microsoft.com/office/powerpoint/2012/main"/>
+    </p:ext>
+  </p:extLst>
 </p:presentation>
 </file>
 
@@ -136,15 +141,15 @@
         </p:nvSpPr>
         <p:spPr>
           <a:xfrm>
-            <a:off x="1524000" y="1122363"/>
-            <a:ext cx="9144000" cy="2387600"/>
+            <a:off x="914400" y="1451538"/>
+            <a:ext cx="10363200" cy="3087852"/>
           </a:xfrm>
         </p:spPr>
         <p:txBody>
           <a:bodyPr anchor="b"/>
           <a:lstStyle>
             <a:lvl1pPr algn="ctr">
-              <a:defRPr sz="6000"/>
+              <a:defRPr sz="7760"/>
             </a:lvl1pPr>
           </a:lstStyle>
           <a:p>
@@ -152,7 +157,7 @@
               <a:rPr lang="en-US" smtClean="0"/>
               <a:t>Click to edit Master title style</a:t>
             </a:r>
-            <a:endParaRPr lang="en-US"/>
+            <a:endParaRPr lang="en-US" dirty="0"/>
           </a:p>
         </p:txBody>
       </p:sp>
@@ -168,8 +173,8 @@
         </p:nvSpPr>
         <p:spPr>
           <a:xfrm>
-            <a:off x="1524000" y="3602038"/>
-            <a:ext cx="9144000" cy="1655762"/>
+            <a:off x="1524000" y="4658469"/>
+            <a:ext cx="9144000" cy="2141376"/>
           </a:xfrm>
         </p:spPr>
         <p:txBody>
@@ -177,39 +182,39 @@
           <a:lstStyle>
             <a:lvl1pPr marL="0" indent="0" algn="ctr">
               <a:buNone/>
-              <a:defRPr sz="2400"/>
+              <a:defRPr sz="3104"/>
             </a:lvl1pPr>
-            <a:lvl2pPr marL="457200" indent="0" algn="ctr">
-              <a:buNone/>
-              <a:defRPr sz="2000"/>
+            <a:lvl2pPr marL="591297" indent="0" algn="ctr">
+              <a:buNone/>
+              <a:defRPr sz="2587"/>
             </a:lvl2pPr>
-            <a:lvl3pPr marL="914400" indent="0" algn="ctr">
-              <a:buNone/>
-              <a:defRPr sz="1800"/>
+            <a:lvl3pPr marL="1182594" indent="0" algn="ctr">
+              <a:buNone/>
+              <a:defRPr sz="2328"/>
             </a:lvl3pPr>
-            <a:lvl4pPr marL="1371600" indent="0" algn="ctr">
-              <a:buNone/>
-              <a:defRPr sz="1600"/>
+            <a:lvl4pPr marL="1773890" indent="0" algn="ctr">
+              <a:buNone/>
+              <a:defRPr sz="2069"/>
             </a:lvl4pPr>
-            <a:lvl5pPr marL="1828800" indent="0" algn="ctr">
-              <a:buNone/>
-              <a:defRPr sz="1600"/>
+            <a:lvl5pPr marL="2365187" indent="0" algn="ctr">
+              <a:buNone/>
+              <a:defRPr sz="2069"/>
             </a:lvl5pPr>
-            <a:lvl6pPr marL="2286000" indent="0" algn="ctr">
-              <a:buNone/>
-              <a:defRPr sz="1600"/>
+            <a:lvl6pPr marL="2956484" indent="0" algn="ctr">
+              <a:buNone/>
+              <a:defRPr sz="2069"/>
             </a:lvl6pPr>
-            <a:lvl7pPr marL="2743200" indent="0" algn="ctr">
-              <a:buNone/>
-              <a:defRPr sz="1600"/>
+            <a:lvl7pPr marL="3547781" indent="0" algn="ctr">
+              <a:buNone/>
+              <a:defRPr sz="2069"/>
             </a:lvl7pPr>
-            <a:lvl8pPr marL="3200400" indent="0" algn="ctr">
-              <a:buNone/>
-              <a:defRPr sz="1600"/>
+            <a:lvl8pPr marL="4139077" indent="0" algn="ctr">
+              <a:buNone/>
+              <a:defRPr sz="2069"/>
             </a:lvl8pPr>
-            <a:lvl9pPr marL="3657600" indent="0" algn="ctr">
-              <a:buNone/>
-              <a:defRPr sz="1600"/>
+            <a:lvl9pPr marL="4730374" indent="0" algn="ctr">
+              <a:buNone/>
+              <a:defRPr sz="2069"/>
             </a:lvl9pPr>
           </a:lstStyle>
           <a:p>
@@ -217,7 +222,7 @@
               <a:rPr lang="en-US" smtClean="0"/>
               <a:t>Click to edit Master subtitle style</a:t>
             </a:r>
-            <a:endParaRPr lang="en-US"/>
+            <a:endParaRPr lang="en-US" dirty="0"/>
           </a:p>
         </p:txBody>
       </p:sp>
@@ -238,7 +243,7 @@
           <a:p>
             <a:fld id="{4D01D722-A7B2-4018-AAE4-87180B192DC8}" type="datetimeFigureOut">
               <a:rPr lang="en-US" smtClean="0"/>
-              <a:t>1/13/2017</a:t>
+              <a:t>2/7/2017</a:t>
             </a:fld>
             <a:endParaRPr lang="en-US"/>
           </a:p>
@@ -289,7 +294,7 @@
     </p:spTree>
     <p:extLst>
       <p:ext uri="{BB962C8B-B14F-4D97-AF65-F5344CB8AC3E}">
-        <p14:creationId xmlns:p14="http://schemas.microsoft.com/office/powerpoint/2010/main" val="2498189038"/>
+        <p14:creationId xmlns:p14="http://schemas.microsoft.com/office/powerpoint/2010/main" val="4155430887"/>
       </p:ext>
     </p:extLst>
   </p:cSld>
@@ -335,7 +340,7 @@
               <a:rPr lang="en-US" smtClean="0"/>
               <a:t>Click to edit Master title style</a:t>
             </a:r>
-            <a:endParaRPr lang="en-US"/>
+            <a:endParaRPr lang="en-US" dirty="0"/>
           </a:p>
         </p:txBody>
       </p:sp>
@@ -387,7 +392,7 @@
               <a:rPr lang="en-US" smtClean="0"/>
               <a:t>Fifth level</a:t>
             </a:r>
-            <a:endParaRPr lang="en-US"/>
+            <a:endParaRPr lang="en-US" dirty="0"/>
           </a:p>
         </p:txBody>
       </p:sp>
@@ -408,7 +413,7 @@
           <a:p>
             <a:fld id="{4D01D722-A7B2-4018-AAE4-87180B192DC8}" type="datetimeFigureOut">
               <a:rPr lang="en-US" smtClean="0"/>
-              <a:t>1/13/2017</a:t>
+              <a:t>2/7/2017</a:t>
             </a:fld>
             <a:endParaRPr lang="en-US"/>
           </a:p>
@@ -459,7 +464,7 @@
     </p:spTree>
     <p:extLst>
       <p:ext uri="{BB962C8B-B14F-4D97-AF65-F5344CB8AC3E}">
-        <p14:creationId xmlns:p14="http://schemas.microsoft.com/office/powerpoint/2010/main" val="2213769671"/>
+        <p14:creationId xmlns:p14="http://schemas.microsoft.com/office/powerpoint/2010/main" val="3233007326"/>
       </p:ext>
     </p:extLst>
   </p:cSld>
@@ -498,8 +503,8 @@
         </p:nvSpPr>
         <p:spPr>
           <a:xfrm>
-            <a:off x="8724900" y="365125"/>
-            <a:ext cx="2628900" cy="5811838"/>
+            <a:off x="8724901" y="472212"/>
+            <a:ext cx="2628900" cy="7516375"/>
           </a:xfrm>
         </p:spPr>
         <p:txBody>
@@ -510,7 +515,7 @@
               <a:rPr lang="en-US" smtClean="0"/>
               <a:t>Click to edit Master title style</a:t>
             </a:r>
-            <a:endParaRPr lang="en-US"/>
+            <a:endParaRPr lang="en-US" dirty="0"/>
           </a:p>
         </p:txBody>
       </p:sp>
@@ -526,8 +531,8 @@
         </p:nvSpPr>
         <p:spPr>
           <a:xfrm>
-            <a:off x="838200" y="365125"/>
-            <a:ext cx="7734300" cy="5811838"/>
+            <a:off x="838201" y="472212"/>
+            <a:ext cx="7734300" cy="7516375"/>
           </a:xfrm>
         </p:spPr>
         <p:txBody>
@@ -567,7 +572,7 @@
               <a:rPr lang="en-US" smtClean="0"/>
               <a:t>Fifth level</a:t>
             </a:r>
-            <a:endParaRPr lang="en-US"/>
+            <a:endParaRPr lang="en-US" dirty="0"/>
           </a:p>
         </p:txBody>
       </p:sp>
@@ -588,7 +593,7 @@
           <a:p>
             <a:fld id="{4D01D722-A7B2-4018-AAE4-87180B192DC8}" type="datetimeFigureOut">
               <a:rPr lang="en-US" smtClean="0"/>
-              <a:t>1/13/2017</a:t>
+              <a:t>2/7/2017</a:t>
             </a:fld>
             <a:endParaRPr lang="en-US"/>
           </a:p>
@@ -639,7 +644,7 @@
     </p:spTree>
     <p:extLst>
       <p:ext uri="{BB962C8B-B14F-4D97-AF65-F5344CB8AC3E}">
-        <p14:creationId xmlns:p14="http://schemas.microsoft.com/office/powerpoint/2010/main" val="2938650915"/>
+        <p14:creationId xmlns:p14="http://schemas.microsoft.com/office/powerpoint/2010/main" val="2614760032"/>
       </p:ext>
     </p:extLst>
   </p:cSld>
@@ -685,7 +690,7 @@
               <a:rPr lang="en-US" smtClean="0"/>
               <a:t>Click to edit Master title style</a:t>
             </a:r>
-            <a:endParaRPr lang="en-US"/>
+            <a:endParaRPr lang="en-US" dirty="0"/>
           </a:p>
         </p:txBody>
       </p:sp>
@@ -737,7 +742,7 @@
               <a:rPr lang="en-US" smtClean="0"/>
               <a:t>Fifth level</a:t>
             </a:r>
-            <a:endParaRPr lang="en-US"/>
+            <a:endParaRPr lang="en-US" dirty="0"/>
           </a:p>
         </p:txBody>
       </p:sp>
@@ -758,7 +763,7 @@
           <a:p>
             <a:fld id="{4D01D722-A7B2-4018-AAE4-87180B192DC8}" type="datetimeFigureOut">
               <a:rPr lang="en-US" smtClean="0"/>
-              <a:t>1/13/2017</a:t>
+              <a:t>2/7/2017</a:t>
             </a:fld>
             <a:endParaRPr lang="en-US"/>
           </a:p>
@@ -809,7 +814,7 @@
     </p:spTree>
     <p:extLst>
       <p:ext uri="{BB962C8B-B14F-4D97-AF65-F5344CB8AC3E}">
-        <p14:creationId xmlns:p14="http://schemas.microsoft.com/office/powerpoint/2010/main" val="3037216098"/>
+        <p14:creationId xmlns:p14="http://schemas.microsoft.com/office/powerpoint/2010/main" val="1627083991"/>
       </p:ext>
     </p:extLst>
   </p:cSld>
@@ -848,15 +853,15 @@
         </p:nvSpPr>
         <p:spPr>
           <a:xfrm>
-            <a:off x="831850" y="1709738"/>
-            <a:ext cx="10515600" cy="2852737"/>
+            <a:off x="831851" y="2211184"/>
+            <a:ext cx="10515600" cy="3689408"/>
           </a:xfrm>
         </p:spPr>
         <p:txBody>
           <a:bodyPr anchor="b"/>
           <a:lstStyle>
             <a:lvl1pPr>
-              <a:defRPr sz="6000"/>
+              <a:defRPr sz="7760"/>
             </a:lvl1pPr>
           </a:lstStyle>
           <a:p>
@@ -864,7 +869,7 @@
               <a:rPr lang="en-US" smtClean="0"/>
               <a:t>Click to edit Master title style</a:t>
             </a:r>
-            <a:endParaRPr lang="en-US"/>
+            <a:endParaRPr lang="en-US" dirty="0"/>
           </a:p>
         </p:txBody>
       </p:sp>
@@ -880,8 +885,8 @@
         </p:nvSpPr>
         <p:spPr>
           <a:xfrm>
-            <a:off x="831850" y="4589463"/>
-            <a:ext cx="10515600" cy="1500187"/>
+            <a:off x="831851" y="5935495"/>
+            <a:ext cx="10515600" cy="1940173"/>
           </a:xfrm>
         </p:spPr>
         <p:txBody>
@@ -889,17 +894,15 @@
           <a:lstStyle>
             <a:lvl1pPr marL="0" indent="0">
               <a:buNone/>
-              <a:defRPr sz="2400">
+              <a:defRPr sz="3104">
                 <a:solidFill>
-                  <a:schemeClr val="tx1">
-                    <a:tint val="75000"/>
-                  </a:schemeClr>
+                  <a:schemeClr val="tx1"/>
                 </a:solidFill>
               </a:defRPr>
             </a:lvl1pPr>
-            <a:lvl2pPr marL="457200" indent="0">
-              <a:buNone/>
-              <a:defRPr sz="2000">
+            <a:lvl2pPr marL="591297" indent="0">
+              <a:buNone/>
+              <a:defRPr sz="2587">
                 <a:solidFill>
                   <a:schemeClr val="tx1">
                     <a:tint val="75000"/>
@@ -907,9 +910,9 @@
                 </a:solidFill>
               </a:defRPr>
             </a:lvl2pPr>
-            <a:lvl3pPr marL="914400" indent="0">
-              <a:buNone/>
-              <a:defRPr sz="1800">
+            <a:lvl3pPr marL="1182594" indent="0">
+              <a:buNone/>
+              <a:defRPr sz="2328">
                 <a:solidFill>
                   <a:schemeClr val="tx1">
                     <a:tint val="75000"/>
@@ -917,9 +920,9 @@
                 </a:solidFill>
               </a:defRPr>
             </a:lvl3pPr>
-            <a:lvl4pPr marL="1371600" indent="0">
-              <a:buNone/>
-              <a:defRPr sz="1600">
+            <a:lvl4pPr marL="1773890" indent="0">
+              <a:buNone/>
+              <a:defRPr sz="2069">
                 <a:solidFill>
                   <a:schemeClr val="tx1">
                     <a:tint val="75000"/>
@@ -927,9 +930,9 @@
                 </a:solidFill>
               </a:defRPr>
             </a:lvl4pPr>
-            <a:lvl5pPr marL="1828800" indent="0">
-              <a:buNone/>
-              <a:defRPr sz="1600">
+            <a:lvl5pPr marL="2365187" indent="0">
+              <a:buNone/>
+              <a:defRPr sz="2069">
                 <a:solidFill>
                   <a:schemeClr val="tx1">
                     <a:tint val="75000"/>
@@ -937,9 +940,9 @@
                 </a:solidFill>
               </a:defRPr>
             </a:lvl5pPr>
-            <a:lvl6pPr marL="2286000" indent="0">
-              <a:buNone/>
-              <a:defRPr sz="1600">
+            <a:lvl6pPr marL="2956484" indent="0">
+              <a:buNone/>
+              <a:defRPr sz="2069">
                 <a:solidFill>
                   <a:schemeClr val="tx1">
                     <a:tint val="75000"/>
@@ -947,9 +950,9 @@
                 </a:solidFill>
               </a:defRPr>
             </a:lvl6pPr>
-            <a:lvl7pPr marL="2743200" indent="0">
-              <a:buNone/>
-              <a:defRPr sz="1600">
+            <a:lvl7pPr marL="3547781" indent="0">
+              <a:buNone/>
+              <a:defRPr sz="2069">
                 <a:solidFill>
                   <a:schemeClr val="tx1">
                     <a:tint val="75000"/>
@@ -957,9 +960,9 @@
                 </a:solidFill>
               </a:defRPr>
             </a:lvl7pPr>
-            <a:lvl8pPr marL="3200400" indent="0">
-              <a:buNone/>
-              <a:defRPr sz="1600">
+            <a:lvl8pPr marL="4139077" indent="0">
+              <a:buNone/>
+              <a:defRPr sz="2069">
                 <a:solidFill>
                   <a:schemeClr val="tx1">
                     <a:tint val="75000"/>
@@ -967,9 +970,9 @@
                 </a:solidFill>
               </a:defRPr>
             </a:lvl8pPr>
-            <a:lvl9pPr marL="3657600" indent="0">
-              <a:buNone/>
-              <a:defRPr sz="1600">
+            <a:lvl9pPr marL="4730374" indent="0">
+              <a:buNone/>
+              <a:defRPr sz="2069">
                 <a:solidFill>
                   <a:schemeClr val="tx1">
                     <a:tint val="75000"/>
@@ -1004,7 +1007,7 @@
           <a:p>
             <a:fld id="{4D01D722-A7B2-4018-AAE4-87180B192DC8}" type="datetimeFigureOut">
               <a:rPr lang="en-US" smtClean="0"/>
-              <a:t>1/13/2017</a:t>
+              <a:t>2/7/2017</a:t>
             </a:fld>
             <a:endParaRPr lang="en-US"/>
           </a:p>
@@ -1055,7 +1058,7 @@
     </p:spTree>
     <p:extLst>
       <p:ext uri="{BB962C8B-B14F-4D97-AF65-F5344CB8AC3E}">
-        <p14:creationId xmlns:p14="http://schemas.microsoft.com/office/powerpoint/2010/main" val="3559422734"/>
+        <p14:creationId xmlns:p14="http://schemas.microsoft.com/office/powerpoint/2010/main" val="2684330443"/>
       </p:ext>
     </p:extLst>
   </p:cSld>
@@ -1101,7 +1104,7 @@
               <a:rPr lang="en-US" smtClean="0"/>
               <a:t>Click to edit Master title style</a:t>
             </a:r>
-            <a:endParaRPr lang="en-US"/>
+            <a:endParaRPr lang="en-US" dirty="0"/>
           </a:p>
         </p:txBody>
       </p:sp>
@@ -1117,8 +1120,8 @@
         </p:nvSpPr>
         <p:spPr>
           <a:xfrm>
-            <a:off x="838200" y="1825625"/>
-            <a:ext cx="5181600" cy="4351338"/>
+            <a:off x="838200" y="2361057"/>
+            <a:ext cx="5181600" cy="5627529"/>
           </a:xfrm>
         </p:spPr>
         <p:txBody>
@@ -1158,7 +1161,7 @@
               <a:rPr lang="en-US" smtClean="0"/>
               <a:t>Fifth level</a:t>
             </a:r>
-            <a:endParaRPr lang="en-US"/>
+            <a:endParaRPr lang="en-US" dirty="0"/>
           </a:p>
         </p:txBody>
       </p:sp>
@@ -1174,8 +1177,8 @@
         </p:nvSpPr>
         <p:spPr>
           <a:xfrm>
-            <a:off x="6172200" y="1825625"/>
-            <a:ext cx="5181600" cy="4351338"/>
+            <a:off x="6172200" y="2361057"/>
+            <a:ext cx="5181600" cy="5627529"/>
           </a:xfrm>
         </p:spPr>
         <p:txBody>
@@ -1215,7 +1218,7 @@
               <a:rPr lang="en-US" smtClean="0"/>
               <a:t>Fifth level</a:t>
             </a:r>
-            <a:endParaRPr lang="en-US"/>
+            <a:endParaRPr lang="en-US" dirty="0"/>
           </a:p>
         </p:txBody>
       </p:sp>
@@ -1236,7 +1239,7 @@
           <a:p>
             <a:fld id="{4D01D722-A7B2-4018-AAE4-87180B192DC8}" type="datetimeFigureOut">
               <a:rPr lang="en-US" smtClean="0"/>
-              <a:t>1/13/2017</a:t>
+              <a:t>2/7/2017</a:t>
             </a:fld>
             <a:endParaRPr lang="en-US"/>
           </a:p>
@@ -1287,7 +1290,7 @@
     </p:spTree>
     <p:extLst>
       <p:ext uri="{BB962C8B-B14F-4D97-AF65-F5344CB8AC3E}">
-        <p14:creationId xmlns:p14="http://schemas.microsoft.com/office/powerpoint/2010/main" val="3130665698"/>
+        <p14:creationId xmlns:p14="http://schemas.microsoft.com/office/powerpoint/2010/main" val="1094946358"/>
       </p:ext>
     </p:extLst>
   </p:cSld>
@@ -1326,8 +1329,8 @@
         </p:nvSpPr>
         <p:spPr>
           <a:xfrm>
-            <a:off x="839788" y="365125"/>
-            <a:ext cx="10515600" cy="1325563"/>
+            <a:off x="839788" y="472213"/>
+            <a:ext cx="10515600" cy="1714334"/>
           </a:xfrm>
         </p:spPr>
         <p:txBody>
@@ -1338,7 +1341,7 @@
               <a:rPr lang="en-US" smtClean="0"/>
               <a:t>Click to edit Master title style</a:t>
             </a:r>
-            <a:endParaRPr lang="en-US"/>
+            <a:endParaRPr lang="en-US" dirty="0"/>
           </a:p>
         </p:txBody>
       </p:sp>
@@ -1354,8 +1357,8 @@
         </p:nvSpPr>
         <p:spPr>
           <a:xfrm>
-            <a:off x="839788" y="1681163"/>
-            <a:ext cx="5157787" cy="823912"/>
+            <a:off x="839789" y="2174226"/>
+            <a:ext cx="5157787" cy="1065555"/>
           </a:xfrm>
         </p:spPr>
         <p:txBody>
@@ -1363,39 +1366,39 @@
           <a:lstStyle>
             <a:lvl1pPr marL="0" indent="0">
               <a:buNone/>
-              <a:defRPr sz="2400" b="1"/>
+              <a:defRPr sz="3104" b="1"/>
             </a:lvl1pPr>
-            <a:lvl2pPr marL="457200" indent="0">
-              <a:buNone/>
-              <a:defRPr sz="2000" b="1"/>
+            <a:lvl2pPr marL="591297" indent="0">
+              <a:buNone/>
+              <a:defRPr sz="2587" b="1"/>
             </a:lvl2pPr>
-            <a:lvl3pPr marL="914400" indent="0">
-              <a:buNone/>
-              <a:defRPr sz="1800" b="1"/>
+            <a:lvl3pPr marL="1182594" indent="0">
+              <a:buNone/>
+              <a:defRPr sz="2328" b="1"/>
             </a:lvl3pPr>
-            <a:lvl4pPr marL="1371600" indent="0">
-              <a:buNone/>
-              <a:defRPr sz="1600" b="1"/>
+            <a:lvl4pPr marL="1773890" indent="0">
+              <a:buNone/>
+              <a:defRPr sz="2069" b="1"/>
             </a:lvl4pPr>
-            <a:lvl5pPr marL="1828800" indent="0">
-              <a:buNone/>
-              <a:defRPr sz="1600" b="1"/>
+            <a:lvl5pPr marL="2365187" indent="0">
+              <a:buNone/>
+              <a:defRPr sz="2069" b="1"/>
             </a:lvl5pPr>
-            <a:lvl6pPr marL="2286000" indent="0">
-              <a:buNone/>
-              <a:defRPr sz="1600" b="1"/>
+            <a:lvl6pPr marL="2956484" indent="0">
+              <a:buNone/>
+              <a:defRPr sz="2069" b="1"/>
             </a:lvl6pPr>
-            <a:lvl7pPr marL="2743200" indent="0">
-              <a:buNone/>
-              <a:defRPr sz="1600" b="1"/>
+            <a:lvl7pPr marL="3547781" indent="0">
+              <a:buNone/>
+              <a:defRPr sz="2069" b="1"/>
             </a:lvl7pPr>
-            <a:lvl8pPr marL="3200400" indent="0">
-              <a:buNone/>
-              <a:defRPr sz="1600" b="1"/>
+            <a:lvl8pPr marL="4139077" indent="0">
+              <a:buNone/>
+              <a:defRPr sz="2069" b="1"/>
             </a:lvl8pPr>
-            <a:lvl9pPr marL="3657600" indent="0">
-              <a:buNone/>
-              <a:defRPr sz="1600" b="1"/>
+            <a:lvl9pPr marL="4730374" indent="0">
+              <a:buNone/>
+              <a:defRPr sz="2069" b="1"/>
             </a:lvl9pPr>
           </a:lstStyle>
           <a:p>
@@ -1419,8 +1422,8 @@
         </p:nvSpPr>
         <p:spPr>
           <a:xfrm>
-            <a:off x="839788" y="2505075"/>
-            <a:ext cx="5157787" cy="3684588"/>
+            <a:off x="839789" y="3239781"/>
+            <a:ext cx="5157787" cy="4765230"/>
           </a:xfrm>
         </p:spPr>
         <p:txBody>
@@ -1460,7 +1463,7 @@
               <a:rPr lang="en-US" smtClean="0"/>
               <a:t>Fifth level</a:t>
             </a:r>
-            <a:endParaRPr lang="en-US"/>
+            <a:endParaRPr lang="en-US" dirty="0"/>
           </a:p>
         </p:txBody>
       </p:sp>
@@ -1476,8 +1479,8 @@
         </p:nvSpPr>
         <p:spPr>
           <a:xfrm>
-            <a:off x="6172200" y="1681163"/>
-            <a:ext cx="5183188" cy="823912"/>
+            <a:off x="6172201" y="2174226"/>
+            <a:ext cx="5183188" cy="1065555"/>
           </a:xfrm>
         </p:spPr>
         <p:txBody>
@@ -1485,39 +1488,39 @@
           <a:lstStyle>
             <a:lvl1pPr marL="0" indent="0">
               <a:buNone/>
-              <a:defRPr sz="2400" b="1"/>
+              <a:defRPr sz="3104" b="1"/>
             </a:lvl1pPr>
-            <a:lvl2pPr marL="457200" indent="0">
-              <a:buNone/>
-              <a:defRPr sz="2000" b="1"/>
+            <a:lvl2pPr marL="591297" indent="0">
+              <a:buNone/>
+              <a:defRPr sz="2587" b="1"/>
             </a:lvl2pPr>
-            <a:lvl3pPr marL="914400" indent="0">
-              <a:buNone/>
-              <a:defRPr sz="1800" b="1"/>
+            <a:lvl3pPr marL="1182594" indent="0">
+              <a:buNone/>
+              <a:defRPr sz="2328" b="1"/>
             </a:lvl3pPr>
-            <a:lvl4pPr marL="1371600" indent="0">
-              <a:buNone/>
-              <a:defRPr sz="1600" b="1"/>
+            <a:lvl4pPr marL="1773890" indent="0">
+              <a:buNone/>
+              <a:defRPr sz="2069" b="1"/>
             </a:lvl4pPr>
-            <a:lvl5pPr marL="1828800" indent="0">
-              <a:buNone/>
-              <a:defRPr sz="1600" b="1"/>
+            <a:lvl5pPr marL="2365187" indent="0">
+              <a:buNone/>
+              <a:defRPr sz="2069" b="1"/>
             </a:lvl5pPr>
-            <a:lvl6pPr marL="2286000" indent="0">
-              <a:buNone/>
-              <a:defRPr sz="1600" b="1"/>
+            <a:lvl6pPr marL="2956484" indent="0">
+              <a:buNone/>
+              <a:defRPr sz="2069" b="1"/>
             </a:lvl6pPr>
-            <a:lvl7pPr marL="2743200" indent="0">
-              <a:buNone/>
-              <a:defRPr sz="1600" b="1"/>
+            <a:lvl7pPr marL="3547781" indent="0">
+              <a:buNone/>
+              <a:defRPr sz="2069" b="1"/>
             </a:lvl7pPr>
-            <a:lvl8pPr marL="3200400" indent="0">
-              <a:buNone/>
-              <a:defRPr sz="1600" b="1"/>
+            <a:lvl8pPr marL="4139077" indent="0">
+              <a:buNone/>
+              <a:defRPr sz="2069" b="1"/>
             </a:lvl8pPr>
-            <a:lvl9pPr marL="3657600" indent="0">
-              <a:buNone/>
-              <a:defRPr sz="1600" b="1"/>
+            <a:lvl9pPr marL="4730374" indent="0">
+              <a:buNone/>
+              <a:defRPr sz="2069" b="1"/>
             </a:lvl9pPr>
           </a:lstStyle>
           <a:p>
@@ -1541,8 +1544,8 @@
         </p:nvSpPr>
         <p:spPr>
           <a:xfrm>
-            <a:off x="6172200" y="2505075"/>
-            <a:ext cx="5183188" cy="3684588"/>
+            <a:off x="6172201" y="3239781"/>
+            <a:ext cx="5183188" cy="4765230"/>
           </a:xfrm>
         </p:spPr>
         <p:txBody>
@@ -1582,7 +1585,7 @@
               <a:rPr lang="en-US" smtClean="0"/>
               <a:t>Fifth level</a:t>
             </a:r>
-            <a:endParaRPr lang="en-US"/>
+            <a:endParaRPr lang="en-US" dirty="0"/>
           </a:p>
         </p:txBody>
       </p:sp>
@@ -1603,7 +1606,7 @@
           <a:p>
             <a:fld id="{4D01D722-A7B2-4018-AAE4-87180B192DC8}" type="datetimeFigureOut">
               <a:rPr lang="en-US" smtClean="0"/>
-              <a:t>1/13/2017</a:t>
+              <a:t>2/7/2017</a:t>
             </a:fld>
             <a:endParaRPr lang="en-US"/>
           </a:p>
@@ -1654,7 +1657,7 @@
     </p:spTree>
     <p:extLst>
       <p:ext uri="{BB962C8B-B14F-4D97-AF65-F5344CB8AC3E}">
-        <p14:creationId xmlns:p14="http://schemas.microsoft.com/office/powerpoint/2010/main" val="558568070"/>
+        <p14:creationId xmlns:p14="http://schemas.microsoft.com/office/powerpoint/2010/main" val="3574267531"/>
       </p:ext>
     </p:extLst>
   </p:cSld>
@@ -1700,7 +1703,7 @@
               <a:rPr lang="en-US" smtClean="0"/>
               <a:t>Click to edit Master title style</a:t>
             </a:r>
-            <a:endParaRPr lang="en-US"/>
+            <a:endParaRPr lang="en-US" dirty="0"/>
           </a:p>
         </p:txBody>
       </p:sp>
@@ -1721,7 +1724,7 @@
           <a:p>
             <a:fld id="{4D01D722-A7B2-4018-AAE4-87180B192DC8}" type="datetimeFigureOut">
               <a:rPr lang="en-US" smtClean="0"/>
-              <a:t>1/13/2017</a:t>
+              <a:t>2/7/2017</a:t>
             </a:fld>
             <a:endParaRPr lang="en-US"/>
           </a:p>
@@ -1772,7 +1775,7 @@
     </p:spTree>
     <p:extLst>
       <p:ext uri="{BB962C8B-B14F-4D97-AF65-F5344CB8AC3E}">
-        <p14:creationId xmlns:p14="http://schemas.microsoft.com/office/powerpoint/2010/main" val="2191866573"/>
+        <p14:creationId xmlns:p14="http://schemas.microsoft.com/office/powerpoint/2010/main" val="2610244228"/>
       </p:ext>
     </p:extLst>
   </p:cSld>
@@ -1816,7 +1819,7 @@
           <a:p>
             <a:fld id="{4D01D722-A7B2-4018-AAE4-87180B192DC8}" type="datetimeFigureOut">
               <a:rPr lang="en-US" smtClean="0"/>
-              <a:t>1/13/2017</a:t>
+              <a:t>2/7/2017</a:t>
             </a:fld>
             <a:endParaRPr lang="en-US"/>
           </a:p>
@@ -1867,7 +1870,7 @@
     </p:spTree>
     <p:extLst>
       <p:ext uri="{BB962C8B-B14F-4D97-AF65-F5344CB8AC3E}">
-        <p14:creationId xmlns:p14="http://schemas.microsoft.com/office/powerpoint/2010/main" val="3685404697"/>
+        <p14:creationId xmlns:p14="http://schemas.microsoft.com/office/powerpoint/2010/main" val="1134494975"/>
       </p:ext>
     </p:extLst>
   </p:cSld>
@@ -1906,15 +1909,15 @@
         </p:nvSpPr>
         <p:spPr>
           <a:xfrm>
-            <a:off x="839788" y="457200"/>
-            <a:ext cx="3932237" cy="1600200"/>
+            <a:off x="839788" y="591291"/>
+            <a:ext cx="3932237" cy="2069518"/>
           </a:xfrm>
         </p:spPr>
         <p:txBody>
           <a:bodyPr anchor="b"/>
           <a:lstStyle>
             <a:lvl1pPr>
-              <a:defRPr sz="3200"/>
+              <a:defRPr sz="4139"/>
             </a:lvl1pPr>
           </a:lstStyle>
           <a:p>
@@ -1922,7 +1925,7 @@
               <a:rPr lang="en-US" smtClean="0"/>
               <a:t>Click to edit Master title style</a:t>
             </a:r>
-            <a:endParaRPr lang="en-US"/>
+            <a:endParaRPr lang="en-US" dirty="0"/>
           </a:p>
         </p:txBody>
       </p:sp>
@@ -1938,39 +1941,39 @@
         </p:nvSpPr>
         <p:spPr>
           <a:xfrm>
-            <a:off x="5183188" y="987425"/>
-            <a:ext cx="6172200" cy="4873625"/>
+            <a:off x="5183188" y="1277026"/>
+            <a:ext cx="6172200" cy="6302996"/>
           </a:xfrm>
         </p:spPr>
         <p:txBody>
           <a:bodyPr/>
           <a:lstStyle>
             <a:lvl1pPr>
-              <a:defRPr sz="3200"/>
+              <a:defRPr sz="4139"/>
             </a:lvl1pPr>
             <a:lvl2pPr>
-              <a:defRPr sz="2800"/>
+              <a:defRPr sz="3621"/>
             </a:lvl2pPr>
             <a:lvl3pPr>
-              <a:defRPr sz="2400"/>
+              <a:defRPr sz="3104"/>
             </a:lvl3pPr>
             <a:lvl4pPr>
-              <a:defRPr sz="2000"/>
+              <a:defRPr sz="2587"/>
             </a:lvl4pPr>
             <a:lvl5pPr>
-              <a:defRPr sz="2000"/>
+              <a:defRPr sz="2587"/>
             </a:lvl5pPr>
             <a:lvl6pPr>
-              <a:defRPr sz="2000"/>
+              <a:defRPr sz="2587"/>
             </a:lvl6pPr>
             <a:lvl7pPr>
-              <a:defRPr sz="2000"/>
+              <a:defRPr sz="2587"/>
             </a:lvl7pPr>
             <a:lvl8pPr>
-              <a:defRPr sz="2000"/>
+              <a:defRPr sz="2587"/>
             </a:lvl8pPr>
             <a:lvl9pPr>
-              <a:defRPr sz="2000"/>
+              <a:defRPr sz="2587"/>
             </a:lvl9pPr>
           </a:lstStyle>
           <a:p>
@@ -2007,7 +2010,7 @@
               <a:rPr lang="en-US" smtClean="0"/>
               <a:t>Fifth level</a:t>
             </a:r>
-            <a:endParaRPr lang="en-US"/>
+            <a:endParaRPr lang="en-US" dirty="0"/>
           </a:p>
         </p:txBody>
       </p:sp>
@@ -2023,8 +2026,8 @@
         </p:nvSpPr>
         <p:spPr>
           <a:xfrm>
-            <a:off x="839788" y="2057400"/>
-            <a:ext cx="3932237" cy="3811588"/>
+            <a:off x="839788" y="2660809"/>
+            <a:ext cx="3932237" cy="4929478"/>
           </a:xfrm>
         </p:spPr>
         <p:txBody>
@@ -2032,39 +2035,39 @@
           <a:lstStyle>
             <a:lvl1pPr marL="0" indent="0">
               <a:buNone/>
-              <a:defRPr sz="1600"/>
+              <a:defRPr sz="2069"/>
             </a:lvl1pPr>
-            <a:lvl2pPr marL="457200" indent="0">
-              <a:buNone/>
-              <a:defRPr sz="1400"/>
+            <a:lvl2pPr marL="591297" indent="0">
+              <a:buNone/>
+              <a:defRPr sz="1811"/>
             </a:lvl2pPr>
-            <a:lvl3pPr marL="914400" indent="0">
-              <a:buNone/>
-              <a:defRPr sz="1200"/>
+            <a:lvl3pPr marL="1182594" indent="0">
+              <a:buNone/>
+              <a:defRPr sz="1552"/>
             </a:lvl3pPr>
-            <a:lvl4pPr marL="1371600" indent="0">
-              <a:buNone/>
-              <a:defRPr sz="1000"/>
+            <a:lvl4pPr marL="1773890" indent="0">
+              <a:buNone/>
+              <a:defRPr sz="1293"/>
             </a:lvl4pPr>
-            <a:lvl5pPr marL="1828800" indent="0">
-              <a:buNone/>
-              <a:defRPr sz="1000"/>
+            <a:lvl5pPr marL="2365187" indent="0">
+              <a:buNone/>
+              <a:defRPr sz="1293"/>
             </a:lvl5pPr>
-            <a:lvl6pPr marL="2286000" indent="0">
-              <a:buNone/>
-              <a:defRPr sz="1000"/>
+            <a:lvl6pPr marL="2956484" indent="0">
+              <a:buNone/>
+              <a:defRPr sz="1293"/>
             </a:lvl6pPr>
-            <a:lvl7pPr marL="2743200" indent="0">
-              <a:buNone/>
-              <a:defRPr sz="1000"/>
+            <a:lvl7pPr marL="3547781" indent="0">
+              <a:buNone/>
+              <a:defRPr sz="1293"/>
             </a:lvl7pPr>
-            <a:lvl8pPr marL="3200400" indent="0">
-              <a:buNone/>
-              <a:defRPr sz="1000"/>
+            <a:lvl8pPr marL="4139077" indent="0">
+              <a:buNone/>
+              <a:defRPr sz="1293"/>
             </a:lvl8pPr>
-            <a:lvl9pPr marL="3657600" indent="0">
-              <a:buNone/>
-              <a:defRPr sz="1000"/>
+            <a:lvl9pPr marL="4730374" indent="0">
+              <a:buNone/>
+              <a:defRPr sz="1293"/>
             </a:lvl9pPr>
           </a:lstStyle>
           <a:p>
@@ -2093,7 +2096,7 @@
           <a:p>
             <a:fld id="{4D01D722-A7B2-4018-AAE4-87180B192DC8}" type="datetimeFigureOut">
               <a:rPr lang="en-US" smtClean="0"/>
-              <a:t>1/13/2017</a:t>
+              <a:t>2/7/2017</a:t>
             </a:fld>
             <a:endParaRPr lang="en-US"/>
           </a:p>
@@ -2144,7 +2147,7 @@
     </p:spTree>
     <p:extLst>
       <p:ext uri="{BB962C8B-B14F-4D97-AF65-F5344CB8AC3E}">
-        <p14:creationId xmlns:p14="http://schemas.microsoft.com/office/powerpoint/2010/main" val="2140118280"/>
+        <p14:creationId xmlns:p14="http://schemas.microsoft.com/office/powerpoint/2010/main" val="2862654696"/>
       </p:ext>
     </p:extLst>
   </p:cSld>
@@ -2183,15 +2186,15 @@
         </p:nvSpPr>
         <p:spPr>
           <a:xfrm>
-            <a:off x="839788" y="457200"/>
-            <a:ext cx="3932237" cy="1600200"/>
+            <a:off x="839788" y="591291"/>
+            <a:ext cx="3932237" cy="2069518"/>
           </a:xfrm>
         </p:spPr>
         <p:txBody>
           <a:bodyPr anchor="b"/>
           <a:lstStyle>
             <a:lvl1pPr>
-              <a:defRPr sz="3200"/>
+              <a:defRPr sz="4139"/>
             </a:lvl1pPr>
           </a:lstStyle>
           <a:p>
@@ -2199,7 +2202,7 @@
               <a:rPr lang="en-US" smtClean="0"/>
               <a:t>Click to edit Master title style</a:t>
             </a:r>
-            <a:endParaRPr lang="en-US"/>
+            <a:endParaRPr lang="en-US" dirty="0"/>
           </a:p>
         </p:txBody>
       </p:sp>
@@ -2207,7 +2210,7 @@
         <p:nvSpPr>
           <p:cNvPr id="3" name="Picture Placeholder 2"/>
           <p:cNvSpPr>
-            <a:spLocks noGrp="1"/>
+            <a:spLocks noGrp="1" noChangeAspect="1"/>
           </p:cNvSpPr>
           <p:nvPr>
             <p:ph type="pic" idx="1"/>
@@ -2215,52 +2218,56 @@
         </p:nvSpPr>
         <p:spPr>
           <a:xfrm>
-            <a:off x="5183188" y="987425"/>
-            <a:ext cx="6172200" cy="4873625"/>
-          </a:xfrm>
-        </p:spPr>
-        <p:txBody>
-          <a:bodyPr/>
+            <a:off x="5183188" y="1277026"/>
+            <a:ext cx="6172200" cy="6302996"/>
+          </a:xfrm>
+        </p:spPr>
+        <p:txBody>
+          <a:bodyPr anchor="t"/>
           <a:lstStyle>
             <a:lvl1pPr marL="0" indent="0">
               <a:buNone/>
-              <a:defRPr sz="3200"/>
+              <a:defRPr sz="4139"/>
             </a:lvl1pPr>
-            <a:lvl2pPr marL="457200" indent="0">
-              <a:buNone/>
-              <a:defRPr sz="2800"/>
+            <a:lvl2pPr marL="591297" indent="0">
+              <a:buNone/>
+              <a:defRPr sz="3621"/>
             </a:lvl2pPr>
-            <a:lvl3pPr marL="914400" indent="0">
-              <a:buNone/>
-              <a:defRPr sz="2400"/>
+            <a:lvl3pPr marL="1182594" indent="0">
+              <a:buNone/>
+              <a:defRPr sz="3104"/>
             </a:lvl3pPr>
-            <a:lvl4pPr marL="1371600" indent="0">
-              <a:buNone/>
-              <a:defRPr sz="2000"/>
+            <a:lvl4pPr marL="1773890" indent="0">
+              <a:buNone/>
+              <a:defRPr sz="2587"/>
             </a:lvl4pPr>
-            <a:lvl5pPr marL="1828800" indent="0">
-              <a:buNone/>
-              <a:defRPr sz="2000"/>
+            <a:lvl5pPr marL="2365187" indent="0">
+              <a:buNone/>
+              <a:defRPr sz="2587"/>
             </a:lvl5pPr>
-            <a:lvl6pPr marL="2286000" indent="0">
-              <a:buNone/>
-              <a:defRPr sz="2000"/>
+            <a:lvl6pPr marL="2956484" indent="0">
+              <a:buNone/>
+              <a:defRPr sz="2587"/>
             </a:lvl6pPr>
-            <a:lvl7pPr marL="2743200" indent="0">
-              <a:buNone/>
-              <a:defRPr sz="2000"/>
+            <a:lvl7pPr marL="3547781" indent="0">
+              <a:buNone/>
+              <a:defRPr sz="2587"/>
             </a:lvl7pPr>
-            <a:lvl8pPr marL="3200400" indent="0">
-              <a:buNone/>
-              <a:defRPr sz="2000"/>
+            <a:lvl8pPr marL="4139077" indent="0">
+              <a:buNone/>
+              <a:defRPr sz="2587"/>
             </a:lvl8pPr>
-            <a:lvl9pPr marL="3657600" indent="0">
-              <a:buNone/>
-              <a:defRPr sz="2000"/>
+            <a:lvl9pPr marL="4730374" indent="0">
+              <a:buNone/>
+              <a:defRPr sz="2587"/>
             </a:lvl9pPr>
           </a:lstStyle>
           <a:p>
-            <a:endParaRPr lang="en-US"/>
+            <a:r>
+              <a:rPr lang="en-US" smtClean="0"/>
+              <a:t>Click icon to add picture</a:t>
+            </a:r>
+            <a:endParaRPr lang="en-US" dirty="0"/>
           </a:p>
         </p:txBody>
       </p:sp>
@@ -2276,8 +2283,8 @@
         </p:nvSpPr>
         <p:spPr>
           <a:xfrm>
-            <a:off x="839788" y="2057400"/>
-            <a:ext cx="3932237" cy="3811588"/>
+            <a:off x="839788" y="2660809"/>
+            <a:ext cx="3932237" cy="4929478"/>
           </a:xfrm>
         </p:spPr>
         <p:txBody>
@@ -2285,39 +2292,39 @@
           <a:lstStyle>
             <a:lvl1pPr marL="0" indent="0">
               <a:buNone/>
-              <a:defRPr sz="1600"/>
+              <a:defRPr sz="2069"/>
             </a:lvl1pPr>
-            <a:lvl2pPr marL="457200" indent="0">
-              <a:buNone/>
-              <a:defRPr sz="1400"/>
+            <a:lvl2pPr marL="591297" indent="0">
+              <a:buNone/>
+              <a:defRPr sz="1811"/>
             </a:lvl2pPr>
-            <a:lvl3pPr marL="914400" indent="0">
-              <a:buNone/>
-              <a:defRPr sz="1200"/>
+            <a:lvl3pPr marL="1182594" indent="0">
+              <a:buNone/>
+              <a:defRPr sz="1552"/>
             </a:lvl3pPr>
-            <a:lvl4pPr marL="1371600" indent="0">
-              <a:buNone/>
-              <a:defRPr sz="1000"/>
+            <a:lvl4pPr marL="1773890" indent="0">
+              <a:buNone/>
+              <a:defRPr sz="1293"/>
             </a:lvl4pPr>
-            <a:lvl5pPr marL="1828800" indent="0">
-              <a:buNone/>
-              <a:defRPr sz="1000"/>
+            <a:lvl5pPr marL="2365187" indent="0">
+              <a:buNone/>
+              <a:defRPr sz="1293"/>
             </a:lvl5pPr>
-            <a:lvl6pPr marL="2286000" indent="0">
-              <a:buNone/>
-              <a:defRPr sz="1000"/>
+            <a:lvl6pPr marL="2956484" indent="0">
+              <a:buNone/>
+              <a:defRPr sz="1293"/>
             </a:lvl6pPr>
-            <a:lvl7pPr marL="2743200" indent="0">
-              <a:buNone/>
-              <a:defRPr sz="1000"/>
+            <a:lvl7pPr marL="3547781" indent="0">
+              <a:buNone/>
+              <a:defRPr sz="1293"/>
             </a:lvl7pPr>
-            <a:lvl8pPr marL="3200400" indent="0">
-              <a:buNone/>
-              <a:defRPr sz="1000"/>
+            <a:lvl8pPr marL="4139077" indent="0">
+              <a:buNone/>
+              <a:defRPr sz="1293"/>
             </a:lvl8pPr>
-            <a:lvl9pPr marL="3657600" indent="0">
-              <a:buNone/>
-              <a:defRPr sz="1000"/>
+            <a:lvl9pPr marL="4730374" indent="0">
+              <a:buNone/>
+              <a:defRPr sz="1293"/>
             </a:lvl9pPr>
           </a:lstStyle>
           <a:p>
@@ -2346,7 +2353,7 @@
           <a:p>
             <a:fld id="{4D01D722-A7B2-4018-AAE4-87180B192DC8}" type="datetimeFigureOut">
               <a:rPr lang="en-US" smtClean="0"/>
-              <a:t>1/13/2017</a:t>
+              <a:t>2/7/2017</a:t>
             </a:fld>
             <a:endParaRPr lang="en-US"/>
           </a:p>
@@ -2397,7 +2404,7 @@
     </p:spTree>
     <p:extLst>
       <p:ext uri="{BB962C8B-B14F-4D97-AF65-F5344CB8AC3E}">
-        <p14:creationId xmlns:p14="http://schemas.microsoft.com/office/powerpoint/2010/main" val="3633830770"/>
+        <p14:creationId xmlns:p14="http://schemas.microsoft.com/office/powerpoint/2010/main" val="3519102916"/>
       </p:ext>
     </p:extLst>
   </p:cSld>
@@ -2441,8 +2448,8 @@
         </p:nvSpPr>
         <p:spPr>
           <a:xfrm>
-            <a:off x="838200" y="365125"/>
-            <a:ext cx="10515600" cy="1325563"/>
+            <a:off x="838200" y="472213"/>
+            <a:ext cx="10515600" cy="1714334"/>
           </a:xfrm>
           <a:prstGeom prst="rect">
             <a:avLst/>
@@ -2458,7 +2465,7 @@
               <a:rPr lang="en-US" smtClean="0"/>
               <a:t>Click to edit Master title style</a:t>
             </a:r>
-            <a:endParaRPr lang="en-US"/>
+            <a:endParaRPr lang="en-US" dirty="0"/>
           </a:p>
         </p:txBody>
       </p:sp>
@@ -2474,8 +2481,8 @@
         </p:nvSpPr>
         <p:spPr>
           <a:xfrm>
-            <a:off x="838200" y="1825625"/>
-            <a:ext cx="10515600" cy="4351338"/>
+            <a:off x="838200" y="2361057"/>
+            <a:ext cx="10515600" cy="5627529"/>
           </a:xfrm>
           <a:prstGeom prst="rect">
             <a:avLst/>
@@ -2520,7 +2527,7 @@
               <a:rPr lang="en-US" smtClean="0"/>
               <a:t>Fifth level</a:t>
             </a:r>
-            <a:endParaRPr lang="en-US"/>
+            <a:endParaRPr lang="en-US" dirty="0"/>
           </a:p>
         </p:txBody>
       </p:sp>
@@ -2536,8 +2543,8 @@
         </p:nvSpPr>
         <p:spPr>
           <a:xfrm>
-            <a:off x="838200" y="6356350"/>
-            <a:ext cx="2743200" cy="365125"/>
+            <a:off x="838200" y="8220588"/>
+            <a:ext cx="2743200" cy="472211"/>
           </a:xfrm>
           <a:prstGeom prst="rect">
             <a:avLst/>
@@ -2547,7 +2554,7 @@
           <a:bodyPr vert="horz" lIns="91440" tIns="45720" rIns="91440" bIns="45720" rtlCol="0" anchor="ctr"/>
           <a:lstStyle>
             <a:lvl1pPr algn="l">
-              <a:defRPr sz="1200">
+              <a:defRPr sz="1552">
                 <a:solidFill>
                   <a:schemeClr val="tx1">
                     <a:tint val="75000"/>
@@ -2559,7 +2566,7 @@
           <a:p>
             <a:fld id="{4D01D722-A7B2-4018-AAE4-87180B192DC8}" type="datetimeFigureOut">
               <a:rPr lang="en-US" smtClean="0"/>
-              <a:t>1/13/2017</a:t>
+              <a:t>2/7/2017</a:t>
             </a:fld>
             <a:endParaRPr lang="en-US"/>
           </a:p>
@@ -2577,8 +2584,8 @@
         </p:nvSpPr>
         <p:spPr>
           <a:xfrm>
-            <a:off x="4038600" y="6356350"/>
-            <a:ext cx="4114800" cy="365125"/>
+            <a:off x="4038600" y="8220588"/>
+            <a:ext cx="4114800" cy="472211"/>
           </a:xfrm>
           <a:prstGeom prst="rect">
             <a:avLst/>
@@ -2588,7 +2595,7 @@
           <a:bodyPr vert="horz" lIns="91440" tIns="45720" rIns="91440" bIns="45720" rtlCol="0" anchor="ctr"/>
           <a:lstStyle>
             <a:lvl1pPr algn="ctr">
-              <a:defRPr sz="1200">
+              <a:defRPr sz="1552">
                 <a:solidFill>
                   <a:schemeClr val="tx1">
                     <a:tint val="75000"/>
@@ -2614,8 +2621,8 @@
         </p:nvSpPr>
         <p:spPr>
           <a:xfrm>
-            <a:off x="8610600" y="6356350"/>
-            <a:ext cx="2743200" cy="365125"/>
+            <a:off x="8610600" y="8220588"/>
+            <a:ext cx="2743200" cy="472211"/>
           </a:xfrm>
           <a:prstGeom prst="rect">
             <a:avLst/>
@@ -2625,7 +2632,7 @@
           <a:bodyPr vert="horz" lIns="91440" tIns="45720" rIns="91440" bIns="45720" rtlCol="0" anchor="ctr"/>
           <a:lstStyle>
             <a:lvl1pPr algn="r">
-              <a:defRPr sz="1200">
+              <a:defRPr sz="1552">
                 <a:solidFill>
                   <a:schemeClr val="tx1">
                     <a:tint val="75000"/>
@@ -2646,27 +2653,27 @@
     </p:spTree>
     <p:extLst>
       <p:ext uri="{BB962C8B-B14F-4D97-AF65-F5344CB8AC3E}">
-        <p14:creationId xmlns:p14="http://schemas.microsoft.com/office/powerpoint/2010/main" val="1055004737"/>
+        <p14:creationId xmlns:p14="http://schemas.microsoft.com/office/powerpoint/2010/main" val="1295130947"/>
       </p:ext>
     </p:extLst>
   </p:cSld>
   <p:clrMap bg1="lt1" tx1="dk1" bg2="lt2" tx2="dk2" accent1="accent1" accent2="accent2" accent3="accent3" accent4="accent4" accent5="accent5" accent6="accent6" hlink="hlink" folHlink="folHlink"/>
   <p:sldLayoutIdLst>
-    <p:sldLayoutId id="2147483649" r:id="rId1"/>
-    <p:sldLayoutId id="2147483650" r:id="rId2"/>
-    <p:sldLayoutId id="2147483651" r:id="rId3"/>
-    <p:sldLayoutId id="2147483652" r:id="rId4"/>
-    <p:sldLayoutId id="2147483653" r:id="rId5"/>
-    <p:sldLayoutId id="2147483654" r:id="rId6"/>
-    <p:sldLayoutId id="2147483655" r:id="rId7"/>
-    <p:sldLayoutId id="2147483656" r:id="rId8"/>
-    <p:sldLayoutId id="2147483657" r:id="rId9"/>
-    <p:sldLayoutId id="2147483658" r:id="rId10"/>
-    <p:sldLayoutId id="2147483659" r:id="rId11"/>
+    <p:sldLayoutId id="2147483661" r:id="rId1"/>
+    <p:sldLayoutId id="2147483662" r:id="rId2"/>
+    <p:sldLayoutId id="2147483663" r:id="rId3"/>
+    <p:sldLayoutId id="2147483664" r:id="rId4"/>
+    <p:sldLayoutId id="2147483665" r:id="rId5"/>
+    <p:sldLayoutId id="2147483666" r:id="rId6"/>
+    <p:sldLayoutId id="2147483667" r:id="rId7"/>
+    <p:sldLayoutId id="2147483668" r:id="rId8"/>
+    <p:sldLayoutId id="2147483669" r:id="rId9"/>
+    <p:sldLayoutId id="2147483670" r:id="rId10"/>
+    <p:sldLayoutId id="2147483671" r:id="rId11"/>
   </p:sldLayoutIdLst>
   <p:txStyles>
     <p:titleStyle>
-      <a:lvl1pPr algn="l" defTabSz="914400" rtl="0" eaLnBrk="1" latinLnBrk="0" hangingPunct="1">
+      <a:lvl1pPr algn="l" defTabSz="1182594" rtl="0" eaLnBrk="1" latinLnBrk="0" hangingPunct="1">
         <a:lnSpc>
           <a:spcPct val="90000"/>
         </a:lnSpc>
@@ -2674,7 +2681,7 @@
           <a:spcPct val="0"/>
         </a:spcBef>
         <a:buNone/>
-        <a:defRPr sz="4400" kern="1200">
+        <a:defRPr sz="5691" kern="1200">
           <a:solidFill>
             <a:schemeClr val="tx1"/>
           </a:solidFill>
@@ -2685,16 +2692,16 @@
       </a:lvl1pPr>
     </p:titleStyle>
     <p:bodyStyle>
-      <a:lvl1pPr marL="228600" indent="-228600" algn="l" defTabSz="914400" rtl="0" eaLnBrk="1" latinLnBrk="0" hangingPunct="1">
+      <a:lvl1pPr marL="295648" indent="-295648" algn="l" defTabSz="1182594" rtl="0" eaLnBrk="1" latinLnBrk="0" hangingPunct="1">
         <a:lnSpc>
           <a:spcPct val="90000"/>
         </a:lnSpc>
         <a:spcBef>
-          <a:spcPts val="1000"/>
+          <a:spcPts val="1293"/>
         </a:spcBef>
         <a:buFont typeface="Arial" panose="020B0604020202020204" pitchFamily="34" charset="0"/>
         <a:buChar char="•"/>
-        <a:defRPr sz="2800" kern="1200">
+        <a:defRPr sz="3621" kern="1200">
           <a:solidFill>
             <a:schemeClr val="tx1"/>
           </a:solidFill>
@@ -2703,16 +2710,16 @@
           <a:cs typeface="+mn-cs"/>
         </a:defRPr>
       </a:lvl1pPr>
-      <a:lvl2pPr marL="685800" indent="-228600" algn="l" defTabSz="914400" rtl="0" eaLnBrk="1" latinLnBrk="0" hangingPunct="1">
+      <a:lvl2pPr marL="886945" indent="-295648" algn="l" defTabSz="1182594" rtl="0" eaLnBrk="1" latinLnBrk="0" hangingPunct="1">
         <a:lnSpc>
           <a:spcPct val="90000"/>
         </a:lnSpc>
         <a:spcBef>
-          <a:spcPts val="500"/>
+          <a:spcPts val="647"/>
         </a:spcBef>
         <a:buFont typeface="Arial" panose="020B0604020202020204" pitchFamily="34" charset="0"/>
         <a:buChar char="•"/>
-        <a:defRPr sz="2400" kern="1200">
+        <a:defRPr sz="3104" kern="1200">
           <a:solidFill>
             <a:schemeClr val="tx1"/>
           </a:solidFill>
@@ -2721,16 +2728,16 @@
           <a:cs typeface="+mn-cs"/>
         </a:defRPr>
       </a:lvl2pPr>
-      <a:lvl3pPr marL="1143000" indent="-228600" algn="l" defTabSz="914400" rtl="0" eaLnBrk="1" latinLnBrk="0" hangingPunct="1">
+      <a:lvl3pPr marL="1478242" indent="-295648" algn="l" defTabSz="1182594" rtl="0" eaLnBrk="1" latinLnBrk="0" hangingPunct="1">
         <a:lnSpc>
           <a:spcPct val="90000"/>
         </a:lnSpc>
         <a:spcBef>
-          <a:spcPts val="500"/>
+          <a:spcPts val="647"/>
         </a:spcBef>
         <a:buFont typeface="Arial" panose="020B0604020202020204" pitchFamily="34" charset="0"/>
         <a:buChar char="•"/>
-        <a:defRPr sz="2000" kern="1200">
+        <a:defRPr sz="2587" kern="1200">
           <a:solidFill>
             <a:schemeClr val="tx1"/>
           </a:solidFill>
@@ -2739,16 +2746,16 @@
           <a:cs typeface="+mn-cs"/>
         </a:defRPr>
       </a:lvl3pPr>
-      <a:lvl4pPr marL="1600200" indent="-228600" algn="l" defTabSz="914400" rtl="0" eaLnBrk="1" latinLnBrk="0" hangingPunct="1">
+      <a:lvl4pPr marL="2069539" indent="-295648" algn="l" defTabSz="1182594" rtl="0" eaLnBrk="1" latinLnBrk="0" hangingPunct="1">
         <a:lnSpc>
           <a:spcPct val="90000"/>
         </a:lnSpc>
         <a:spcBef>
-          <a:spcPts val="500"/>
+          <a:spcPts val="647"/>
         </a:spcBef>
         <a:buFont typeface="Arial" panose="020B0604020202020204" pitchFamily="34" charset="0"/>
         <a:buChar char="•"/>
-        <a:defRPr sz="1800" kern="1200">
+        <a:defRPr sz="2328" kern="1200">
           <a:solidFill>
             <a:schemeClr val="tx1"/>
           </a:solidFill>
@@ -2757,16 +2764,16 @@
           <a:cs typeface="+mn-cs"/>
         </a:defRPr>
       </a:lvl4pPr>
-      <a:lvl5pPr marL="2057400" indent="-228600" algn="l" defTabSz="914400" rtl="0" eaLnBrk="1" latinLnBrk="0" hangingPunct="1">
+      <a:lvl5pPr marL="2660835" indent="-295648" algn="l" defTabSz="1182594" rtl="0" eaLnBrk="1" latinLnBrk="0" hangingPunct="1">
         <a:lnSpc>
           <a:spcPct val="90000"/>
         </a:lnSpc>
         <a:spcBef>
-          <a:spcPts val="500"/>
+          <a:spcPts val="647"/>
         </a:spcBef>
         <a:buFont typeface="Arial" panose="020B0604020202020204" pitchFamily="34" charset="0"/>
         <a:buChar char="•"/>
-        <a:defRPr sz="1800" kern="1200">
+        <a:defRPr sz="2328" kern="1200">
           <a:solidFill>
             <a:schemeClr val="tx1"/>
           </a:solidFill>
@@ -2775,16 +2782,16 @@
           <a:cs typeface="+mn-cs"/>
         </a:defRPr>
       </a:lvl5pPr>
-      <a:lvl6pPr marL="2514600" indent="-228600" algn="l" defTabSz="914400" rtl="0" eaLnBrk="1" latinLnBrk="0" hangingPunct="1">
+      <a:lvl6pPr marL="3252132" indent="-295648" algn="l" defTabSz="1182594" rtl="0" eaLnBrk="1" latinLnBrk="0" hangingPunct="1">
         <a:lnSpc>
           <a:spcPct val="90000"/>
         </a:lnSpc>
         <a:spcBef>
-          <a:spcPts val="500"/>
+          <a:spcPts val="647"/>
         </a:spcBef>
         <a:buFont typeface="Arial" panose="020B0604020202020204" pitchFamily="34" charset="0"/>
         <a:buChar char="•"/>
-        <a:defRPr sz="1800" kern="1200">
+        <a:defRPr sz="2328" kern="1200">
           <a:solidFill>
             <a:schemeClr val="tx1"/>
           </a:solidFill>
@@ -2793,16 +2800,16 @@
           <a:cs typeface="+mn-cs"/>
         </a:defRPr>
       </a:lvl6pPr>
-      <a:lvl7pPr marL="2971800" indent="-228600" algn="l" defTabSz="914400" rtl="0" eaLnBrk="1" latinLnBrk="0" hangingPunct="1">
+      <a:lvl7pPr marL="3843429" indent="-295648" algn="l" defTabSz="1182594" rtl="0" eaLnBrk="1" latinLnBrk="0" hangingPunct="1">
         <a:lnSpc>
           <a:spcPct val="90000"/>
         </a:lnSpc>
         <a:spcBef>
-          <a:spcPts val="500"/>
+          <a:spcPts val="647"/>
         </a:spcBef>
         <a:buFont typeface="Arial" panose="020B0604020202020204" pitchFamily="34" charset="0"/>
         <a:buChar char="•"/>
-        <a:defRPr sz="1800" kern="1200">
+        <a:defRPr sz="2328" kern="1200">
           <a:solidFill>
             <a:schemeClr val="tx1"/>
           </a:solidFill>
@@ -2811,16 +2818,16 @@
           <a:cs typeface="+mn-cs"/>
         </a:defRPr>
       </a:lvl7pPr>
-      <a:lvl8pPr marL="3429000" indent="-228600" algn="l" defTabSz="914400" rtl="0" eaLnBrk="1" latinLnBrk="0" hangingPunct="1">
+      <a:lvl8pPr marL="4434726" indent="-295648" algn="l" defTabSz="1182594" rtl="0" eaLnBrk="1" latinLnBrk="0" hangingPunct="1">
         <a:lnSpc>
           <a:spcPct val="90000"/>
         </a:lnSpc>
         <a:spcBef>
-          <a:spcPts val="500"/>
+          <a:spcPts val="647"/>
         </a:spcBef>
         <a:buFont typeface="Arial" panose="020B0604020202020204" pitchFamily="34" charset="0"/>
         <a:buChar char="•"/>
-        <a:defRPr sz="1800" kern="1200">
+        <a:defRPr sz="2328" kern="1200">
           <a:solidFill>
             <a:schemeClr val="tx1"/>
           </a:solidFill>
@@ -2829,16 +2836,16 @@
           <a:cs typeface="+mn-cs"/>
         </a:defRPr>
       </a:lvl8pPr>
-      <a:lvl9pPr marL="3886200" indent="-228600" algn="l" defTabSz="914400" rtl="0" eaLnBrk="1" latinLnBrk="0" hangingPunct="1">
+      <a:lvl9pPr marL="5026022" indent="-295648" algn="l" defTabSz="1182594" rtl="0" eaLnBrk="1" latinLnBrk="0" hangingPunct="1">
         <a:lnSpc>
           <a:spcPct val="90000"/>
         </a:lnSpc>
         <a:spcBef>
-          <a:spcPts val="500"/>
+          <a:spcPts val="647"/>
         </a:spcBef>
         <a:buFont typeface="Arial" panose="020B0604020202020204" pitchFamily="34" charset="0"/>
         <a:buChar char="•"/>
-        <a:defRPr sz="1800" kern="1200">
+        <a:defRPr sz="2328" kern="1200">
           <a:solidFill>
             <a:schemeClr val="tx1"/>
           </a:solidFill>
@@ -2852,8 +2859,8 @@
       <a:defPPr>
         <a:defRPr lang="en-US"/>
       </a:defPPr>
-      <a:lvl1pPr marL="0" algn="l" defTabSz="914400" rtl="0" eaLnBrk="1" latinLnBrk="0" hangingPunct="1">
-        <a:defRPr sz="1800" kern="1200">
+      <a:lvl1pPr marL="0" algn="l" defTabSz="1182594" rtl="0" eaLnBrk="1" latinLnBrk="0" hangingPunct="1">
+        <a:defRPr sz="2328" kern="1200">
           <a:solidFill>
             <a:schemeClr val="tx1"/>
           </a:solidFill>
@@ -2862,8 +2869,8 @@
           <a:cs typeface="+mn-cs"/>
         </a:defRPr>
       </a:lvl1pPr>
-      <a:lvl2pPr marL="457200" algn="l" defTabSz="914400" rtl="0" eaLnBrk="1" latinLnBrk="0" hangingPunct="1">
-        <a:defRPr sz="1800" kern="1200">
+      <a:lvl2pPr marL="591297" algn="l" defTabSz="1182594" rtl="0" eaLnBrk="1" latinLnBrk="0" hangingPunct="1">
+        <a:defRPr sz="2328" kern="1200">
           <a:solidFill>
             <a:schemeClr val="tx1"/>
           </a:solidFill>
@@ -2872,8 +2879,8 @@
           <a:cs typeface="+mn-cs"/>
         </a:defRPr>
       </a:lvl2pPr>
-      <a:lvl3pPr marL="914400" algn="l" defTabSz="914400" rtl="0" eaLnBrk="1" latinLnBrk="0" hangingPunct="1">
-        <a:defRPr sz="1800" kern="1200">
+      <a:lvl3pPr marL="1182594" algn="l" defTabSz="1182594" rtl="0" eaLnBrk="1" latinLnBrk="0" hangingPunct="1">
+        <a:defRPr sz="2328" kern="1200">
           <a:solidFill>
             <a:schemeClr val="tx1"/>
           </a:solidFill>
@@ -2882,8 +2889,8 @@
           <a:cs typeface="+mn-cs"/>
         </a:defRPr>
       </a:lvl3pPr>
-      <a:lvl4pPr marL="1371600" algn="l" defTabSz="914400" rtl="0" eaLnBrk="1" latinLnBrk="0" hangingPunct="1">
-        <a:defRPr sz="1800" kern="1200">
+      <a:lvl4pPr marL="1773890" algn="l" defTabSz="1182594" rtl="0" eaLnBrk="1" latinLnBrk="0" hangingPunct="1">
+        <a:defRPr sz="2328" kern="1200">
           <a:solidFill>
             <a:schemeClr val="tx1"/>
           </a:solidFill>
@@ -2892,8 +2899,8 @@
           <a:cs typeface="+mn-cs"/>
         </a:defRPr>
       </a:lvl4pPr>
-      <a:lvl5pPr marL="1828800" algn="l" defTabSz="914400" rtl="0" eaLnBrk="1" latinLnBrk="0" hangingPunct="1">
-        <a:defRPr sz="1800" kern="1200">
+      <a:lvl5pPr marL="2365187" algn="l" defTabSz="1182594" rtl="0" eaLnBrk="1" latinLnBrk="0" hangingPunct="1">
+        <a:defRPr sz="2328" kern="1200">
           <a:solidFill>
             <a:schemeClr val="tx1"/>
           </a:solidFill>
@@ -2902,8 +2909,8 @@
           <a:cs typeface="+mn-cs"/>
         </a:defRPr>
       </a:lvl5pPr>
-      <a:lvl6pPr marL="2286000" algn="l" defTabSz="914400" rtl="0" eaLnBrk="1" latinLnBrk="0" hangingPunct="1">
-        <a:defRPr sz="1800" kern="1200">
+      <a:lvl6pPr marL="2956484" algn="l" defTabSz="1182594" rtl="0" eaLnBrk="1" latinLnBrk="0" hangingPunct="1">
+        <a:defRPr sz="2328" kern="1200">
           <a:solidFill>
             <a:schemeClr val="tx1"/>
           </a:solidFill>
@@ -2912,8 +2919,8 @@
           <a:cs typeface="+mn-cs"/>
         </a:defRPr>
       </a:lvl6pPr>
-      <a:lvl7pPr marL="2743200" algn="l" defTabSz="914400" rtl="0" eaLnBrk="1" latinLnBrk="0" hangingPunct="1">
-        <a:defRPr sz="1800" kern="1200">
+      <a:lvl7pPr marL="3547781" algn="l" defTabSz="1182594" rtl="0" eaLnBrk="1" latinLnBrk="0" hangingPunct="1">
+        <a:defRPr sz="2328" kern="1200">
           <a:solidFill>
             <a:schemeClr val="tx1"/>
           </a:solidFill>
@@ -2922,8 +2929,8 @@
           <a:cs typeface="+mn-cs"/>
         </a:defRPr>
       </a:lvl7pPr>
-      <a:lvl8pPr marL="3200400" algn="l" defTabSz="914400" rtl="0" eaLnBrk="1" latinLnBrk="0" hangingPunct="1">
-        <a:defRPr sz="1800" kern="1200">
+      <a:lvl8pPr marL="4139077" algn="l" defTabSz="1182594" rtl="0" eaLnBrk="1" latinLnBrk="0" hangingPunct="1">
+        <a:defRPr sz="2328" kern="1200">
           <a:solidFill>
             <a:schemeClr val="tx1"/>
           </a:solidFill>
@@ -2932,8 +2939,8 @@
           <a:cs typeface="+mn-cs"/>
         </a:defRPr>
       </a:lvl8pPr>
-      <a:lvl9pPr marL="3657600" algn="l" defTabSz="914400" rtl="0" eaLnBrk="1" latinLnBrk="0" hangingPunct="1">
-        <a:defRPr sz="1800" kern="1200">
+      <a:lvl9pPr marL="4730374" algn="l" defTabSz="1182594" rtl="0" eaLnBrk="1" latinLnBrk="0" hangingPunct="1">
+        <a:defRPr sz="2328" kern="1200">
           <a:solidFill>
             <a:schemeClr val="tx1"/>
           </a:solidFill>
@@ -2964,158 +2971,71 @@
           <a:chExt cx="0" cy="0"/>
         </a:xfrm>
       </p:grpSpPr>
-      <p:sp>
-        <p:nvSpPr>
-          <p:cNvPr id="4" name="Rectangle 3"/>
-          <p:cNvSpPr/>
+      <p:pic>
+        <p:nvPicPr>
+          <p:cNvPr id="12" name="Picture 11"/>
+          <p:cNvPicPr>
+            <a:picLocks noChangeAspect="1"/>
+          </p:cNvPicPr>
           <p:nvPr/>
-        </p:nvSpPr>
+        </p:nvPicPr>
+        <p:blipFill rotWithShape="1">
+          <a:blip r:embed="rId2"/>
+          <a:srcRect t="16453" r="36751" b="67547"/>
+          <a:stretch/>
+        </p:blipFill>
         <p:spPr>
           <a:xfrm>
-            <a:off x="2529157" y="1007374"/>
-            <a:ext cx="5762445" cy="1423358"/>
+            <a:off x="2764922" y="4026735"/>
+            <a:ext cx="6628930" cy="943268"/>
           </a:xfrm>
           <a:prstGeom prst="rect">
             <a:avLst/>
           </a:prstGeom>
-          <a:noFill/>
-          <a:ln>
+        </p:spPr>
+      </p:pic>
+      <p:pic>
+        <p:nvPicPr>
+          <p:cNvPr id="2" name="Picture 1"/>
+          <p:cNvPicPr>
+            <a:picLocks noChangeAspect="1"/>
+          </p:cNvPicPr>
+          <p:nvPr/>
+        </p:nvPicPr>
+        <p:blipFill rotWithShape="1">
+          <a:blip r:embed="rId3"/>
+          <a:srcRect l="49271" t="39445" r="11979" b="46666"/>
+          <a:stretch/>
+        </p:blipFill>
+        <p:spPr>
+          <a:xfrm>
+            <a:off x="2529157" y="1766744"/>
+            <a:ext cx="7086600" cy="1428750"/>
+          </a:xfrm>
+          <a:prstGeom prst="rect">
+            <a:avLst/>
+          </a:prstGeom>
+        </p:spPr>
+      </p:pic>
+      <p:cxnSp>
+        <p:nvCxnSpPr>
+          <p:cNvPr id="34" name="Straight Arrow Connector 33"/>
+          <p:cNvCxnSpPr/>
+          <p:nvPr/>
+        </p:nvCxnSpPr>
+        <p:spPr>
+          <a:xfrm>
+            <a:off x="1763487" y="3292587"/>
+            <a:ext cx="8193315" cy="40482"/>
+          </a:xfrm>
+          <a:prstGeom prst="straightConnector1">
+            <a:avLst/>
+          </a:prstGeom>
+          <a:ln w="19050">
             <a:solidFill>
               <a:schemeClr val="tx1"/>
             </a:solidFill>
-          </a:ln>
-        </p:spPr>
-        <p:style>
-          <a:lnRef idx="2">
-            <a:schemeClr val="accent1">
-              <a:shade val="50000"/>
-            </a:schemeClr>
-          </a:lnRef>
-          <a:fillRef idx="1">
-            <a:schemeClr val="accent1"/>
-          </a:fillRef>
-          <a:effectRef idx="0">
-            <a:schemeClr val="accent1"/>
-          </a:effectRef>
-          <a:fontRef idx="minor">
-            <a:schemeClr val="lt1"/>
-          </a:fontRef>
-        </p:style>
-        <p:txBody>
-          <a:bodyPr rtlCol="0" anchor="ctr"/>
-          <a:lstStyle/>
-          <a:p>
-            <a:pPr algn="ctr"/>
-            <a:endParaRPr lang="en-US"/>
-          </a:p>
-        </p:txBody>
-      </p:sp>
-      <p:sp>
-        <p:nvSpPr>
-          <p:cNvPr id="5" name="Isosceles Triangle 4"/>
-          <p:cNvSpPr/>
-          <p:nvPr/>
-        </p:nvSpPr>
-        <p:spPr>
-          <a:xfrm rot="5400000">
-            <a:off x="8639535" y="654589"/>
-            <a:ext cx="1423358" cy="2128927"/>
-          </a:xfrm>
-          <a:prstGeom prst="triangle">
-            <a:avLst/>
-          </a:prstGeom>
-          <a:ln>
-            <a:noFill/>
-          </a:ln>
-        </p:spPr>
-        <p:style>
-          <a:lnRef idx="2">
-            <a:schemeClr val="accent1">
-              <a:shade val="50000"/>
-            </a:schemeClr>
-          </a:lnRef>
-          <a:fillRef idx="1">
-            <a:schemeClr val="accent1"/>
-          </a:fillRef>
-          <a:effectRef idx="0">
-            <a:schemeClr val="accent1"/>
-          </a:effectRef>
-          <a:fontRef idx="minor">
-            <a:schemeClr val="lt1"/>
-          </a:fontRef>
-        </p:style>
-        <p:txBody>
-          <a:bodyPr rtlCol="0" anchor="ctr"/>
-          <a:lstStyle/>
-          <a:p>
-            <a:pPr algn="ctr"/>
-            <a:endParaRPr lang="en-US"/>
-          </a:p>
-        </p:txBody>
-      </p:sp>
-      <p:sp>
-        <p:nvSpPr>
-          <p:cNvPr id="6" name="Rectangle 5"/>
-          <p:cNvSpPr/>
-          <p:nvPr/>
-        </p:nvSpPr>
-        <p:spPr>
-          <a:xfrm>
-            <a:off x="7934325" y="1366627"/>
-            <a:ext cx="352425" cy="704850"/>
-          </a:xfrm>
-          <a:prstGeom prst="rect">
-            <a:avLst/>
-          </a:prstGeom>
-          <a:ln>
-            <a:noFill/>
-          </a:ln>
-        </p:spPr>
-        <p:style>
-          <a:lnRef idx="2">
-            <a:schemeClr val="accent1">
-              <a:shade val="50000"/>
-            </a:schemeClr>
-          </a:lnRef>
-          <a:fillRef idx="1">
-            <a:schemeClr val="accent1"/>
-          </a:fillRef>
-          <a:effectRef idx="0">
-            <a:schemeClr val="accent1"/>
-          </a:effectRef>
-          <a:fontRef idx="minor">
-            <a:schemeClr val="lt1"/>
-          </a:fontRef>
-        </p:style>
-        <p:txBody>
-          <a:bodyPr rtlCol="0" anchor="ctr"/>
-          <a:lstStyle/>
-          <a:p>
-            <a:pPr algn="ctr"/>
-            <a:endParaRPr lang="en-US"/>
-          </a:p>
-        </p:txBody>
-      </p:sp>
-      <p:cxnSp>
-        <p:nvCxnSpPr>
-          <p:cNvPr id="8" name="Straight Connector 7"/>
-          <p:cNvCxnSpPr>
-            <a:stCxn id="4" idx="1"/>
-          </p:cNvCxnSpPr>
-          <p:nvPr/>
-        </p:nvCxnSpPr>
-        <p:spPr>
-          <a:xfrm>
-            <a:off x="2529157" y="1719053"/>
-            <a:ext cx="147548" cy="618724"/>
-          </a:xfrm>
-          <a:prstGeom prst="line">
-            <a:avLst/>
-          </a:prstGeom>
-          <a:ln>
-            <a:solidFill>
-              <a:schemeClr val="tx1"/>
-            </a:solidFill>
+            <a:tailEnd type="arrow" w="lg" len="lg"/>
           </a:ln>
         </p:spPr>
         <p:style>
@@ -3133,24 +3053,54 @@
           </a:fontRef>
         </p:style>
       </p:cxnSp>
+      <p:sp>
+        <p:nvSpPr>
+          <p:cNvPr id="35" name="TextBox 34"/>
+          <p:cNvSpPr txBox="1"/>
+          <p:nvPr/>
+        </p:nvSpPr>
+        <p:spPr>
+          <a:xfrm>
+            <a:off x="9474169" y="2151224"/>
+            <a:ext cx="3483429" cy="523220"/>
+          </a:xfrm>
+          <a:prstGeom prst="rect">
+            <a:avLst/>
+          </a:prstGeom>
+          <a:noFill/>
+        </p:spPr>
+        <p:txBody>
+          <a:bodyPr wrap="square" rtlCol="0">
+            <a:spAutoFit/>
+          </a:bodyPr>
+          <a:lstStyle/>
+          <a:p>
+            <a:r>
+              <a:rPr lang="en-US" sz="2800" dirty="0"/>
+              <a:t>x</a:t>
+            </a:r>
+          </a:p>
+        </p:txBody>
+      </p:sp>
       <p:cxnSp>
         <p:nvCxnSpPr>
-          <p:cNvPr id="16" name="Straight Connector 15"/>
+          <p:cNvPr id="38" name="Straight Connector 37"/>
           <p:cNvCxnSpPr/>
           <p:nvPr/>
         </p:nvCxnSpPr>
         <p:spPr>
           <a:xfrm flipV="1">
-            <a:off x="2676705" y="1130300"/>
-            <a:ext cx="0" cy="1207477"/>
+            <a:off x="5339400" y="2023428"/>
+            <a:ext cx="0" cy="1309641"/>
           </a:xfrm>
           <a:prstGeom prst="line">
             <a:avLst/>
           </a:prstGeom>
-          <a:ln>
+          <a:ln w="12700">
             <a:solidFill>
               <a:schemeClr val="tx1"/>
             </a:solidFill>
+            <a:prstDash val="sysDash"/>
           </a:ln>
         </p:spPr>
         <p:style>
@@ -3168,521 +3118,15 @@
           </a:fontRef>
         </p:style>
       </p:cxnSp>
-      <p:cxnSp>
-        <p:nvCxnSpPr>
-          <p:cNvPr id="19" name="Straight Connector 18"/>
-          <p:cNvCxnSpPr/>
-          <p:nvPr/>
-        </p:nvCxnSpPr>
-        <p:spPr>
-          <a:xfrm>
-            <a:off x="2681557" y="1103594"/>
-            <a:ext cx="142696" cy="1234183"/>
-          </a:xfrm>
-          <a:prstGeom prst="line">
-            <a:avLst/>
-          </a:prstGeom>
-          <a:ln>
-            <a:solidFill>
-              <a:schemeClr val="tx1"/>
-            </a:solidFill>
-          </a:ln>
-        </p:spPr>
-        <p:style>
-          <a:lnRef idx="1">
-            <a:schemeClr val="accent1"/>
-          </a:lnRef>
-          <a:fillRef idx="0">
-            <a:schemeClr val="accent1"/>
-          </a:fillRef>
-          <a:effectRef idx="0">
-            <a:schemeClr val="accent1"/>
-          </a:effectRef>
-          <a:fontRef idx="minor">
-            <a:schemeClr val="tx1"/>
-          </a:fontRef>
-        </p:style>
-      </p:cxnSp>
-      <p:cxnSp>
-        <p:nvCxnSpPr>
-          <p:cNvPr id="21" name="Straight Connector 20"/>
-          <p:cNvCxnSpPr/>
-          <p:nvPr/>
-        </p:nvCxnSpPr>
-        <p:spPr>
-          <a:xfrm flipV="1">
-            <a:off x="2823243" y="1118571"/>
-            <a:ext cx="0" cy="1207477"/>
-          </a:xfrm>
-          <a:prstGeom prst="line">
-            <a:avLst/>
-          </a:prstGeom>
-          <a:ln>
-            <a:solidFill>
-              <a:schemeClr val="tx1"/>
-            </a:solidFill>
-          </a:ln>
-        </p:spPr>
-        <p:style>
-          <a:lnRef idx="1">
-            <a:schemeClr val="accent1"/>
-          </a:lnRef>
-          <a:fillRef idx="0">
-            <a:schemeClr val="accent1"/>
-          </a:fillRef>
-          <a:effectRef idx="0">
-            <a:schemeClr val="accent1"/>
-          </a:effectRef>
-          <a:fontRef idx="minor">
-            <a:schemeClr val="tx1"/>
-          </a:fontRef>
-        </p:style>
-      </p:cxnSp>
-      <p:cxnSp>
-        <p:nvCxnSpPr>
-          <p:cNvPr id="22" name="Straight Connector 21"/>
-          <p:cNvCxnSpPr/>
-          <p:nvPr/>
-        </p:nvCxnSpPr>
-        <p:spPr>
-          <a:xfrm>
-            <a:off x="2828095" y="1091865"/>
-            <a:ext cx="142696" cy="1234183"/>
-          </a:xfrm>
-          <a:prstGeom prst="line">
-            <a:avLst/>
-          </a:prstGeom>
-          <a:ln>
-            <a:solidFill>
-              <a:schemeClr val="tx1"/>
-            </a:solidFill>
-          </a:ln>
-        </p:spPr>
-        <p:style>
-          <a:lnRef idx="1">
-            <a:schemeClr val="accent1"/>
-          </a:lnRef>
-          <a:fillRef idx="0">
-            <a:schemeClr val="accent1"/>
-          </a:fillRef>
-          <a:effectRef idx="0">
-            <a:schemeClr val="accent1"/>
-          </a:effectRef>
-          <a:fontRef idx="minor">
-            <a:schemeClr val="tx1"/>
-          </a:fontRef>
-        </p:style>
-      </p:cxnSp>
-      <p:cxnSp>
-        <p:nvCxnSpPr>
-          <p:cNvPr id="23" name="Straight Connector 22"/>
-          <p:cNvCxnSpPr/>
-          <p:nvPr/>
-        </p:nvCxnSpPr>
-        <p:spPr>
-          <a:xfrm flipV="1">
-            <a:off x="2969784" y="1112716"/>
-            <a:ext cx="0" cy="1207477"/>
-          </a:xfrm>
-          <a:prstGeom prst="line">
-            <a:avLst/>
-          </a:prstGeom>
-          <a:ln>
-            <a:solidFill>
-              <a:schemeClr val="tx1"/>
-            </a:solidFill>
-          </a:ln>
-        </p:spPr>
-        <p:style>
-          <a:lnRef idx="1">
-            <a:schemeClr val="accent1"/>
-          </a:lnRef>
-          <a:fillRef idx="0">
-            <a:schemeClr val="accent1"/>
-          </a:fillRef>
-          <a:effectRef idx="0">
-            <a:schemeClr val="accent1"/>
-          </a:effectRef>
-          <a:fontRef idx="minor">
-            <a:schemeClr val="tx1"/>
-          </a:fontRef>
-        </p:style>
-      </p:cxnSp>
-      <p:cxnSp>
-        <p:nvCxnSpPr>
-          <p:cNvPr id="24" name="Straight Connector 23"/>
-          <p:cNvCxnSpPr/>
-          <p:nvPr/>
-        </p:nvCxnSpPr>
-        <p:spPr>
-          <a:xfrm>
-            <a:off x="2974636" y="1086010"/>
-            <a:ext cx="142696" cy="1234183"/>
-          </a:xfrm>
-          <a:prstGeom prst="line">
-            <a:avLst/>
-          </a:prstGeom>
-          <a:ln>
-            <a:solidFill>
-              <a:schemeClr val="tx1"/>
-            </a:solidFill>
-          </a:ln>
-        </p:spPr>
-        <p:style>
-          <a:lnRef idx="1">
-            <a:schemeClr val="accent1"/>
-          </a:lnRef>
-          <a:fillRef idx="0">
-            <a:schemeClr val="accent1"/>
-          </a:fillRef>
-          <a:effectRef idx="0">
-            <a:schemeClr val="accent1"/>
-          </a:effectRef>
-          <a:fontRef idx="minor">
-            <a:schemeClr val="tx1"/>
-          </a:fontRef>
-        </p:style>
-      </p:cxnSp>
-      <p:cxnSp>
-        <p:nvCxnSpPr>
-          <p:cNvPr id="25" name="Straight Connector 24"/>
-          <p:cNvCxnSpPr/>
-          <p:nvPr/>
-        </p:nvCxnSpPr>
-        <p:spPr>
-          <a:xfrm flipV="1">
-            <a:off x="3110460" y="1112715"/>
-            <a:ext cx="0" cy="1207477"/>
-          </a:xfrm>
-          <a:prstGeom prst="line">
-            <a:avLst/>
-          </a:prstGeom>
-          <a:ln>
-            <a:solidFill>
-              <a:schemeClr val="tx1"/>
-            </a:solidFill>
-          </a:ln>
-        </p:spPr>
-        <p:style>
-          <a:lnRef idx="1">
-            <a:schemeClr val="accent1"/>
-          </a:lnRef>
-          <a:fillRef idx="0">
-            <a:schemeClr val="accent1"/>
-          </a:fillRef>
-          <a:effectRef idx="0">
-            <a:schemeClr val="accent1"/>
-          </a:effectRef>
-          <a:fontRef idx="minor">
-            <a:schemeClr val="tx1"/>
-          </a:fontRef>
-        </p:style>
-      </p:cxnSp>
-      <p:cxnSp>
-        <p:nvCxnSpPr>
-          <p:cNvPr id="26" name="Straight Connector 25"/>
-          <p:cNvCxnSpPr/>
-          <p:nvPr/>
-        </p:nvCxnSpPr>
-        <p:spPr>
-          <a:xfrm>
-            <a:off x="3115312" y="1086009"/>
-            <a:ext cx="142696" cy="1234183"/>
-          </a:xfrm>
-          <a:prstGeom prst="line">
-            <a:avLst/>
-          </a:prstGeom>
-          <a:ln>
-            <a:solidFill>
-              <a:schemeClr val="tx1"/>
-            </a:solidFill>
-          </a:ln>
-        </p:spPr>
-        <p:style>
-          <a:lnRef idx="1">
-            <a:schemeClr val="accent1"/>
-          </a:lnRef>
-          <a:fillRef idx="0">
-            <a:schemeClr val="accent1"/>
-          </a:fillRef>
-          <a:effectRef idx="0">
-            <a:schemeClr val="accent1"/>
-          </a:effectRef>
-          <a:fontRef idx="minor">
-            <a:schemeClr val="tx1"/>
-          </a:fontRef>
-        </p:style>
-      </p:cxnSp>
-      <p:cxnSp>
-        <p:nvCxnSpPr>
-          <p:cNvPr id="27" name="Straight Connector 26"/>
-          <p:cNvCxnSpPr/>
-          <p:nvPr/>
-        </p:nvCxnSpPr>
-        <p:spPr>
-          <a:xfrm flipV="1">
-            <a:off x="3256998" y="1100986"/>
-            <a:ext cx="0" cy="1207477"/>
-          </a:xfrm>
-          <a:prstGeom prst="line">
-            <a:avLst/>
-          </a:prstGeom>
-          <a:ln>
-            <a:solidFill>
-              <a:schemeClr val="tx1"/>
-            </a:solidFill>
-          </a:ln>
-        </p:spPr>
-        <p:style>
-          <a:lnRef idx="1">
-            <a:schemeClr val="accent1"/>
-          </a:lnRef>
-          <a:fillRef idx="0">
-            <a:schemeClr val="accent1"/>
-          </a:fillRef>
-          <a:effectRef idx="0">
-            <a:schemeClr val="accent1"/>
-          </a:effectRef>
-          <a:fontRef idx="minor">
-            <a:schemeClr val="tx1"/>
-          </a:fontRef>
-        </p:style>
-      </p:cxnSp>
-      <p:cxnSp>
-        <p:nvCxnSpPr>
-          <p:cNvPr id="28" name="Straight Connector 27"/>
-          <p:cNvCxnSpPr/>
-          <p:nvPr/>
-        </p:nvCxnSpPr>
-        <p:spPr>
-          <a:xfrm>
-            <a:off x="3261850" y="1074280"/>
-            <a:ext cx="142696" cy="1234183"/>
-          </a:xfrm>
-          <a:prstGeom prst="line">
-            <a:avLst/>
-          </a:prstGeom>
-          <a:ln>
-            <a:solidFill>
-              <a:schemeClr val="tx1"/>
-            </a:solidFill>
-          </a:ln>
-        </p:spPr>
-        <p:style>
-          <a:lnRef idx="1">
-            <a:schemeClr val="accent1"/>
-          </a:lnRef>
-          <a:fillRef idx="0">
-            <a:schemeClr val="accent1"/>
-          </a:fillRef>
-          <a:effectRef idx="0">
-            <a:schemeClr val="accent1"/>
-          </a:effectRef>
-          <a:fontRef idx="minor">
-            <a:schemeClr val="tx1"/>
-          </a:fontRef>
-        </p:style>
-      </p:cxnSp>
-      <p:cxnSp>
-        <p:nvCxnSpPr>
-          <p:cNvPr id="29" name="Straight Connector 28"/>
-          <p:cNvCxnSpPr/>
-          <p:nvPr/>
-        </p:nvCxnSpPr>
-        <p:spPr>
-          <a:xfrm flipV="1">
-            <a:off x="3403539" y="1095131"/>
-            <a:ext cx="0" cy="1207477"/>
-          </a:xfrm>
-          <a:prstGeom prst="line">
-            <a:avLst/>
-          </a:prstGeom>
-          <a:ln>
-            <a:solidFill>
-              <a:schemeClr val="tx1"/>
-            </a:solidFill>
-          </a:ln>
-        </p:spPr>
-        <p:style>
-          <a:lnRef idx="1">
-            <a:schemeClr val="accent1"/>
-          </a:lnRef>
-          <a:fillRef idx="0">
-            <a:schemeClr val="accent1"/>
-          </a:fillRef>
-          <a:effectRef idx="0">
-            <a:schemeClr val="accent1"/>
-          </a:effectRef>
-          <a:fontRef idx="minor">
-            <a:schemeClr val="tx1"/>
-          </a:fontRef>
-        </p:style>
-      </p:cxnSp>
-      <p:cxnSp>
-        <p:nvCxnSpPr>
-          <p:cNvPr id="30" name="Straight Connector 29"/>
-          <p:cNvCxnSpPr/>
-          <p:nvPr/>
-        </p:nvCxnSpPr>
-        <p:spPr>
-          <a:xfrm>
-            <a:off x="3408391" y="1068425"/>
-            <a:ext cx="142696" cy="1234183"/>
-          </a:xfrm>
-          <a:prstGeom prst="line">
-            <a:avLst/>
-          </a:prstGeom>
-          <a:ln>
-            <a:solidFill>
-              <a:schemeClr val="tx1"/>
-            </a:solidFill>
-          </a:ln>
-        </p:spPr>
-        <p:style>
-          <a:lnRef idx="1">
-            <a:schemeClr val="accent1"/>
-          </a:lnRef>
-          <a:fillRef idx="0">
-            <a:schemeClr val="accent1"/>
-          </a:fillRef>
-          <a:effectRef idx="0">
-            <a:schemeClr val="accent1"/>
-          </a:effectRef>
-          <a:fontRef idx="minor">
-            <a:schemeClr val="tx1"/>
-          </a:fontRef>
-        </p:style>
-      </p:cxnSp>
-      <p:cxnSp>
-        <p:nvCxnSpPr>
-          <p:cNvPr id="31" name="Straight Connector 30"/>
-          <p:cNvCxnSpPr/>
-          <p:nvPr/>
-        </p:nvCxnSpPr>
-        <p:spPr>
-          <a:xfrm flipV="1">
-            <a:off x="3548319" y="1102751"/>
-            <a:ext cx="0" cy="1207477"/>
-          </a:xfrm>
-          <a:prstGeom prst="line">
-            <a:avLst/>
-          </a:prstGeom>
-          <a:ln>
-            <a:solidFill>
-              <a:schemeClr val="tx1"/>
-            </a:solidFill>
-          </a:ln>
-        </p:spPr>
-        <p:style>
-          <a:lnRef idx="1">
-            <a:schemeClr val="accent1"/>
-          </a:lnRef>
-          <a:fillRef idx="0">
-            <a:schemeClr val="accent1"/>
-          </a:fillRef>
-          <a:effectRef idx="0">
-            <a:schemeClr val="accent1"/>
-          </a:effectRef>
-          <a:fontRef idx="minor">
-            <a:schemeClr val="tx1"/>
-          </a:fontRef>
-        </p:style>
-      </p:cxnSp>
-      <p:sp>
-        <p:nvSpPr>
-          <p:cNvPr id="32" name="Oval 31"/>
-          <p:cNvSpPr/>
-          <p:nvPr/>
-        </p:nvSpPr>
-        <p:spPr>
-          <a:xfrm>
-            <a:off x="4755181" y="1095131"/>
-            <a:ext cx="1233396" cy="1233396"/>
-          </a:xfrm>
-          <a:prstGeom prst="ellipse">
-            <a:avLst/>
-          </a:prstGeom>
-          <a:solidFill>
-            <a:schemeClr val="bg2">
-              <a:lumMod val="75000"/>
-            </a:schemeClr>
-          </a:solidFill>
-          <a:ln>
-            <a:solidFill>
-              <a:schemeClr val="tx1"/>
-            </a:solidFill>
-          </a:ln>
-        </p:spPr>
-        <p:style>
-          <a:lnRef idx="2">
-            <a:schemeClr val="accent1">
-              <a:shade val="50000"/>
-            </a:schemeClr>
-          </a:lnRef>
-          <a:fillRef idx="1">
-            <a:schemeClr val="accent1"/>
-          </a:fillRef>
-          <a:effectRef idx="0">
-            <a:schemeClr val="accent1"/>
-          </a:effectRef>
-          <a:fontRef idx="minor">
-            <a:schemeClr val="lt1"/>
-          </a:fontRef>
-        </p:style>
-        <p:txBody>
-          <a:bodyPr rtlCol="0" anchor="ctr"/>
-          <a:lstStyle/>
-          <a:p>
-            <a:pPr algn="ctr"/>
-            <a:endParaRPr lang="en-US"/>
-          </a:p>
-        </p:txBody>
-      </p:sp>
-      <p:cxnSp>
-        <p:nvCxnSpPr>
-          <p:cNvPr id="34" name="Straight Arrow Connector 33"/>
-          <p:cNvCxnSpPr/>
-          <p:nvPr/>
-        </p:nvCxnSpPr>
-        <p:spPr>
-          <a:xfrm>
-            <a:off x="1763485" y="2915555"/>
-            <a:ext cx="9503229" cy="0"/>
-          </a:xfrm>
-          <a:prstGeom prst="straightConnector1">
-            <a:avLst/>
-          </a:prstGeom>
-          <a:ln w="19050">
-            <a:solidFill>
-              <a:schemeClr val="tx1"/>
-            </a:solidFill>
-            <a:tailEnd type="arrow" w="lg" len="lg"/>
-          </a:ln>
-        </p:spPr>
-        <p:style>
-          <a:lnRef idx="1">
-            <a:schemeClr val="accent1"/>
-          </a:lnRef>
-          <a:fillRef idx="0">
-            <a:schemeClr val="accent1"/>
-          </a:fillRef>
-          <a:effectRef idx="0">
-            <a:schemeClr val="accent1"/>
-          </a:effectRef>
-          <a:fontRef idx="minor">
-            <a:schemeClr val="tx1"/>
-          </a:fontRef>
-        </p:style>
-      </p:cxnSp>
-      <p:sp>
-        <p:nvSpPr>
-          <p:cNvPr id="35" name="TextBox 34"/>
+      <p:sp>
+        <p:nvSpPr>
+          <p:cNvPr id="45" name="TextBox 44"/>
           <p:cNvSpPr txBox="1"/>
           <p:nvPr/>
         </p:nvSpPr>
         <p:spPr>
           <a:xfrm>
-            <a:off x="10803436" y="2821943"/>
+            <a:off x="5177501" y="3170990"/>
             <a:ext cx="3483429" cy="523220"/>
           </a:xfrm>
           <a:prstGeom prst="rect">
@@ -3697,76 +3141,11 @@
           <a:lstStyle/>
           <a:p>
             <a:r>
-              <a:rPr lang="en-US" sz="2800" dirty="0"/>
+              <a:rPr lang="en-US" sz="2800" dirty="0" err="1"/>
               <a:t>x</a:t>
             </a:r>
-          </a:p>
-        </p:txBody>
-      </p:sp>
-      <p:cxnSp>
-        <p:nvCxnSpPr>
-          <p:cNvPr id="38" name="Straight Connector 37"/>
-          <p:cNvCxnSpPr/>
-          <p:nvPr/>
-        </p:nvCxnSpPr>
-        <p:spPr>
-          <a:xfrm flipV="1">
-            <a:off x="5371879" y="1698869"/>
-            <a:ext cx="0" cy="1309641"/>
-          </a:xfrm>
-          <a:prstGeom prst="line">
-            <a:avLst/>
-          </a:prstGeom>
-          <a:ln w="12700">
-            <a:solidFill>
-              <a:schemeClr val="tx1"/>
-            </a:solidFill>
-            <a:prstDash val="sysDash"/>
-          </a:ln>
-        </p:spPr>
-        <p:style>
-          <a:lnRef idx="1">
-            <a:schemeClr val="accent1"/>
-          </a:lnRef>
-          <a:fillRef idx="0">
-            <a:schemeClr val="accent1"/>
-          </a:fillRef>
-          <a:effectRef idx="0">
-            <a:schemeClr val="accent1"/>
-          </a:effectRef>
-          <a:fontRef idx="minor">
-            <a:schemeClr val="tx1"/>
-          </a:fontRef>
-        </p:style>
-      </p:cxnSp>
-      <p:sp>
-        <p:nvSpPr>
-          <p:cNvPr id="45" name="TextBox 44"/>
-          <p:cNvSpPr txBox="1"/>
-          <p:nvPr/>
-        </p:nvSpPr>
-        <p:spPr>
-          <a:xfrm>
-            <a:off x="5199271" y="2870161"/>
-            <a:ext cx="3483429" cy="523220"/>
-          </a:xfrm>
-          <a:prstGeom prst="rect">
-            <a:avLst/>
-          </a:prstGeom>
-          <a:noFill/>
-        </p:spPr>
-        <p:txBody>
-          <a:bodyPr wrap="square" rtlCol="0">
-            <a:spAutoFit/>
-          </a:bodyPr>
-          <a:lstStyle/>
-          <a:p>
-            <a:r>
-              <a:rPr lang="en-US" sz="2800" dirty="0" err="1" smtClean="0"/>
-              <a:t>x</a:t>
-            </a:r>
-            <a:r>
-              <a:rPr lang="en-US" dirty="0" err="1" smtClean="0"/>
+            <a:r>
+              <a:rPr lang="en-US" dirty="0" err="1"/>
               <a:t>s</a:t>
             </a:r>
             <a:endParaRPr lang="en-US" dirty="0"/>
@@ -3780,9 +3159,9 @@
           <p:nvPr/>
         </p:nvCxnSpPr>
         <p:spPr>
-          <a:xfrm flipH="1">
-            <a:off x="8110537" y="380865"/>
-            <a:ext cx="180500" cy="1265531"/>
+          <a:xfrm>
+            <a:off x="6919215" y="3881447"/>
+            <a:ext cx="385101" cy="639110"/>
           </a:xfrm>
           <a:prstGeom prst="straightConnector1">
             <a:avLst/>
@@ -3817,7 +3196,7 @@
         </p:nvCxnSpPr>
         <p:spPr>
           <a:xfrm flipH="1">
-            <a:off x="5592131" y="567945"/>
+            <a:off x="5439733" y="1456608"/>
             <a:ext cx="145983" cy="846697"/>
           </a:xfrm>
           <a:prstGeom prst="straightConnector1">
@@ -3853,8 +3232,8 @@
         </p:nvCxnSpPr>
         <p:spPr>
           <a:xfrm>
-            <a:off x="3060946" y="610476"/>
-            <a:ext cx="232904" cy="881386"/>
+            <a:off x="3479740" y="1548161"/>
+            <a:ext cx="338855" cy="739287"/>
           </a:xfrm>
           <a:prstGeom prst="straightConnector1">
             <a:avLst/>
@@ -3889,7 +3268,7 @@
         </p:nvSpPr>
         <p:spPr>
           <a:xfrm>
-            <a:off x="4787900" y="177800"/>
+            <a:off x="4807478" y="1121080"/>
             <a:ext cx="3983037" cy="369332"/>
           </a:xfrm>
           <a:prstGeom prst="rect">
@@ -3904,8 +3283,8 @@
           <a:lstStyle/>
           <a:p>
             <a:r>
-              <a:rPr lang="en-US" dirty="0" smtClean="0"/>
-              <a:t>Magnetic sphere</a:t>
+              <a:rPr lang="en-US" dirty="0"/>
+              <a:t>Ferromagnetic sphere</a:t>
             </a:r>
             <a:endParaRPr lang="en-US" dirty="0"/>
           </a:p>
@@ -3919,7 +3298,7 @@
         </p:nvSpPr>
         <p:spPr>
           <a:xfrm>
-            <a:off x="7493000" y="0"/>
+            <a:off x="6175828" y="3512115"/>
             <a:ext cx="3983037" cy="369332"/>
           </a:xfrm>
           <a:prstGeom prst="rect">
@@ -3934,7 +3313,7 @@
           <a:lstStyle/>
           <a:p>
             <a:r>
-              <a:rPr lang="en-US" dirty="0" smtClean="0"/>
+              <a:rPr lang="en-US" dirty="0"/>
               <a:t>Impact plate</a:t>
             </a:r>
             <a:endParaRPr lang="en-US" dirty="0"/>
@@ -3949,7 +3328,7 @@
         </p:nvSpPr>
         <p:spPr>
           <a:xfrm>
-            <a:off x="2545364" y="254060"/>
+            <a:off x="2825413" y="1130282"/>
             <a:ext cx="3983037" cy="369332"/>
           </a:xfrm>
           <a:prstGeom prst="rect">
@@ -3964,684 +3343,10 @@
           <a:lstStyle/>
           <a:p>
             <a:r>
-              <a:rPr lang="en-US" dirty="0" smtClean="0"/>
+              <a:rPr lang="en-US" dirty="0"/>
               <a:t>Spring</a:t>
             </a:r>
             <a:endParaRPr lang="en-US" dirty="0"/>
-          </a:p>
-        </p:txBody>
-      </p:sp>
-      <p:sp>
-        <p:nvSpPr>
-          <p:cNvPr id="60" name="Rectangle 59"/>
-          <p:cNvSpPr/>
-          <p:nvPr/>
-        </p:nvSpPr>
-        <p:spPr>
-          <a:xfrm>
-            <a:off x="2529157" y="4042674"/>
-            <a:ext cx="5762445" cy="1423358"/>
-          </a:xfrm>
-          <a:prstGeom prst="rect">
-            <a:avLst/>
-          </a:prstGeom>
-          <a:noFill/>
-          <a:ln>
-            <a:solidFill>
-              <a:schemeClr val="tx1"/>
-            </a:solidFill>
-          </a:ln>
-        </p:spPr>
-        <p:style>
-          <a:lnRef idx="2">
-            <a:schemeClr val="accent1">
-              <a:shade val="50000"/>
-            </a:schemeClr>
-          </a:lnRef>
-          <a:fillRef idx="1">
-            <a:schemeClr val="accent1"/>
-          </a:fillRef>
-          <a:effectRef idx="0">
-            <a:schemeClr val="accent1"/>
-          </a:effectRef>
-          <a:fontRef idx="minor">
-            <a:schemeClr val="lt1"/>
-          </a:fontRef>
-        </p:style>
-        <p:txBody>
-          <a:bodyPr rtlCol="0" anchor="ctr"/>
-          <a:lstStyle/>
-          <a:p>
-            <a:pPr algn="ctr"/>
-            <a:endParaRPr lang="en-US"/>
-          </a:p>
-        </p:txBody>
-      </p:sp>
-      <p:sp>
-        <p:nvSpPr>
-          <p:cNvPr id="61" name="Isosceles Triangle 60"/>
-          <p:cNvSpPr/>
-          <p:nvPr/>
-        </p:nvSpPr>
-        <p:spPr>
-          <a:xfrm rot="5400000">
-            <a:off x="8639535" y="3689889"/>
-            <a:ext cx="1423358" cy="2128927"/>
-          </a:xfrm>
-          <a:prstGeom prst="triangle">
-            <a:avLst/>
-          </a:prstGeom>
-          <a:ln>
-            <a:noFill/>
-          </a:ln>
-        </p:spPr>
-        <p:style>
-          <a:lnRef idx="2">
-            <a:schemeClr val="accent1">
-              <a:shade val="50000"/>
-            </a:schemeClr>
-          </a:lnRef>
-          <a:fillRef idx="1">
-            <a:schemeClr val="accent1"/>
-          </a:fillRef>
-          <a:effectRef idx="0">
-            <a:schemeClr val="accent1"/>
-          </a:effectRef>
-          <a:fontRef idx="minor">
-            <a:schemeClr val="lt1"/>
-          </a:fontRef>
-        </p:style>
-        <p:txBody>
-          <a:bodyPr rtlCol="0" anchor="ctr"/>
-          <a:lstStyle/>
-          <a:p>
-            <a:pPr algn="ctr"/>
-            <a:endParaRPr lang="en-US"/>
-          </a:p>
-        </p:txBody>
-      </p:sp>
-      <p:sp>
-        <p:nvSpPr>
-          <p:cNvPr id="62" name="Rectangle 61"/>
-          <p:cNvSpPr/>
-          <p:nvPr/>
-        </p:nvSpPr>
-        <p:spPr>
-          <a:xfrm>
-            <a:off x="7934325" y="4401927"/>
-            <a:ext cx="352425" cy="704850"/>
-          </a:xfrm>
-          <a:prstGeom prst="rect">
-            <a:avLst/>
-          </a:prstGeom>
-          <a:ln>
-            <a:noFill/>
-          </a:ln>
-        </p:spPr>
-        <p:style>
-          <a:lnRef idx="2">
-            <a:schemeClr val="accent1">
-              <a:shade val="50000"/>
-            </a:schemeClr>
-          </a:lnRef>
-          <a:fillRef idx="1">
-            <a:schemeClr val="accent1"/>
-          </a:fillRef>
-          <a:effectRef idx="0">
-            <a:schemeClr val="accent1"/>
-          </a:effectRef>
-          <a:fontRef idx="minor">
-            <a:schemeClr val="lt1"/>
-          </a:fontRef>
-        </p:style>
-        <p:txBody>
-          <a:bodyPr rtlCol="0" anchor="ctr"/>
-          <a:lstStyle/>
-          <a:p>
-            <a:pPr algn="ctr"/>
-            <a:endParaRPr lang="en-US"/>
-          </a:p>
-        </p:txBody>
-      </p:sp>
-      <p:cxnSp>
-        <p:nvCxnSpPr>
-          <p:cNvPr id="63" name="Straight Connector 62"/>
-          <p:cNvCxnSpPr>
-            <a:stCxn id="60" idx="1"/>
-          </p:cNvCxnSpPr>
-          <p:nvPr/>
-        </p:nvCxnSpPr>
-        <p:spPr>
-          <a:xfrm>
-            <a:off x="2529157" y="4754353"/>
-            <a:ext cx="147548" cy="618724"/>
-          </a:xfrm>
-          <a:prstGeom prst="line">
-            <a:avLst/>
-          </a:prstGeom>
-          <a:ln>
-            <a:solidFill>
-              <a:schemeClr val="tx1"/>
-            </a:solidFill>
-          </a:ln>
-        </p:spPr>
-        <p:style>
-          <a:lnRef idx="1">
-            <a:schemeClr val="accent1"/>
-          </a:lnRef>
-          <a:fillRef idx="0">
-            <a:schemeClr val="accent1"/>
-          </a:fillRef>
-          <a:effectRef idx="0">
-            <a:schemeClr val="accent1"/>
-          </a:effectRef>
-          <a:fontRef idx="minor">
-            <a:schemeClr val="tx1"/>
-          </a:fontRef>
-        </p:style>
-      </p:cxnSp>
-      <p:cxnSp>
-        <p:nvCxnSpPr>
-          <p:cNvPr id="64" name="Straight Connector 63"/>
-          <p:cNvCxnSpPr/>
-          <p:nvPr/>
-        </p:nvCxnSpPr>
-        <p:spPr>
-          <a:xfrm flipV="1">
-            <a:off x="2676705" y="4165600"/>
-            <a:ext cx="0" cy="1207477"/>
-          </a:xfrm>
-          <a:prstGeom prst="line">
-            <a:avLst/>
-          </a:prstGeom>
-          <a:ln>
-            <a:solidFill>
-              <a:schemeClr val="tx1"/>
-            </a:solidFill>
-          </a:ln>
-        </p:spPr>
-        <p:style>
-          <a:lnRef idx="1">
-            <a:schemeClr val="accent1"/>
-          </a:lnRef>
-          <a:fillRef idx="0">
-            <a:schemeClr val="accent1"/>
-          </a:fillRef>
-          <a:effectRef idx="0">
-            <a:schemeClr val="accent1"/>
-          </a:effectRef>
-          <a:fontRef idx="minor">
-            <a:schemeClr val="tx1"/>
-          </a:fontRef>
-        </p:style>
-      </p:cxnSp>
-      <p:cxnSp>
-        <p:nvCxnSpPr>
-          <p:cNvPr id="65" name="Straight Connector 64"/>
-          <p:cNvCxnSpPr/>
-          <p:nvPr/>
-        </p:nvCxnSpPr>
-        <p:spPr>
-          <a:xfrm>
-            <a:off x="2681557" y="4138894"/>
-            <a:ext cx="142696" cy="1234183"/>
-          </a:xfrm>
-          <a:prstGeom prst="line">
-            <a:avLst/>
-          </a:prstGeom>
-          <a:ln>
-            <a:solidFill>
-              <a:schemeClr val="tx1"/>
-            </a:solidFill>
-          </a:ln>
-        </p:spPr>
-        <p:style>
-          <a:lnRef idx="1">
-            <a:schemeClr val="accent1"/>
-          </a:lnRef>
-          <a:fillRef idx="0">
-            <a:schemeClr val="accent1"/>
-          </a:fillRef>
-          <a:effectRef idx="0">
-            <a:schemeClr val="accent1"/>
-          </a:effectRef>
-          <a:fontRef idx="minor">
-            <a:schemeClr val="tx1"/>
-          </a:fontRef>
-        </p:style>
-      </p:cxnSp>
-      <p:cxnSp>
-        <p:nvCxnSpPr>
-          <p:cNvPr id="66" name="Straight Connector 65"/>
-          <p:cNvCxnSpPr/>
-          <p:nvPr/>
-        </p:nvCxnSpPr>
-        <p:spPr>
-          <a:xfrm flipV="1">
-            <a:off x="2823243" y="4153871"/>
-            <a:ext cx="0" cy="1207477"/>
-          </a:xfrm>
-          <a:prstGeom prst="line">
-            <a:avLst/>
-          </a:prstGeom>
-          <a:ln>
-            <a:solidFill>
-              <a:schemeClr val="tx1"/>
-            </a:solidFill>
-          </a:ln>
-        </p:spPr>
-        <p:style>
-          <a:lnRef idx="1">
-            <a:schemeClr val="accent1"/>
-          </a:lnRef>
-          <a:fillRef idx="0">
-            <a:schemeClr val="accent1"/>
-          </a:fillRef>
-          <a:effectRef idx="0">
-            <a:schemeClr val="accent1"/>
-          </a:effectRef>
-          <a:fontRef idx="minor">
-            <a:schemeClr val="tx1"/>
-          </a:fontRef>
-        </p:style>
-      </p:cxnSp>
-      <p:cxnSp>
-        <p:nvCxnSpPr>
-          <p:cNvPr id="67" name="Straight Connector 66"/>
-          <p:cNvCxnSpPr/>
-          <p:nvPr/>
-        </p:nvCxnSpPr>
-        <p:spPr>
-          <a:xfrm>
-            <a:off x="2828095" y="4127165"/>
-            <a:ext cx="142696" cy="1234183"/>
-          </a:xfrm>
-          <a:prstGeom prst="line">
-            <a:avLst/>
-          </a:prstGeom>
-          <a:ln>
-            <a:solidFill>
-              <a:schemeClr val="tx1"/>
-            </a:solidFill>
-          </a:ln>
-        </p:spPr>
-        <p:style>
-          <a:lnRef idx="1">
-            <a:schemeClr val="accent1"/>
-          </a:lnRef>
-          <a:fillRef idx="0">
-            <a:schemeClr val="accent1"/>
-          </a:fillRef>
-          <a:effectRef idx="0">
-            <a:schemeClr val="accent1"/>
-          </a:effectRef>
-          <a:fontRef idx="minor">
-            <a:schemeClr val="tx1"/>
-          </a:fontRef>
-        </p:style>
-      </p:cxnSp>
-      <p:cxnSp>
-        <p:nvCxnSpPr>
-          <p:cNvPr id="68" name="Straight Connector 67"/>
-          <p:cNvCxnSpPr/>
-          <p:nvPr/>
-        </p:nvCxnSpPr>
-        <p:spPr>
-          <a:xfrm flipV="1">
-            <a:off x="2969784" y="4148016"/>
-            <a:ext cx="0" cy="1207477"/>
-          </a:xfrm>
-          <a:prstGeom prst="line">
-            <a:avLst/>
-          </a:prstGeom>
-          <a:ln>
-            <a:solidFill>
-              <a:schemeClr val="tx1"/>
-            </a:solidFill>
-          </a:ln>
-        </p:spPr>
-        <p:style>
-          <a:lnRef idx="1">
-            <a:schemeClr val="accent1"/>
-          </a:lnRef>
-          <a:fillRef idx="0">
-            <a:schemeClr val="accent1"/>
-          </a:fillRef>
-          <a:effectRef idx="0">
-            <a:schemeClr val="accent1"/>
-          </a:effectRef>
-          <a:fontRef idx="minor">
-            <a:schemeClr val="tx1"/>
-          </a:fontRef>
-        </p:style>
-      </p:cxnSp>
-      <p:cxnSp>
-        <p:nvCxnSpPr>
-          <p:cNvPr id="69" name="Straight Connector 68"/>
-          <p:cNvCxnSpPr/>
-          <p:nvPr/>
-        </p:nvCxnSpPr>
-        <p:spPr>
-          <a:xfrm>
-            <a:off x="2974636" y="4121310"/>
-            <a:ext cx="142696" cy="1234183"/>
-          </a:xfrm>
-          <a:prstGeom prst="line">
-            <a:avLst/>
-          </a:prstGeom>
-          <a:ln>
-            <a:solidFill>
-              <a:schemeClr val="tx1"/>
-            </a:solidFill>
-          </a:ln>
-        </p:spPr>
-        <p:style>
-          <a:lnRef idx="1">
-            <a:schemeClr val="accent1"/>
-          </a:lnRef>
-          <a:fillRef idx="0">
-            <a:schemeClr val="accent1"/>
-          </a:fillRef>
-          <a:effectRef idx="0">
-            <a:schemeClr val="accent1"/>
-          </a:effectRef>
-          <a:fontRef idx="minor">
-            <a:schemeClr val="tx1"/>
-          </a:fontRef>
-        </p:style>
-      </p:cxnSp>
-      <p:cxnSp>
-        <p:nvCxnSpPr>
-          <p:cNvPr id="70" name="Straight Connector 69"/>
-          <p:cNvCxnSpPr/>
-          <p:nvPr/>
-        </p:nvCxnSpPr>
-        <p:spPr>
-          <a:xfrm flipV="1">
-            <a:off x="3110460" y="4148015"/>
-            <a:ext cx="0" cy="1207477"/>
-          </a:xfrm>
-          <a:prstGeom prst="line">
-            <a:avLst/>
-          </a:prstGeom>
-          <a:ln>
-            <a:solidFill>
-              <a:schemeClr val="tx1"/>
-            </a:solidFill>
-          </a:ln>
-        </p:spPr>
-        <p:style>
-          <a:lnRef idx="1">
-            <a:schemeClr val="accent1"/>
-          </a:lnRef>
-          <a:fillRef idx="0">
-            <a:schemeClr val="accent1"/>
-          </a:fillRef>
-          <a:effectRef idx="0">
-            <a:schemeClr val="accent1"/>
-          </a:effectRef>
-          <a:fontRef idx="minor">
-            <a:schemeClr val="tx1"/>
-          </a:fontRef>
-        </p:style>
-      </p:cxnSp>
-      <p:cxnSp>
-        <p:nvCxnSpPr>
-          <p:cNvPr id="71" name="Straight Connector 70"/>
-          <p:cNvCxnSpPr/>
-          <p:nvPr/>
-        </p:nvCxnSpPr>
-        <p:spPr>
-          <a:xfrm>
-            <a:off x="3115312" y="4121309"/>
-            <a:ext cx="142696" cy="1234183"/>
-          </a:xfrm>
-          <a:prstGeom prst="line">
-            <a:avLst/>
-          </a:prstGeom>
-          <a:ln>
-            <a:solidFill>
-              <a:schemeClr val="tx1"/>
-            </a:solidFill>
-          </a:ln>
-        </p:spPr>
-        <p:style>
-          <a:lnRef idx="1">
-            <a:schemeClr val="accent1"/>
-          </a:lnRef>
-          <a:fillRef idx="0">
-            <a:schemeClr val="accent1"/>
-          </a:fillRef>
-          <a:effectRef idx="0">
-            <a:schemeClr val="accent1"/>
-          </a:effectRef>
-          <a:fontRef idx="minor">
-            <a:schemeClr val="tx1"/>
-          </a:fontRef>
-        </p:style>
-      </p:cxnSp>
-      <p:cxnSp>
-        <p:nvCxnSpPr>
-          <p:cNvPr id="72" name="Straight Connector 71"/>
-          <p:cNvCxnSpPr/>
-          <p:nvPr/>
-        </p:nvCxnSpPr>
-        <p:spPr>
-          <a:xfrm flipV="1">
-            <a:off x="3256998" y="4136286"/>
-            <a:ext cx="0" cy="1207477"/>
-          </a:xfrm>
-          <a:prstGeom prst="line">
-            <a:avLst/>
-          </a:prstGeom>
-          <a:ln>
-            <a:solidFill>
-              <a:schemeClr val="tx1"/>
-            </a:solidFill>
-          </a:ln>
-        </p:spPr>
-        <p:style>
-          <a:lnRef idx="1">
-            <a:schemeClr val="accent1"/>
-          </a:lnRef>
-          <a:fillRef idx="0">
-            <a:schemeClr val="accent1"/>
-          </a:fillRef>
-          <a:effectRef idx="0">
-            <a:schemeClr val="accent1"/>
-          </a:effectRef>
-          <a:fontRef idx="minor">
-            <a:schemeClr val="tx1"/>
-          </a:fontRef>
-        </p:style>
-      </p:cxnSp>
-      <p:cxnSp>
-        <p:nvCxnSpPr>
-          <p:cNvPr id="73" name="Straight Connector 72"/>
-          <p:cNvCxnSpPr/>
-          <p:nvPr/>
-        </p:nvCxnSpPr>
-        <p:spPr>
-          <a:xfrm>
-            <a:off x="3261850" y="4109580"/>
-            <a:ext cx="142696" cy="1234183"/>
-          </a:xfrm>
-          <a:prstGeom prst="line">
-            <a:avLst/>
-          </a:prstGeom>
-          <a:ln>
-            <a:solidFill>
-              <a:schemeClr val="tx1"/>
-            </a:solidFill>
-          </a:ln>
-        </p:spPr>
-        <p:style>
-          <a:lnRef idx="1">
-            <a:schemeClr val="accent1"/>
-          </a:lnRef>
-          <a:fillRef idx="0">
-            <a:schemeClr val="accent1"/>
-          </a:fillRef>
-          <a:effectRef idx="0">
-            <a:schemeClr val="accent1"/>
-          </a:effectRef>
-          <a:fontRef idx="minor">
-            <a:schemeClr val="tx1"/>
-          </a:fontRef>
-        </p:style>
-      </p:cxnSp>
-      <p:cxnSp>
-        <p:nvCxnSpPr>
-          <p:cNvPr id="74" name="Straight Connector 73"/>
-          <p:cNvCxnSpPr/>
-          <p:nvPr/>
-        </p:nvCxnSpPr>
-        <p:spPr>
-          <a:xfrm flipV="1">
-            <a:off x="3403539" y="4130431"/>
-            <a:ext cx="0" cy="1207477"/>
-          </a:xfrm>
-          <a:prstGeom prst="line">
-            <a:avLst/>
-          </a:prstGeom>
-          <a:ln>
-            <a:solidFill>
-              <a:schemeClr val="tx1"/>
-            </a:solidFill>
-          </a:ln>
-        </p:spPr>
-        <p:style>
-          <a:lnRef idx="1">
-            <a:schemeClr val="accent1"/>
-          </a:lnRef>
-          <a:fillRef idx="0">
-            <a:schemeClr val="accent1"/>
-          </a:fillRef>
-          <a:effectRef idx="0">
-            <a:schemeClr val="accent1"/>
-          </a:effectRef>
-          <a:fontRef idx="minor">
-            <a:schemeClr val="tx1"/>
-          </a:fontRef>
-        </p:style>
-      </p:cxnSp>
-      <p:cxnSp>
-        <p:nvCxnSpPr>
-          <p:cNvPr id="75" name="Straight Connector 74"/>
-          <p:cNvCxnSpPr/>
-          <p:nvPr/>
-        </p:nvCxnSpPr>
-        <p:spPr>
-          <a:xfrm>
-            <a:off x="3408391" y="4103725"/>
-            <a:ext cx="142696" cy="1234183"/>
-          </a:xfrm>
-          <a:prstGeom prst="line">
-            <a:avLst/>
-          </a:prstGeom>
-          <a:ln>
-            <a:solidFill>
-              <a:schemeClr val="tx1"/>
-            </a:solidFill>
-          </a:ln>
-        </p:spPr>
-        <p:style>
-          <a:lnRef idx="1">
-            <a:schemeClr val="accent1"/>
-          </a:lnRef>
-          <a:fillRef idx="0">
-            <a:schemeClr val="accent1"/>
-          </a:fillRef>
-          <a:effectRef idx="0">
-            <a:schemeClr val="accent1"/>
-          </a:effectRef>
-          <a:fontRef idx="minor">
-            <a:schemeClr val="tx1"/>
-          </a:fontRef>
-        </p:style>
-      </p:cxnSp>
-      <p:cxnSp>
-        <p:nvCxnSpPr>
-          <p:cNvPr id="76" name="Straight Connector 75"/>
-          <p:cNvCxnSpPr/>
-          <p:nvPr/>
-        </p:nvCxnSpPr>
-        <p:spPr>
-          <a:xfrm flipV="1">
-            <a:off x="3548319" y="4138051"/>
-            <a:ext cx="0" cy="1207477"/>
-          </a:xfrm>
-          <a:prstGeom prst="line">
-            <a:avLst/>
-          </a:prstGeom>
-          <a:ln>
-            <a:solidFill>
-              <a:schemeClr val="tx1"/>
-            </a:solidFill>
-          </a:ln>
-        </p:spPr>
-        <p:style>
-          <a:lnRef idx="1">
-            <a:schemeClr val="accent1"/>
-          </a:lnRef>
-          <a:fillRef idx="0">
-            <a:schemeClr val="accent1"/>
-          </a:fillRef>
-          <a:effectRef idx="0">
-            <a:schemeClr val="accent1"/>
-          </a:effectRef>
-          <a:fontRef idx="minor">
-            <a:schemeClr val="tx1"/>
-          </a:fontRef>
-        </p:style>
-      </p:cxnSp>
-      <p:sp>
-        <p:nvSpPr>
-          <p:cNvPr id="77" name="Oval 76"/>
-          <p:cNvSpPr/>
-          <p:nvPr/>
-        </p:nvSpPr>
-        <p:spPr>
-          <a:xfrm>
-            <a:off x="3574081" y="4130431"/>
-            <a:ext cx="1233396" cy="1233396"/>
-          </a:xfrm>
-          <a:prstGeom prst="ellipse">
-            <a:avLst/>
-          </a:prstGeom>
-          <a:solidFill>
-            <a:schemeClr val="bg2">
-              <a:lumMod val="75000"/>
-            </a:schemeClr>
-          </a:solidFill>
-          <a:ln>
-            <a:solidFill>
-              <a:schemeClr val="tx1"/>
-            </a:solidFill>
-          </a:ln>
-        </p:spPr>
-        <p:style>
-          <a:lnRef idx="2">
-            <a:schemeClr val="accent1">
-              <a:shade val="50000"/>
-            </a:schemeClr>
-          </a:lnRef>
-          <a:fillRef idx="1">
-            <a:schemeClr val="accent1"/>
-          </a:fillRef>
-          <a:effectRef idx="0">
-            <a:schemeClr val="accent1"/>
-          </a:effectRef>
-          <a:fontRef idx="minor">
-            <a:schemeClr val="lt1"/>
-          </a:fontRef>
-        </p:style>
-        <p:txBody>
-          <a:bodyPr rtlCol="0" anchor="ctr"/>
-          <a:lstStyle/>
-          <a:p>
-            <a:pPr algn="ctr"/>
-            <a:endParaRPr lang="en-US"/>
           </a:p>
         </p:txBody>
       </p:sp>
@@ -4652,9 +3357,9 @@
           <p:nvPr/>
         </p:nvCxnSpPr>
         <p:spPr>
-          <a:xfrm>
-            <a:off x="1763485" y="5950855"/>
-            <a:ext cx="9503229" cy="0"/>
+          <a:xfrm flipV="1">
+            <a:off x="1839688" y="5281009"/>
+            <a:ext cx="8049380" cy="45394"/>
           </a:xfrm>
           <a:prstGeom prst="straightConnector1">
             <a:avLst/>
@@ -4689,7 +3394,7 @@
         </p:nvCxnSpPr>
         <p:spPr>
           <a:xfrm flipV="1">
-            <a:off x="4190779" y="4734169"/>
+            <a:off x="4266981" y="4109718"/>
             <a:ext cx="0" cy="1309641"/>
           </a:xfrm>
           <a:prstGeom prst="line">
@@ -4725,7 +3430,7 @@
         </p:nvSpPr>
         <p:spPr>
           <a:xfrm>
-            <a:off x="4018171" y="5905461"/>
+            <a:off x="4094375" y="5281009"/>
             <a:ext cx="3483429" cy="523220"/>
           </a:xfrm>
           <a:prstGeom prst="rect">
@@ -4740,19 +3445,19 @@
           <a:lstStyle/>
           <a:p>
             <a:r>
-              <a:rPr lang="en-US" sz="2800" dirty="0" err="1" smtClean="0"/>
+              <a:rPr lang="en-US" sz="2800" dirty="0" err="1"/>
               <a:t>x</a:t>
             </a:r>
             <a:r>
-              <a:rPr lang="en-US" dirty="0" err="1" smtClean="0"/>
+              <a:rPr lang="en-US" dirty="0" err="1"/>
               <a:t>s</a:t>
             </a:r>
             <a:r>
-              <a:rPr lang="en-US" sz="2800" dirty="0" smtClean="0"/>
+              <a:rPr lang="en-US" sz="2800" dirty="0"/>
               <a:t>=</a:t>
             </a:r>
             <a:r>
-              <a:rPr lang="en-US" sz="2400" dirty="0" smtClean="0"/>
+              <a:rPr lang="en-US" sz="2400" dirty="0"/>
               <a:t>0</a:t>
             </a:r>
             <a:endParaRPr lang="en-US" sz="2400" dirty="0"/>
@@ -4767,7 +3472,7 @@
         </p:nvSpPr>
         <p:spPr>
           <a:xfrm>
-            <a:off x="10803436" y="5857243"/>
+            <a:off x="9474169" y="4185038"/>
             <a:ext cx="3483429" cy="523220"/>
           </a:xfrm>
           <a:prstGeom prst="rect">
@@ -4788,6 +3493,35 @@
           </a:p>
         </p:txBody>
       </p:sp>
+      <p:pic>
+        <p:nvPicPr>
+          <p:cNvPr id="18" name="Picture 17"/>
+          <p:cNvPicPr>
+            <a:picLocks noChangeAspect="1"/>
+          </p:cNvPicPr>
+          <p:nvPr/>
+        </p:nvPicPr>
+        <p:blipFill rotWithShape="1">
+          <a:blip r:embed="rId4" cstate="print">
+            <a:extLst>
+              <a:ext uri="{28A0092B-C50C-407E-A947-70E740481C1C}">
+                <a14:useLocalDpi xmlns:a14="http://schemas.microsoft.com/office/drawing/2010/main" val="0"/>
+              </a:ext>
+            </a:extLst>
+          </a:blip>
+          <a:srcRect l="8438" t="38055" r="15625" b="26389"/>
+          <a:stretch/>
+        </p:blipFill>
+        <p:spPr>
+          <a:xfrm>
+            <a:off x="1862407" y="6033800"/>
+            <a:ext cx="8179380" cy="2154240"/>
+          </a:xfrm>
+          <a:prstGeom prst="rect">
+            <a:avLst/>
+          </a:prstGeom>
+        </p:spPr>
+      </p:pic>
     </p:spTree>
     <p:extLst>
       <p:ext uri="{BB962C8B-B14F-4D97-AF65-F5344CB8AC3E}">
@@ -4804,7 +3538,7 @@
 <file path=ppt/theme/theme1.xml><?xml version="1.0" encoding="utf-8"?>
 <a:theme xmlns:a="http://schemas.openxmlformats.org/drawingml/2006/main" name="Office Theme">
   <a:themeElements>
-    <a:clrScheme name="Office">
+    <a:clrScheme name="Office Theme">
       <a:dk1>
         <a:sysClr val="windowText" lastClr="000000"/>
       </a:dk1>
@@ -4842,7 +3576,7 @@
         <a:srgbClr val="954F72"/>
       </a:folHlink>
     </a:clrScheme>
-    <a:fontScheme name="Office">
+    <a:fontScheme name="Office Theme">
       <a:majorFont>
         <a:latin typeface="Calibri Light" panose="020F0302020204030204"/>
         <a:ea typeface=""/>
@@ -4914,7 +3648,7 @@
         <a:font script="Geor" typeface="Sylfaen"/>
       </a:minorFont>
     </a:fontScheme>
-    <a:fmtScheme name="Office">
+    <a:fmtScheme name="Office Theme">
       <a:fillStyleLst>
         <a:solidFill>
           <a:schemeClr val="phClr"/>

</xml_diff>

<commit_message>
Updated pictures and finish conclusion
</commit_message>
<xml_diff>
--- a/figure1.pptx
+++ b/figure1.pptx
@@ -2,12 +2,12 @@
 <file path=ppt/presentation.xml><?xml version="1.0" encoding="utf-8"?>
 <p:presentation xmlns:a="http://schemas.openxmlformats.org/drawingml/2006/main" xmlns:r="http://schemas.openxmlformats.org/officeDocument/2006/relationships" xmlns:p="http://schemas.openxmlformats.org/presentationml/2006/main" saveSubsetFonts="1">
   <p:sldMasterIdLst>
-    <p:sldMasterId id="2147483660" r:id="rId1"/>
+    <p:sldMasterId id="2147483672" r:id="rId1"/>
   </p:sldMasterIdLst>
   <p:sldIdLst>
     <p:sldId id="256" r:id="rId2"/>
   </p:sldIdLst>
-  <p:sldSz cx="12192000" cy="8869363"/>
+  <p:sldSz cx="12192000" cy="12436475"/>
   <p:notesSz cx="6858000" cy="9144000"/>
   <p:defaultTextStyle>
     <a:defPPr>
@@ -141,15 +141,15 @@
         </p:nvSpPr>
         <p:spPr>
           <a:xfrm>
-            <a:off x="914400" y="1451538"/>
-            <a:ext cx="10363200" cy="3087852"/>
+            <a:off x="914400" y="2035322"/>
+            <a:ext cx="10363200" cy="4329736"/>
           </a:xfrm>
         </p:spPr>
         <p:txBody>
           <a:bodyPr anchor="b"/>
           <a:lstStyle>
             <a:lvl1pPr algn="ctr">
-              <a:defRPr sz="7760"/>
+              <a:defRPr sz="8000"/>
             </a:lvl1pPr>
           </a:lstStyle>
           <a:p>
@@ -173,8 +173,8 @@
         </p:nvSpPr>
         <p:spPr>
           <a:xfrm>
-            <a:off x="1524000" y="4658469"/>
-            <a:ext cx="9144000" cy="2141376"/>
+            <a:off x="1524000" y="6532029"/>
+            <a:ext cx="9144000" cy="3002602"/>
           </a:xfrm>
         </p:spPr>
         <p:txBody>
@@ -182,39 +182,39 @@
           <a:lstStyle>
             <a:lvl1pPr marL="0" indent="0" algn="ctr">
               <a:buNone/>
-              <a:defRPr sz="3104"/>
+              <a:defRPr sz="3200"/>
             </a:lvl1pPr>
-            <a:lvl2pPr marL="591297" indent="0" algn="ctr">
-              <a:buNone/>
-              <a:defRPr sz="2587"/>
+            <a:lvl2pPr marL="609585" indent="0" algn="ctr">
+              <a:buNone/>
+              <a:defRPr sz="2667"/>
             </a:lvl2pPr>
-            <a:lvl3pPr marL="1182594" indent="0" algn="ctr">
-              <a:buNone/>
-              <a:defRPr sz="2328"/>
+            <a:lvl3pPr marL="1219170" indent="0" algn="ctr">
+              <a:buNone/>
+              <a:defRPr sz="2400"/>
             </a:lvl3pPr>
-            <a:lvl4pPr marL="1773890" indent="0" algn="ctr">
-              <a:buNone/>
-              <a:defRPr sz="2069"/>
+            <a:lvl4pPr marL="1828754" indent="0" algn="ctr">
+              <a:buNone/>
+              <a:defRPr sz="2133"/>
             </a:lvl4pPr>
-            <a:lvl5pPr marL="2365187" indent="0" algn="ctr">
-              <a:buNone/>
-              <a:defRPr sz="2069"/>
+            <a:lvl5pPr marL="2438339" indent="0" algn="ctr">
+              <a:buNone/>
+              <a:defRPr sz="2133"/>
             </a:lvl5pPr>
-            <a:lvl6pPr marL="2956484" indent="0" algn="ctr">
-              <a:buNone/>
-              <a:defRPr sz="2069"/>
+            <a:lvl6pPr marL="3047924" indent="0" algn="ctr">
+              <a:buNone/>
+              <a:defRPr sz="2133"/>
             </a:lvl6pPr>
-            <a:lvl7pPr marL="3547781" indent="0" algn="ctr">
-              <a:buNone/>
-              <a:defRPr sz="2069"/>
+            <a:lvl7pPr marL="3657509" indent="0" algn="ctr">
+              <a:buNone/>
+              <a:defRPr sz="2133"/>
             </a:lvl7pPr>
-            <a:lvl8pPr marL="4139077" indent="0" algn="ctr">
-              <a:buNone/>
-              <a:defRPr sz="2069"/>
+            <a:lvl8pPr marL="4267093" indent="0" algn="ctr">
+              <a:buNone/>
+              <a:defRPr sz="2133"/>
             </a:lvl8pPr>
-            <a:lvl9pPr marL="4730374" indent="0" algn="ctr">
-              <a:buNone/>
-              <a:defRPr sz="2069"/>
+            <a:lvl9pPr marL="4876678" indent="0" algn="ctr">
+              <a:buNone/>
+              <a:defRPr sz="2133"/>
             </a:lvl9pPr>
           </a:lstStyle>
           <a:p>
@@ -243,7 +243,7 @@
           <a:p>
             <a:fld id="{4D01D722-A7B2-4018-AAE4-87180B192DC8}" type="datetimeFigureOut">
               <a:rPr lang="en-US" smtClean="0"/>
-              <a:t>2/7/2017</a:t>
+              <a:t>2/13/2017</a:t>
             </a:fld>
             <a:endParaRPr lang="en-US"/>
           </a:p>
@@ -294,7 +294,7 @@
     </p:spTree>
     <p:extLst>
       <p:ext uri="{BB962C8B-B14F-4D97-AF65-F5344CB8AC3E}">
-        <p14:creationId xmlns:p14="http://schemas.microsoft.com/office/powerpoint/2010/main" val="4155430887"/>
+        <p14:creationId xmlns:p14="http://schemas.microsoft.com/office/powerpoint/2010/main" val="2101114518"/>
       </p:ext>
     </p:extLst>
   </p:cSld>
@@ -413,7 +413,7 @@
           <a:p>
             <a:fld id="{4D01D722-A7B2-4018-AAE4-87180B192DC8}" type="datetimeFigureOut">
               <a:rPr lang="en-US" smtClean="0"/>
-              <a:t>2/7/2017</a:t>
+              <a:t>2/13/2017</a:t>
             </a:fld>
             <a:endParaRPr lang="en-US"/>
           </a:p>
@@ -464,7 +464,7 @@
     </p:spTree>
     <p:extLst>
       <p:ext uri="{BB962C8B-B14F-4D97-AF65-F5344CB8AC3E}">
-        <p14:creationId xmlns:p14="http://schemas.microsoft.com/office/powerpoint/2010/main" val="3233007326"/>
+        <p14:creationId xmlns:p14="http://schemas.microsoft.com/office/powerpoint/2010/main" val="2472728101"/>
       </p:ext>
     </p:extLst>
   </p:cSld>
@@ -503,8 +503,8 @@
         </p:nvSpPr>
         <p:spPr>
           <a:xfrm>
-            <a:off x="8724901" y="472212"/>
-            <a:ext cx="2628900" cy="7516375"/>
+            <a:off x="8724901" y="662127"/>
+            <a:ext cx="2628900" cy="10539338"/>
           </a:xfrm>
         </p:spPr>
         <p:txBody>
@@ -531,8 +531,8 @@
         </p:nvSpPr>
         <p:spPr>
           <a:xfrm>
-            <a:off x="838201" y="472212"/>
-            <a:ext cx="7734300" cy="7516375"/>
+            <a:off x="838201" y="662127"/>
+            <a:ext cx="7734300" cy="10539338"/>
           </a:xfrm>
         </p:spPr>
         <p:txBody>
@@ -593,7 +593,7 @@
           <a:p>
             <a:fld id="{4D01D722-A7B2-4018-AAE4-87180B192DC8}" type="datetimeFigureOut">
               <a:rPr lang="en-US" smtClean="0"/>
-              <a:t>2/7/2017</a:t>
+              <a:t>2/13/2017</a:t>
             </a:fld>
             <a:endParaRPr lang="en-US"/>
           </a:p>
@@ -644,7 +644,7 @@
     </p:spTree>
     <p:extLst>
       <p:ext uri="{BB962C8B-B14F-4D97-AF65-F5344CB8AC3E}">
-        <p14:creationId xmlns:p14="http://schemas.microsoft.com/office/powerpoint/2010/main" val="2614760032"/>
+        <p14:creationId xmlns:p14="http://schemas.microsoft.com/office/powerpoint/2010/main" val="962292263"/>
       </p:ext>
     </p:extLst>
   </p:cSld>
@@ -763,7 +763,7 @@
           <a:p>
             <a:fld id="{4D01D722-A7B2-4018-AAE4-87180B192DC8}" type="datetimeFigureOut">
               <a:rPr lang="en-US" smtClean="0"/>
-              <a:t>2/7/2017</a:t>
+              <a:t>2/13/2017</a:t>
             </a:fld>
             <a:endParaRPr lang="en-US"/>
           </a:p>
@@ -814,7 +814,7 @@
     </p:spTree>
     <p:extLst>
       <p:ext uri="{BB962C8B-B14F-4D97-AF65-F5344CB8AC3E}">
-        <p14:creationId xmlns:p14="http://schemas.microsoft.com/office/powerpoint/2010/main" val="1627083991"/>
+        <p14:creationId xmlns:p14="http://schemas.microsoft.com/office/powerpoint/2010/main" val="3277714131"/>
       </p:ext>
     </p:extLst>
   </p:cSld>
@@ -853,15 +853,15 @@
         </p:nvSpPr>
         <p:spPr>
           <a:xfrm>
-            <a:off x="831851" y="2211184"/>
-            <a:ext cx="10515600" cy="3689408"/>
+            <a:off x="831851" y="3100486"/>
+            <a:ext cx="10515600" cy="5173227"/>
           </a:xfrm>
         </p:spPr>
         <p:txBody>
           <a:bodyPr anchor="b"/>
           <a:lstStyle>
             <a:lvl1pPr>
-              <a:defRPr sz="7760"/>
+              <a:defRPr sz="8000"/>
             </a:lvl1pPr>
           </a:lstStyle>
           <a:p>
@@ -885,8 +885,8 @@
         </p:nvSpPr>
         <p:spPr>
           <a:xfrm>
-            <a:off x="831851" y="5935495"/>
-            <a:ext cx="10515600" cy="1940173"/>
+            <a:off x="831851" y="8322654"/>
+            <a:ext cx="10515600" cy="2720478"/>
           </a:xfrm>
         </p:spPr>
         <p:txBody>
@@ -894,15 +894,15 @@
           <a:lstStyle>
             <a:lvl1pPr marL="0" indent="0">
               <a:buNone/>
-              <a:defRPr sz="3104">
+              <a:defRPr sz="3200">
                 <a:solidFill>
                   <a:schemeClr val="tx1"/>
                 </a:solidFill>
               </a:defRPr>
             </a:lvl1pPr>
-            <a:lvl2pPr marL="591297" indent="0">
-              <a:buNone/>
-              <a:defRPr sz="2587">
+            <a:lvl2pPr marL="609585" indent="0">
+              <a:buNone/>
+              <a:defRPr sz="2667">
                 <a:solidFill>
                   <a:schemeClr val="tx1">
                     <a:tint val="75000"/>
@@ -910,9 +910,9 @@
                 </a:solidFill>
               </a:defRPr>
             </a:lvl2pPr>
-            <a:lvl3pPr marL="1182594" indent="0">
-              <a:buNone/>
-              <a:defRPr sz="2328">
+            <a:lvl3pPr marL="1219170" indent="0">
+              <a:buNone/>
+              <a:defRPr sz="2400">
                 <a:solidFill>
                   <a:schemeClr val="tx1">
                     <a:tint val="75000"/>
@@ -920,9 +920,9 @@
                 </a:solidFill>
               </a:defRPr>
             </a:lvl3pPr>
-            <a:lvl4pPr marL="1773890" indent="0">
-              <a:buNone/>
-              <a:defRPr sz="2069">
+            <a:lvl4pPr marL="1828754" indent="0">
+              <a:buNone/>
+              <a:defRPr sz="2133">
                 <a:solidFill>
                   <a:schemeClr val="tx1">
                     <a:tint val="75000"/>
@@ -930,9 +930,9 @@
                 </a:solidFill>
               </a:defRPr>
             </a:lvl4pPr>
-            <a:lvl5pPr marL="2365187" indent="0">
-              <a:buNone/>
-              <a:defRPr sz="2069">
+            <a:lvl5pPr marL="2438339" indent="0">
+              <a:buNone/>
+              <a:defRPr sz="2133">
                 <a:solidFill>
                   <a:schemeClr val="tx1">
                     <a:tint val="75000"/>
@@ -940,9 +940,9 @@
                 </a:solidFill>
               </a:defRPr>
             </a:lvl5pPr>
-            <a:lvl6pPr marL="2956484" indent="0">
-              <a:buNone/>
-              <a:defRPr sz="2069">
+            <a:lvl6pPr marL="3047924" indent="0">
+              <a:buNone/>
+              <a:defRPr sz="2133">
                 <a:solidFill>
                   <a:schemeClr val="tx1">
                     <a:tint val="75000"/>
@@ -950,9 +950,9 @@
                 </a:solidFill>
               </a:defRPr>
             </a:lvl6pPr>
-            <a:lvl7pPr marL="3547781" indent="0">
-              <a:buNone/>
-              <a:defRPr sz="2069">
+            <a:lvl7pPr marL="3657509" indent="0">
+              <a:buNone/>
+              <a:defRPr sz="2133">
                 <a:solidFill>
                   <a:schemeClr val="tx1">
                     <a:tint val="75000"/>
@@ -960,9 +960,9 @@
                 </a:solidFill>
               </a:defRPr>
             </a:lvl7pPr>
-            <a:lvl8pPr marL="4139077" indent="0">
-              <a:buNone/>
-              <a:defRPr sz="2069">
+            <a:lvl8pPr marL="4267093" indent="0">
+              <a:buNone/>
+              <a:defRPr sz="2133">
                 <a:solidFill>
                   <a:schemeClr val="tx1">
                     <a:tint val="75000"/>
@@ -970,9 +970,9 @@
                 </a:solidFill>
               </a:defRPr>
             </a:lvl8pPr>
-            <a:lvl9pPr marL="4730374" indent="0">
-              <a:buNone/>
-              <a:defRPr sz="2069">
+            <a:lvl9pPr marL="4876678" indent="0">
+              <a:buNone/>
+              <a:defRPr sz="2133">
                 <a:solidFill>
                   <a:schemeClr val="tx1">
                     <a:tint val="75000"/>
@@ -1007,7 +1007,7 @@
           <a:p>
             <a:fld id="{4D01D722-A7B2-4018-AAE4-87180B192DC8}" type="datetimeFigureOut">
               <a:rPr lang="en-US" smtClean="0"/>
-              <a:t>2/7/2017</a:t>
+              <a:t>2/13/2017</a:t>
             </a:fld>
             <a:endParaRPr lang="en-US"/>
           </a:p>
@@ -1058,7 +1058,7 @@
     </p:spTree>
     <p:extLst>
       <p:ext uri="{BB962C8B-B14F-4D97-AF65-F5344CB8AC3E}">
-        <p14:creationId xmlns:p14="http://schemas.microsoft.com/office/powerpoint/2010/main" val="2684330443"/>
+        <p14:creationId xmlns:p14="http://schemas.microsoft.com/office/powerpoint/2010/main" val="1987978032"/>
       </p:ext>
     </p:extLst>
   </p:cSld>
@@ -1120,8 +1120,8 @@
         </p:nvSpPr>
         <p:spPr>
           <a:xfrm>
-            <a:off x="838200" y="2361057"/>
-            <a:ext cx="5181600" cy="5627529"/>
+            <a:off x="838200" y="3310636"/>
+            <a:ext cx="5181600" cy="7890829"/>
           </a:xfrm>
         </p:spPr>
         <p:txBody>
@@ -1177,8 +1177,8 @@
         </p:nvSpPr>
         <p:spPr>
           <a:xfrm>
-            <a:off x="6172200" y="2361057"/>
-            <a:ext cx="5181600" cy="5627529"/>
+            <a:off x="6172200" y="3310636"/>
+            <a:ext cx="5181600" cy="7890829"/>
           </a:xfrm>
         </p:spPr>
         <p:txBody>
@@ -1239,7 +1239,7 @@
           <a:p>
             <a:fld id="{4D01D722-A7B2-4018-AAE4-87180B192DC8}" type="datetimeFigureOut">
               <a:rPr lang="en-US" smtClean="0"/>
-              <a:t>2/7/2017</a:t>
+              <a:t>2/13/2017</a:t>
             </a:fld>
             <a:endParaRPr lang="en-US"/>
           </a:p>
@@ -1290,7 +1290,7 @@
     </p:spTree>
     <p:extLst>
       <p:ext uri="{BB962C8B-B14F-4D97-AF65-F5344CB8AC3E}">
-        <p14:creationId xmlns:p14="http://schemas.microsoft.com/office/powerpoint/2010/main" val="1094946358"/>
+        <p14:creationId xmlns:p14="http://schemas.microsoft.com/office/powerpoint/2010/main" val="1566804493"/>
       </p:ext>
     </p:extLst>
   </p:cSld>
@@ -1329,8 +1329,8 @@
         </p:nvSpPr>
         <p:spPr>
           <a:xfrm>
-            <a:off x="839788" y="472213"/>
-            <a:ext cx="10515600" cy="1714334"/>
+            <a:off x="839788" y="662130"/>
+            <a:ext cx="10515600" cy="2403810"/>
           </a:xfrm>
         </p:spPr>
         <p:txBody>
@@ -1357,8 +1357,8 @@
         </p:nvSpPr>
         <p:spPr>
           <a:xfrm>
-            <a:off x="839789" y="2174226"/>
-            <a:ext cx="5157787" cy="1065555"/>
+            <a:off x="839789" y="3048665"/>
+            <a:ext cx="5157787" cy="1494103"/>
           </a:xfrm>
         </p:spPr>
         <p:txBody>
@@ -1366,39 +1366,39 @@
           <a:lstStyle>
             <a:lvl1pPr marL="0" indent="0">
               <a:buNone/>
-              <a:defRPr sz="3104" b="1"/>
+              <a:defRPr sz="3200" b="1"/>
             </a:lvl1pPr>
-            <a:lvl2pPr marL="591297" indent="0">
-              <a:buNone/>
-              <a:defRPr sz="2587" b="1"/>
+            <a:lvl2pPr marL="609585" indent="0">
+              <a:buNone/>
+              <a:defRPr sz="2667" b="1"/>
             </a:lvl2pPr>
-            <a:lvl3pPr marL="1182594" indent="0">
-              <a:buNone/>
-              <a:defRPr sz="2328" b="1"/>
+            <a:lvl3pPr marL="1219170" indent="0">
+              <a:buNone/>
+              <a:defRPr sz="2400" b="1"/>
             </a:lvl3pPr>
-            <a:lvl4pPr marL="1773890" indent="0">
-              <a:buNone/>
-              <a:defRPr sz="2069" b="1"/>
+            <a:lvl4pPr marL="1828754" indent="0">
+              <a:buNone/>
+              <a:defRPr sz="2133" b="1"/>
             </a:lvl4pPr>
-            <a:lvl5pPr marL="2365187" indent="0">
-              <a:buNone/>
-              <a:defRPr sz="2069" b="1"/>
+            <a:lvl5pPr marL="2438339" indent="0">
+              <a:buNone/>
+              <a:defRPr sz="2133" b="1"/>
             </a:lvl5pPr>
-            <a:lvl6pPr marL="2956484" indent="0">
-              <a:buNone/>
-              <a:defRPr sz="2069" b="1"/>
+            <a:lvl6pPr marL="3047924" indent="0">
+              <a:buNone/>
+              <a:defRPr sz="2133" b="1"/>
             </a:lvl6pPr>
-            <a:lvl7pPr marL="3547781" indent="0">
-              <a:buNone/>
-              <a:defRPr sz="2069" b="1"/>
+            <a:lvl7pPr marL="3657509" indent="0">
+              <a:buNone/>
+              <a:defRPr sz="2133" b="1"/>
             </a:lvl7pPr>
-            <a:lvl8pPr marL="4139077" indent="0">
-              <a:buNone/>
-              <a:defRPr sz="2069" b="1"/>
+            <a:lvl8pPr marL="4267093" indent="0">
+              <a:buNone/>
+              <a:defRPr sz="2133" b="1"/>
             </a:lvl8pPr>
-            <a:lvl9pPr marL="4730374" indent="0">
-              <a:buNone/>
-              <a:defRPr sz="2069" b="1"/>
+            <a:lvl9pPr marL="4876678" indent="0">
+              <a:buNone/>
+              <a:defRPr sz="2133" b="1"/>
             </a:lvl9pPr>
           </a:lstStyle>
           <a:p>
@@ -1422,8 +1422,8 @@
         </p:nvSpPr>
         <p:spPr>
           <a:xfrm>
-            <a:off x="839789" y="3239781"/>
-            <a:ext cx="5157787" cy="4765230"/>
+            <a:off x="839789" y="4542768"/>
+            <a:ext cx="5157787" cy="6681727"/>
           </a:xfrm>
         </p:spPr>
         <p:txBody>
@@ -1479,8 +1479,8 @@
         </p:nvSpPr>
         <p:spPr>
           <a:xfrm>
-            <a:off x="6172201" y="2174226"/>
-            <a:ext cx="5183188" cy="1065555"/>
+            <a:off x="6172201" y="3048665"/>
+            <a:ext cx="5183188" cy="1494103"/>
           </a:xfrm>
         </p:spPr>
         <p:txBody>
@@ -1488,39 +1488,39 @@
           <a:lstStyle>
             <a:lvl1pPr marL="0" indent="0">
               <a:buNone/>
-              <a:defRPr sz="3104" b="1"/>
+              <a:defRPr sz="3200" b="1"/>
             </a:lvl1pPr>
-            <a:lvl2pPr marL="591297" indent="0">
-              <a:buNone/>
-              <a:defRPr sz="2587" b="1"/>
+            <a:lvl2pPr marL="609585" indent="0">
+              <a:buNone/>
+              <a:defRPr sz="2667" b="1"/>
             </a:lvl2pPr>
-            <a:lvl3pPr marL="1182594" indent="0">
-              <a:buNone/>
-              <a:defRPr sz="2328" b="1"/>
+            <a:lvl3pPr marL="1219170" indent="0">
+              <a:buNone/>
+              <a:defRPr sz="2400" b="1"/>
             </a:lvl3pPr>
-            <a:lvl4pPr marL="1773890" indent="0">
-              <a:buNone/>
-              <a:defRPr sz="2069" b="1"/>
+            <a:lvl4pPr marL="1828754" indent="0">
+              <a:buNone/>
+              <a:defRPr sz="2133" b="1"/>
             </a:lvl4pPr>
-            <a:lvl5pPr marL="2365187" indent="0">
-              <a:buNone/>
-              <a:defRPr sz="2069" b="1"/>
+            <a:lvl5pPr marL="2438339" indent="0">
+              <a:buNone/>
+              <a:defRPr sz="2133" b="1"/>
             </a:lvl5pPr>
-            <a:lvl6pPr marL="2956484" indent="0">
-              <a:buNone/>
-              <a:defRPr sz="2069" b="1"/>
+            <a:lvl6pPr marL="3047924" indent="0">
+              <a:buNone/>
+              <a:defRPr sz="2133" b="1"/>
             </a:lvl6pPr>
-            <a:lvl7pPr marL="3547781" indent="0">
-              <a:buNone/>
-              <a:defRPr sz="2069" b="1"/>
+            <a:lvl7pPr marL="3657509" indent="0">
+              <a:buNone/>
+              <a:defRPr sz="2133" b="1"/>
             </a:lvl7pPr>
-            <a:lvl8pPr marL="4139077" indent="0">
-              <a:buNone/>
-              <a:defRPr sz="2069" b="1"/>
+            <a:lvl8pPr marL="4267093" indent="0">
+              <a:buNone/>
+              <a:defRPr sz="2133" b="1"/>
             </a:lvl8pPr>
-            <a:lvl9pPr marL="4730374" indent="0">
-              <a:buNone/>
-              <a:defRPr sz="2069" b="1"/>
+            <a:lvl9pPr marL="4876678" indent="0">
+              <a:buNone/>
+              <a:defRPr sz="2133" b="1"/>
             </a:lvl9pPr>
           </a:lstStyle>
           <a:p>
@@ -1544,8 +1544,8 @@
         </p:nvSpPr>
         <p:spPr>
           <a:xfrm>
-            <a:off x="6172201" y="3239781"/>
-            <a:ext cx="5183188" cy="4765230"/>
+            <a:off x="6172201" y="4542768"/>
+            <a:ext cx="5183188" cy="6681727"/>
           </a:xfrm>
         </p:spPr>
         <p:txBody>
@@ -1606,7 +1606,7 @@
           <a:p>
             <a:fld id="{4D01D722-A7B2-4018-AAE4-87180B192DC8}" type="datetimeFigureOut">
               <a:rPr lang="en-US" smtClean="0"/>
-              <a:t>2/7/2017</a:t>
+              <a:t>2/13/2017</a:t>
             </a:fld>
             <a:endParaRPr lang="en-US"/>
           </a:p>
@@ -1657,7 +1657,7 @@
     </p:spTree>
     <p:extLst>
       <p:ext uri="{BB962C8B-B14F-4D97-AF65-F5344CB8AC3E}">
-        <p14:creationId xmlns:p14="http://schemas.microsoft.com/office/powerpoint/2010/main" val="3574267531"/>
+        <p14:creationId xmlns:p14="http://schemas.microsoft.com/office/powerpoint/2010/main" val="3244814342"/>
       </p:ext>
     </p:extLst>
   </p:cSld>
@@ -1724,7 +1724,7 @@
           <a:p>
             <a:fld id="{4D01D722-A7B2-4018-AAE4-87180B192DC8}" type="datetimeFigureOut">
               <a:rPr lang="en-US" smtClean="0"/>
-              <a:t>2/7/2017</a:t>
+              <a:t>2/13/2017</a:t>
             </a:fld>
             <a:endParaRPr lang="en-US"/>
           </a:p>
@@ -1775,7 +1775,7 @@
     </p:spTree>
     <p:extLst>
       <p:ext uri="{BB962C8B-B14F-4D97-AF65-F5344CB8AC3E}">
-        <p14:creationId xmlns:p14="http://schemas.microsoft.com/office/powerpoint/2010/main" val="2610244228"/>
+        <p14:creationId xmlns:p14="http://schemas.microsoft.com/office/powerpoint/2010/main" val="2481840363"/>
       </p:ext>
     </p:extLst>
   </p:cSld>
@@ -1819,7 +1819,7 @@
           <a:p>
             <a:fld id="{4D01D722-A7B2-4018-AAE4-87180B192DC8}" type="datetimeFigureOut">
               <a:rPr lang="en-US" smtClean="0"/>
-              <a:t>2/7/2017</a:t>
+              <a:t>2/13/2017</a:t>
             </a:fld>
             <a:endParaRPr lang="en-US"/>
           </a:p>
@@ -1870,7 +1870,7 @@
     </p:spTree>
     <p:extLst>
       <p:ext uri="{BB962C8B-B14F-4D97-AF65-F5344CB8AC3E}">
-        <p14:creationId xmlns:p14="http://schemas.microsoft.com/office/powerpoint/2010/main" val="1134494975"/>
+        <p14:creationId xmlns:p14="http://schemas.microsoft.com/office/powerpoint/2010/main" val="4189345704"/>
       </p:ext>
     </p:extLst>
   </p:cSld>
@@ -1909,15 +1909,15 @@
         </p:nvSpPr>
         <p:spPr>
           <a:xfrm>
-            <a:off x="839788" y="591291"/>
-            <a:ext cx="3932237" cy="2069518"/>
+            <a:off x="839788" y="829098"/>
+            <a:ext cx="3932237" cy="2901844"/>
           </a:xfrm>
         </p:spPr>
         <p:txBody>
           <a:bodyPr anchor="b"/>
           <a:lstStyle>
             <a:lvl1pPr>
-              <a:defRPr sz="4139"/>
+              <a:defRPr sz="4267"/>
             </a:lvl1pPr>
           </a:lstStyle>
           <a:p>
@@ -1941,39 +1941,39 @@
         </p:nvSpPr>
         <p:spPr>
           <a:xfrm>
-            <a:off x="5183188" y="1277026"/>
-            <a:ext cx="6172200" cy="6302996"/>
+            <a:off x="5183188" y="1790625"/>
+            <a:ext cx="6172200" cy="8837958"/>
           </a:xfrm>
         </p:spPr>
         <p:txBody>
           <a:bodyPr/>
           <a:lstStyle>
             <a:lvl1pPr>
-              <a:defRPr sz="4139"/>
+              <a:defRPr sz="4267"/>
             </a:lvl1pPr>
             <a:lvl2pPr>
-              <a:defRPr sz="3621"/>
+              <a:defRPr sz="3733"/>
             </a:lvl2pPr>
             <a:lvl3pPr>
-              <a:defRPr sz="3104"/>
+              <a:defRPr sz="3200"/>
             </a:lvl3pPr>
             <a:lvl4pPr>
-              <a:defRPr sz="2587"/>
+              <a:defRPr sz="2667"/>
             </a:lvl4pPr>
             <a:lvl5pPr>
-              <a:defRPr sz="2587"/>
+              <a:defRPr sz="2667"/>
             </a:lvl5pPr>
             <a:lvl6pPr>
-              <a:defRPr sz="2587"/>
+              <a:defRPr sz="2667"/>
             </a:lvl6pPr>
             <a:lvl7pPr>
-              <a:defRPr sz="2587"/>
+              <a:defRPr sz="2667"/>
             </a:lvl7pPr>
             <a:lvl8pPr>
-              <a:defRPr sz="2587"/>
+              <a:defRPr sz="2667"/>
             </a:lvl8pPr>
             <a:lvl9pPr>
-              <a:defRPr sz="2587"/>
+              <a:defRPr sz="2667"/>
             </a:lvl9pPr>
           </a:lstStyle>
           <a:p>
@@ -2026,8 +2026,8 @@
         </p:nvSpPr>
         <p:spPr>
           <a:xfrm>
-            <a:off x="839788" y="2660809"/>
-            <a:ext cx="3932237" cy="4929478"/>
+            <a:off x="839788" y="3730943"/>
+            <a:ext cx="3932237" cy="6912032"/>
           </a:xfrm>
         </p:spPr>
         <p:txBody>
@@ -2035,39 +2035,39 @@
           <a:lstStyle>
             <a:lvl1pPr marL="0" indent="0">
               <a:buNone/>
-              <a:defRPr sz="2069"/>
+              <a:defRPr sz="2133"/>
             </a:lvl1pPr>
-            <a:lvl2pPr marL="591297" indent="0">
-              <a:buNone/>
-              <a:defRPr sz="1811"/>
+            <a:lvl2pPr marL="609585" indent="0">
+              <a:buNone/>
+              <a:defRPr sz="1867"/>
             </a:lvl2pPr>
-            <a:lvl3pPr marL="1182594" indent="0">
-              <a:buNone/>
-              <a:defRPr sz="1552"/>
+            <a:lvl3pPr marL="1219170" indent="0">
+              <a:buNone/>
+              <a:defRPr sz="1600"/>
             </a:lvl3pPr>
-            <a:lvl4pPr marL="1773890" indent="0">
-              <a:buNone/>
-              <a:defRPr sz="1293"/>
+            <a:lvl4pPr marL="1828754" indent="0">
+              <a:buNone/>
+              <a:defRPr sz="1333"/>
             </a:lvl4pPr>
-            <a:lvl5pPr marL="2365187" indent="0">
-              <a:buNone/>
-              <a:defRPr sz="1293"/>
+            <a:lvl5pPr marL="2438339" indent="0">
+              <a:buNone/>
+              <a:defRPr sz="1333"/>
             </a:lvl5pPr>
-            <a:lvl6pPr marL="2956484" indent="0">
-              <a:buNone/>
-              <a:defRPr sz="1293"/>
+            <a:lvl6pPr marL="3047924" indent="0">
+              <a:buNone/>
+              <a:defRPr sz="1333"/>
             </a:lvl6pPr>
-            <a:lvl7pPr marL="3547781" indent="0">
-              <a:buNone/>
-              <a:defRPr sz="1293"/>
+            <a:lvl7pPr marL="3657509" indent="0">
+              <a:buNone/>
+              <a:defRPr sz="1333"/>
             </a:lvl7pPr>
-            <a:lvl8pPr marL="4139077" indent="0">
-              <a:buNone/>
-              <a:defRPr sz="1293"/>
+            <a:lvl8pPr marL="4267093" indent="0">
+              <a:buNone/>
+              <a:defRPr sz="1333"/>
             </a:lvl8pPr>
-            <a:lvl9pPr marL="4730374" indent="0">
-              <a:buNone/>
-              <a:defRPr sz="1293"/>
+            <a:lvl9pPr marL="4876678" indent="0">
+              <a:buNone/>
+              <a:defRPr sz="1333"/>
             </a:lvl9pPr>
           </a:lstStyle>
           <a:p>
@@ -2096,7 +2096,7 @@
           <a:p>
             <a:fld id="{4D01D722-A7B2-4018-AAE4-87180B192DC8}" type="datetimeFigureOut">
               <a:rPr lang="en-US" smtClean="0"/>
-              <a:t>2/7/2017</a:t>
+              <a:t>2/13/2017</a:t>
             </a:fld>
             <a:endParaRPr lang="en-US"/>
           </a:p>
@@ -2147,7 +2147,7 @@
     </p:spTree>
     <p:extLst>
       <p:ext uri="{BB962C8B-B14F-4D97-AF65-F5344CB8AC3E}">
-        <p14:creationId xmlns:p14="http://schemas.microsoft.com/office/powerpoint/2010/main" val="2862654696"/>
+        <p14:creationId xmlns:p14="http://schemas.microsoft.com/office/powerpoint/2010/main" val="1821454296"/>
       </p:ext>
     </p:extLst>
   </p:cSld>
@@ -2186,15 +2186,15 @@
         </p:nvSpPr>
         <p:spPr>
           <a:xfrm>
-            <a:off x="839788" y="591291"/>
-            <a:ext cx="3932237" cy="2069518"/>
+            <a:off x="839788" y="829098"/>
+            <a:ext cx="3932237" cy="2901844"/>
           </a:xfrm>
         </p:spPr>
         <p:txBody>
           <a:bodyPr anchor="b"/>
           <a:lstStyle>
             <a:lvl1pPr>
-              <a:defRPr sz="4139"/>
+              <a:defRPr sz="4267"/>
             </a:lvl1pPr>
           </a:lstStyle>
           <a:p>
@@ -2218,8 +2218,8 @@
         </p:nvSpPr>
         <p:spPr>
           <a:xfrm>
-            <a:off x="5183188" y="1277026"/>
-            <a:ext cx="6172200" cy="6302996"/>
+            <a:off x="5183188" y="1790625"/>
+            <a:ext cx="6172200" cy="8837958"/>
           </a:xfrm>
         </p:spPr>
         <p:txBody>
@@ -2227,39 +2227,39 @@
           <a:lstStyle>
             <a:lvl1pPr marL="0" indent="0">
               <a:buNone/>
-              <a:defRPr sz="4139"/>
+              <a:defRPr sz="4267"/>
             </a:lvl1pPr>
-            <a:lvl2pPr marL="591297" indent="0">
-              <a:buNone/>
-              <a:defRPr sz="3621"/>
+            <a:lvl2pPr marL="609585" indent="0">
+              <a:buNone/>
+              <a:defRPr sz="3733"/>
             </a:lvl2pPr>
-            <a:lvl3pPr marL="1182594" indent="0">
-              <a:buNone/>
-              <a:defRPr sz="3104"/>
+            <a:lvl3pPr marL="1219170" indent="0">
+              <a:buNone/>
+              <a:defRPr sz="3200"/>
             </a:lvl3pPr>
-            <a:lvl4pPr marL="1773890" indent="0">
-              <a:buNone/>
-              <a:defRPr sz="2587"/>
+            <a:lvl4pPr marL="1828754" indent="0">
+              <a:buNone/>
+              <a:defRPr sz="2667"/>
             </a:lvl4pPr>
-            <a:lvl5pPr marL="2365187" indent="0">
-              <a:buNone/>
-              <a:defRPr sz="2587"/>
+            <a:lvl5pPr marL="2438339" indent="0">
+              <a:buNone/>
+              <a:defRPr sz="2667"/>
             </a:lvl5pPr>
-            <a:lvl6pPr marL="2956484" indent="0">
-              <a:buNone/>
-              <a:defRPr sz="2587"/>
+            <a:lvl6pPr marL="3047924" indent="0">
+              <a:buNone/>
+              <a:defRPr sz="2667"/>
             </a:lvl6pPr>
-            <a:lvl7pPr marL="3547781" indent="0">
-              <a:buNone/>
-              <a:defRPr sz="2587"/>
+            <a:lvl7pPr marL="3657509" indent="0">
+              <a:buNone/>
+              <a:defRPr sz="2667"/>
             </a:lvl7pPr>
-            <a:lvl8pPr marL="4139077" indent="0">
-              <a:buNone/>
-              <a:defRPr sz="2587"/>
+            <a:lvl8pPr marL="4267093" indent="0">
+              <a:buNone/>
+              <a:defRPr sz="2667"/>
             </a:lvl8pPr>
-            <a:lvl9pPr marL="4730374" indent="0">
-              <a:buNone/>
-              <a:defRPr sz="2587"/>
+            <a:lvl9pPr marL="4876678" indent="0">
+              <a:buNone/>
+              <a:defRPr sz="2667"/>
             </a:lvl9pPr>
           </a:lstStyle>
           <a:p>
@@ -2283,8 +2283,8 @@
         </p:nvSpPr>
         <p:spPr>
           <a:xfrm>
-            <a:off x="839788" y="2660809"/>
-            <a:ext cx="3932237" cy="4929478"/>
+            <a:off x="839788" y="3730943"/>
+            <a:ext cx="3932237" cy="6912032"/>
           </a:xfrm>
         </p:spPr>
         <p:txBody>
@@ -2292,39 +2292,39 @@
           <a:lstStyle>
             <a:lvl1pPr marL="0" indent="0">
               <a:buNone/>
-              <a:defRPr sz="2069"/>
+              <a:defRPr sz="2133"/>
             </a:lvl1pPr>
-            <a:lvl2pPr marL="591297" indent="0">
-              <a:buNone/>
-              <a:defRPr sz="1811"/>
+            <a:lvl2pPr marL="609585" indent="0">
+              <a:buNone/>
+              <a:defRPr sz="1867"/>
             </a:lvl2pPr>
-            <a:lvl3pPr marL="1182594" indent="0">
-              <a:buNone/>
-              <a:defRPr sz="1552"/>
+            <a:lvl3pPr marL="1219170" indent="0">
+              <a:buNone/>
+              <a:defRPr sz="1600"/>
             </a:lvl3pPr>
-            <a:lvl4pPr marL="1773890" indent="0">
-              <a:buNone/>
-              <a:defRPr sz="1293"/>
+            <a:lvl4pPr marL="1828754" indent="0">
+              <a:buNone/>
+              <a:defRPr sz="1333"/>
             </a:lvl4pPr>
-            <a:lvl5pPr marL="2365187" indent="0">
-              <a:buNone/>
-              <a:defRPr sz="1293"/>
+            <a:lvl5pPr marL="2438339" indent="0">
+              <a:buNone/>
+              <a:defRPr sz="1333"/>
             </a:lvl5pPr>
-            <a:lvl6pPr marL="2956484" indent="0">
-              <a:buNone/>
-              <a:defRPr sz="1293"/>
+            <a:lvl6pPr marL="3047924" indent="0">
+              <a:buNone/>
+              <a:defRPr sz="1333"/>
             </a:lvl6pPr>
-            <a:lvl7pPr marL="3547781" indent="0">
-              <a:buNone/>
-              <a:defRPr sz="1293"/>
+            <a:lvl7pPr marL="3657509" indent="0">
+              <a:buNone/>
+              <a:defRPr sz="1333"/>
             </a:lvl7pPr>
-            <a:lvl8pPr marL="4139077" indent="0">
-              <a:buNone/>
-              <a:defRPr sz="1293"/>
+            <a:lvl8pPr marL="4267093" indent="0">
+              <a:buNone/>
+              <a:defRPr sz="1333"/>
             </a:lvl8pPr>
-            <a:lvl9pPr marL="4730374" indent="0">
-              <a:buNone/>
-              <a:defRPr sz="1293"/>
+            <a:lvl9pPr marL="4876678" indent="0">
+              <a:buNone/>
+              <a:defRPr sz="1333"/>
             </a:lvl9pPr>
           </a:lstStyle>
           <a:p>
@@ -2353,7 +2353,7 @@
           <a:p>
             <a:fld id="{4D01D722-A7B2-4018-AAE4-87180B192DC8}" type="datetimeFigureOut">
               <a:rPr lang="en-US" smtClean="0"/>
-              <a:t>2/7/2017</a:t>
+              <a:t>2/13/2017</a:t>
             </a:fld>
             <a:endParaRPr lang="en-US"/>
           </a:p>
@@ -2404,7 +2404,7 @@
     </p:spTree>
     <p:extLst>
       <p:ext uri="{BB962C8B-B14F-4D97-AF65-F5344CB8AC3E}">
-        <p14:creationId xmlns:p14="http://schemas.microsoft.com/office/powerpoint/2010/main" val="3519102916"/>
+        <p14:creationId xmlns:p14="http://schemas.microsoft.com/office/powerpoint/2010/main" val="3187112766"/>
       </p:ext>
     </p:extLst>
   </p:cSld>
@@ -2448,8 +2448,8 @@
         </p:nvSpPr>
         <p:spPr>
           <a:xfrm>
-            <a:off x="838200" y="472213"/>
-            <a:ext cx="10515600" cy="1714334"/>
+            <a:off x="838200" y="662130"/>
+            <a:ext cx="10515600" cy="2403810"/>
           </a:xfrm>
           <a:prstGeom prst="rect">
             <a:avLst/>
@@ -2481,8 +2481,8 @@
         </p:nvSpPr>
         <p:spPr>
           <a:xfrm>
-            <a:off x="838200" y="2361057"/>
-            <a:ext cx="10515600" cy="5627529"/>
+            <a:off x="838200" y="3310636"/>
+            <a:ext cx="10515600" cy="7890829"/>
           </a:xfrm>
           <a:prstGeom prst="rect">
             <a:avLst/>
@@ -2543,8 +2543,8 @@
         </p:nvSpPr>
         <p:spPr>
           <a:xfrm>
-            <a:off x="838200" y="8220588"/>
-            <a:ext cx="2743200" cy="472211"/>
+            <a:off x="838200" y="11526773"/>
+            <a:ext cx="2743200" cy="662127"/>
           </a:xfrm>
           <a:prstGeom prst="rect">
             <a:avLst/>
@@ -2554,7 +2554,7 @@
           <a:bodyPr vert="horz" lIns="91440" tIns="45720" rIns="91440" bIns="45720" rtlCol="0" anchor="ctr"/>
           <a:lstStyle>
             <a:lvl1pPr algn="l">
-              <a:defRPr sz="1552">
+              <a:defRPr sz="1600">
                 <a:solidFill>
                   <a:schemeClr val="tx1">
                     <a:tint val="75000"/>
@@ -2566,7 +2566,7 @@
           <a:p>
             <a:fld id="{4D01D722-A7B2-4018-AAE4-87180B192DC8}" type="datetimeFigureOut">
               <a:rPr lang="en-US" smtClean="0"/>
-              <a:t>2/7/2017</a:t>
+              <a:t>2/13/2017</a:t>
             </a:fld>
             <a:endParaRPr lang="en-US"/>
           </a:p>
@@ -2584,8 +2584,8 @@
         </p:nvSpPr>
         <p:spPr>
           <a:xfrm>
-            <a:off x="4038600" y="8220588"/>
-            <a:ext cx="4114800" cy="472211"/>
+            <a:off x="4038600" y="11526773"/>
+            <a:ext cx="4114800" cy="662127"/>
           </a:xfrm>
           <a:prstGeom prst="rect">
             <a:avLst/>
@@ -2595,7 +2595,7 @@
           <a:bodyPr vert="horz" lIns="91440" tIns="45720" rIns="91440" bIns="45720" rtlCol="0" anchor="ctr"/>
           <a:lstStyle>
             <a:lvl1pPr algn="ctr">
-              <a:defRPr sz="1552">
+              <a:defRPr sz="1600">
                 <a:solidFill>
                   <a:schemeClr val="tx1">
                     <a:tint val="75000"/>
@@ -2621,8 +2621,8 @@
         </p:nvSpPr>
         <p:spPr>
           <a:xfrm>
-            <a:off x="8610600" y="8220588"/>
-            <a:ext cx="2743200" cy="472211"/>
+            <a:off x="8610600" y="11526773"/>
+            <a:ext cx="2743200" cy="662127"/>
           </a:xfrm>
           <a:prstGeom prst="rect">
             <a:avLst/>
@@ -2632,7 +2632,7 @@
           <a:bodyPr vert="horz" lIns="91440" tIns="45720" rIns="91440" bIns="45720" rtlCol="0" anchor="ctr"/>
           <a:lstStyle>
             <a:lvl1pPr algn="r">
-              <a:defRPr sz="1552">
+              <a:defRPr sz="1600">
                 <a:solidFill>
                   <a:schemeClr val="tx1">
                     <a:tint val="75000"/>
@@ -2653,27 +2653,27 @@
     </p:spTree>
     <p:extLst>
       <p:ext uri="{BB962C8B-B14F-4D97-AF65-F5344CB8AC3E}">
-        <p14:creationId xmlns:p14="http://schemas.microsoft.com/office/powerpoint/2010/main" val="1295130947"/>
+        <p14:creationId xmlns:p14="http://schemas.microsoft.com/office/powerpoint/2010/main" val="836200309"/>
       </p:ext>
     </p:extLst>
   </p:cSld>
   <p:clrMap bg1="lt1" tx1="dk1" bg2="lt2" tx2="dk2" accent1="accent1" accent2="accent2" accent3="accent3" accent4="accent4" accent5="accent5" accent6="accent6" hlink="hlink" folHlink="folHlink"/>
   <p:sldLayoutIdLst>
-    <p:sldLayoutId id="2147483661" r:id="rId1"/>
-    <p:sldLayoutId id="2147483662" r:id="rId2"/>
-    <p:sldLayoutId id="2147483663" r:id="rId3"/>
-    <p:sldLayoutId id="2147483664" r:id="rId4"/>
-    <p:sldLayoutId id="2147483665" r:id="rId5"/>
-    <p:sldLayoutId id="2147483666" r:id="rId6"/>
-    <p:sldLayoutId id="2147483667" r:id="rId7"/>
-    <p:sldLayoutId id="2147483668" r:id="rId8"/>
-    <p:sldLayoutId id="2147483669" r:id="rId9"/>
-    <p:sldLayoutId id="2147483670" r:id="rId10"/>
-    <p:sldLayoutId id="2147483671" r:id="rId11"/>
+    <p:sldLayoutId id="2147483673" r:id="rId1"/>
+    <p:sldLayoutId id="2147483674" r:id="rId2"/>
+    <p:sldLayoutId id="2147483675" r:id="rId3"/>
+    <p:sldLayoutId id="2147483676" r:id="rId4"/>
+    <p:sldLayoutId id="2147483677" r:id="rId5"/>
+    <p:sldLayoutId id="2147483678" r:id="rId6"/>
+    <p:sldLayoutId id="2147483679" r:id="rId7"/>
+    <p:sldLayoutId id="2147483680" r:id="rId8"/>
+    <p:sldLayoutId id="2147483681" r:id="rId9"/>
+    <p:sldLayoutId id="2147483682" r:id="rId10"/>
+    <p:sldLayoutId id="2147483683" r:id="rId11"/>
   </p:sldLayoutIdLst>
   <p:txStyles>
     <p:titleStyle>
-      <a:lvl1pPr algn="l" defTabSz="1182594" rtl="0" eaLnBrk="1" latinLnBrk="0" hangingPunct="1">
+      <a:lvl1pPr algn="l" defTabSz="1219170" rtl="0" eaLnBrk="1" latinLnBrk="0" hangingPunct="1">
         <a:lnSpc>
           <a:spcPct val="90000"/>
         </a:lnSpc>
@@ -2681,7 +2681,7 @@
           <a:spcPct val="0"/>
         </a:spcBef>
         <a:buNone/>
-        <a:defRPr sz="5691" kern="1200">
+        <a:defRPr sz="5867" kern="1200">
           <a:solidFill>
             <a:schemeClr val="tx1"/>
           </a:solidFill>
@@ -2692,16 +2692,16 @@
       </a:lvl1pPr>
     </p:titleStyle>
     <p:bodyStyle>
-      <a:lvl1pPr marL="295648" indent="-295648" algn="l" defTabSz="1182594" rtl="0" eaLnBrk="1" latinLnBrk="0" hangingPunct="1">
+      <a:lvl1pPr marL="304792" indent="-304792" algn="l" defTabSz="1219170" rtl="0" eaLnBrk="1" latinLnBrk="0" hangingPunct="1">
         <a:lnSpc>
           <a:spcPct val="90000"/>
         </a:lnSpc>
         <a:spcBef>
-          <a:spcPts val="1293"/>
+          <a:spcPts val="1333"/>
         </a:spcBef>
         <a:buFont typeface="Arial" panose="020B0604020202020204" pitchFamily="34" charset="0"/>
         <a:buChar char="•"/>
-        <a:defRPr sz="3621" kern="1200">
+        <a:defRPr sz="3733" kern="1200">
           <a:solidFill>
             <a:schemeClr val="tx1"/>
           </a:solidFill>
@@ -2710,16 +2710,16 @@
           <a:cs typeface="+mn-cs"/>
         </a:defRPr>
       </a:lvl1pPr>
-      <a:lvl2pPr marL="886945" indent="-295648" algn="l" defTabSz="1182594" rtl="0" eaLnBrk="1" latinLnBrk="0" hangingPunct="1">
+      <a:lvl2pPr marL="914377" indent="-304792" algn="l" defTabSz="1219170" rtl="0" eaLnBrk="1" latinLnBrk="0" hangingPunct="1">
         <a:lnSpc>
           <a:spcPct val="90000"/>
         </a:lnSpc>
         <a:spcBef>
-          <a:spcPts val="647"/>
+          <a:spcPts val="667"/>
         </a:spcBef>
         <a:buFont typeface="Arial" panose="020B0604020202020204" pitchFamily="34" charset="0"/>
         <a:buChar char="•"/>
-        <a:defRPr sz="3104" kern="1200">
+        <a:defRPr sz="3200" kern="1200">
           <a:solidFill>
             <a:schemeClr val="tx1"/>
           </a:solidFill>
@@ -2728,16 +2728,16 @@
           <a:cs typeface="+mn-cs"/>
         </a:defRPr>
       </a:lvl2pPr>
-      <a:lvl3pPr marL="1478242" indent="-295648" algn="l" defTabSz="1182594" rtl="0" eaLnBrk="1" latinLnBrk="0" hangingPunct="1">
+      <a:lvl3pPr marL="1523962" indent="-304792" algn="l" defTabSz="1219170" rtl="0" eaLnBrk="1" latinLnBrk="0" hangingPunct="1">
         <a:lnSpc>
           <a:spcPct val="90000"/>
         </a:lnSpc>
         <a:spcBef>
-          <a:spcPts val="647"/>
+          <a:spcPts val="667"/>
         </a:spcBef>
         <a:buFont typeface="Arial" panose="020B0604020202020204" pitchFamily="34" charset="0"/>
         <a:buChar char="•"/>
-        <a:defRPr sz="2587" kern="1200">
+        <a:defRPr sz="2667" kern="1200">
           <a:solidFill>
             <a:schemeClr val="tx1"/>
           </a:solidFill>
@@ -2746,16 +2746,16 @@
           <a:cs typeface="+mn-cs"/>
         </a:defRPr>
       </a:lvl3pPr>
-      <a:lvl4pPr marL="2069539" indent="-295648" algn="l" defTabSz="1182594" rtl="0" eaLnBrk="1" latinLnBrk="0" hangingPunct="1">
+      <a:lvl4pPr marL="2133547" indent="-304792" algn="l" defTabSz="1219170" rtl="0" eaLnBrk="1" latinLnBrk="0" hangingPunct="1">
         <a:lnSpc>
           <a:spcPct val="90000"/>
         </a:lnSpc>
         <a:spcBef>
-          <a:spcPts val="647"/>
+          <a:spcPts val="667"/>
         </a:spcBef>
         <a:buFont typeface="Arial" panose="020B0604020202020204" pitchFamily="34" charset="0"/>
         <a:buChar char="•"/>
-        <a:defRPr sz="2328" kern="1200">
+        <a:defRPr sz="2400" kern="1200">
           <a:solidFill>
             <a:schemeClr val="tx1"/>
           </a:solidFill>
@@ -2764,16 +2764,16 @@
           <a:cs typeface="+mn-cs"/>
         </a:defRPr>
       </a:lvl4pPr>
-      <a:lvl5pPr marL="2660835" indent="-295648" algn="l" defTabSz="1182594" rtl="0" eaLnBrk="1" latinLnBrk="0" hangingPunct="1">
+      <a:lvl5pPr marL="2743131" indent="-304792" algn="l" defTabSz="1219170" rtl="0" eaLnBrk="1" latinLnBrk="0" hangingPunct="1">
         <a:lnSpc>
           <a:spcPct val="90000"/>
         </a:lnSpc>
         <a:spcBef>
-          <a:spcPts val="647"/>
+          <a:spcPts val="667"/>
         </a:spcBef>
         <a:buFont typeface="Arial" panose="020B0604020202020204" pitchFamily="34" charset="0"/>
         <a:buChar char="•"/>
-        <a:defRPr sz="2328" kern="1200">
+        <a:defRPr sz="2400" kern="1200">
           <a:solidFill>
             <a:schemeClr val="tx1"/>
           </a:solidFill>
@@ -2782,16 +2782,16 @@
           <a:cs typeface="+mn-cs"/>
         </a:defRPr>
       </a:lvl5pPr>
-      <a:lvl6pPr marL="3252132" indent="-295648" algn="l" defTabSz="1182594" rtl="0" eaLnBrk="1" latinLnBrk="0" hangingPunct="1">
+      <a:lvl6pPr marL="3352716" indent="-304792" algn="l" defTabSz="1219170" rtl="0" eaLnBrk="1" latinLnBrk="0" hangingPunct="1">
         <a:lnSpc>
           <a:spcPct val="90000"/>
         </a:lnSpc>
         <a:spcBef>
-          <a:spcPts val="647"/>
+          <a:spcPts val="667"/>
         </a:spcBef>
         <a:buFont typeface="Arial" panose="020B0604020202020204" pitchFamily="34" charset="0"/>
         <a:buChar char="•"/>
-        <a:defRPr sz="2328" kern="1200">
+        <a:defRPr sz="2400" kern="1200">
           <a:solidFill>
             <a:schemeClr val="tx1"/>
           </a:solidFill>
@@ -2800,16 +2800,16 @@
           <a:cs typeface="+mn-cs"/>
         </a:defRPr>
       </a:lvl6pPr>
-      <a:lvl7pPr marL="3843429" indent="-295648" algn="l" defTabSz="1182594" rtl="0" eaLnBrk="1" latinLnBrk="0" hangingPunct="1">
+      <a:lvl7pPr marL="3962301" indent="-304792" algn="l" defTabSz="1219170" rtl="0" eaLnBrk="1" latinLnBrk="0" hangingPunct="1">
         <a:lnSpc>
           <a:spcPct val="90000"/>
         </a:lnSpc>
         <a:spcBef>
-          <a:spcPts val="647"/>
+          <a:spcPts val="667"/>
         </a:spcBef>
         <a:buFont typeface="Arial" panose="020B0604020202020204" pitchFamily="34" charset="0"/>
         <a:buChar char="•"/>
-        <a:defRPr sz="2328" kern="1200">
+        <a:defRPr sz="2400" kern="1200">
           <a:solidFill>
             <a:schemeClr val="tx1"/>
           </a:solidFill>
@@ -2818,16 +2818,16 @@
           <a:cs typeface="+mn-cs"/>
         </a:defRPr>
       </a:lvl7pPr>
-      <a:lvl8pPr marL="4434726" indent="-295648" algn="l" defTabSz="1182594" rtl="0" eaLnBrk="1" latinLnBrk="0" hangingPunct="1">
+      <a:lvl8pPr marL="4571886" indent="-304792" algn="l" defTabSz="1219170" rtl="0" eaLnBrk="1" latinLnBrk="0" hangingPunct="1">
         <a:lnSpc>
           <a:spcPct val="90000"/>
         </a:lnSpc>
         <a:spcBef>
-          <a:spcPts val="647"/>
+          <a:spcPts val="667"/>
         </a:spcBef>
         <a:buFont typeface="Arial" panose="020B0604020202020204" pitchFamily="34" charset="0"/>
         <a:buChar char="•"/>
-        <a:defRPr sz="2328" kern="1200">
+        <a:defRPr sz="2400" kern="1200">
           <a:solidFill>
             <a:schemeClr val="tx1"/>
           </a:solidFill>
@@ -2836,16 +2836,16 @@
           <a:cs typeface="+mn-cs"/>
         </a:defRPr>
       </a:lvl8pPr>
-      <a:lvl9pPr marL="5026022" indent="-295648" algn="l" defTabSz="1182594" rtl="0" eaLnBrk="1" latinLnBrk="0" hangingPunct="1">
+      <a:lvl9pPr marL="5181470" indent="-304792" algn="l" defTabSz="1219170" rtl="0" eaLnBrk="1" latinLnBrk="0" hangingPunct="1">
         <a:lnSpc>
           <a:spcPct val="90000"/>
         </a:lnSpc>
         <a:spcBef>
-          <a:spcPts val="647"/>
+          <a:spcPts val="667"/>
         </a:spcBef>
         <a:buFont typeface="Arial" panose="020B0604020202020204" pitchFamily="34" charset="0"/>
         <a:buChar char="•"/>
-        <a:defRPr sz="2328" kern="1200">
+        <a:defRPr sz="2400" kern="1200">
           <a:solidFill>
             <a:schemeClr val="tx1"/>
           </a:solidFill>
@@ -2859,8 +2859,8 @@
       <a:defPPr>
         <a:defRPr lang="en-US"/>
       </a:defPPr>
-      <a:lvl1pPr marL="0" algn="l" defTabSz="1182594" rtl="0" eaLnBrk="1" latinLnBrk="0" hangingPunct="1">
-        <a:defRPr sz="2328" kern="1200">
+      <a:lvl1pPr marL="0" algn="l" defTabSz="1219170" rtl="0" eaLnBrk="1" latinLnBrk="0" hangingPunct="1">
+        <a:defRPr sz="2400" kern="1200">
           <a:solidFill>
             <a:schemeClr val="tx1"/>
           </a:solidFill>
@@ -2869,8 +2869,8 @@
           <a:cs typeface="+mn-cs"/>
         </a:defRPr>
       </a:lvl1pPr>
-      <a:lvl2pPr marL="591297" algn="l" defTabSz="1182594" rtl="0" eaLnBrk="1" latinLnBrk="0" hangingPunct="1">
-        <a:defRPr sz="2328" kern="1200">
+      <a:lvl2pPr marL="609585" algn="l" defTabSz="1219170" rtl="0" eaLnBrk="1" latinLnBrk="0" hangingPunct="1">
+        <a:defRPr sz="2400" kern="1200">
           <a:solidFill>
             <a:schemeClr val="tx1"/>
           </a:solidFill>
@@ -2879,8 +2879,8 @@
           <a:cs typeface="+mn-cs"/>
         </a:defRPr>
       </a:lvl2pPr>
-      <a:lvl3pPr marL="1182594" algn="l" defTabSz="1182594" rtl="0" eaLnBrk="1" latinLnBrk="0" hangingPunct="1">
-        <a:defRPr sz="2328" kern="1200">
+      <a:lvl3pPr marL="1219170" algn="l" defTabSz="1219170" rtl="0" eaLnBrk="1" latinLnBrk="0" hangingPunct="1">
+        <a:defRPr sz="2400" kern="1200">
           <a:solidFill>
             <a:schemeClr val="tx1"/>
           </a:solidFill>
@@ -2889,8 +2889,8 @@
           <a:cs typeface="+mn-cs"/>
         </a:defRPr>
       </a:lvl3pPr>
-      <a:lvl4pPr marL="1773890" algn="l" defTabSz="1182594" rtl="0" eaLnBrk="1" latinLnBrk="0" hangingPunct="1">
-        <a:defRPr sz="2328" kern="1200">
+      <a:lvl4pPr marL="1828754" algn="l" defTabSz="1219170" rtl="0" eaLnBrk="1" latinLnBrk="0" hangingPunct="1">
+        <a:defRPr sz="2400" kern="1200">
           <a:solidFill>
             <a:schemeClr val="tx1"/>
           </a:solidFill>
@@ -2899,8 +2899,8 @@
           <a:cs typeface="+mn-cs"/>
         </a:defRPr>
       </a:lvl4pPr>
-      <a:lvl5pPr marL="2365187" algn="l" defTabSz="1182594" rtl="0" eaLnBrk="1" latinLnBrk="0" hangingPunct="1">
-        <a:defRPr sz="2328" kern="1200">
+      <a:lvl5pPr marL="2438339" algn="l" defTabSz="1219170" rtl="0" eaLnBrk="1" latinLnBrk="0" hangingPunct="1">
+        <a:defRPr sz="2400" kern="1200">
           <a:solidFill>
             <a:schemeClr val="tx1"/>
           </a:solidFill>
@@ -2909,8 +2909,8 @@
           <a:cs typeface="+mn-cs"/>
         </a:defRPr>
       </a:lvl5pPr>
-      <a:lvl6pPr marL="2956484" algn="l" defTabSz="1182594" rtl="0" eaLnBrk="1" latinLnBrk="0" hangingPunct="1">
-        <a:defRPr sz="2328" kern="1200">
+      <a:lvl6pPr marL="3047924" algn="l" defTabSz="1219170" rtl="0" eaLnBrk="1" latinLnBrk="0" hangingPunct="1">
+        <a:defRPr sz="2400" kern="1200">
           <a:solidFill>
             <a:schemeClr val="tx1"/>
           </a:solidFill>
@@ -2919,8 +2919,8 @@
           <a:cs typeface="+mn-cs"/>
         </a:defRPr>
       </a:lvl6pPr>
-      <a:lvl7pPr marL="3547781" algn="l" defTabSz="1182594" rtl="0" eaLnBrk="1" latinLnBrk="0" hangingPunct="1">
-        <a:defRPr sz="2328" kern="1200">
+      <a:lvl7pPr marL="3657509" algn="l" defTabSz="1219170" rtl="0" eaLnBrk="1" latinLnBrk="0" hangingPunct="1">
+        <a:defRPr sz="2400" kern="1200">
           <a:solidFill>
             <a:schemeClr val="tx1"/>
           </a:solidFill>
@@ -2929,8 +2929,8 @@
           <a:cs typeface="+mn-cs"/>
         </a:defRPr>
       </a:lvl7pPr>
-      <a:lvl8pPr marL="4139077" algn="l" defTabSz="1182594" rtl="0" eaLnBrk="1" latinLnBrk="0" hangingPunct="1">
-        <a:defRPr sz="2328" kern="1200">
+      <a:lvl8pPr marL="4267093" algn="l" defTabSz="1219170" rtl="0" eaLnBrk="1" latinLnBrk="0" hangingPunct="1">
+        <a:defRPr sz="2400" kern="1200">
           <a:solidFill>
             <a:schemeClr val="tx1"/>
           </a:solidFill>
@@ -2939,8 +2939,8 @@
           <a:cs typeface="+mn-cs"/>
         </a:defRPr>
       </a:lvl8pPr>
-      <a:lvl9pPr marL="4730374" algn="l" defTabSz="1182594" rtl="0" eaLnBrk="1" latinLnBrk="0" hangingPunct="1">
-        <a:defRPr sz="2328" kern="1200">
+      <a:lvl9pPr marL="4876678" algn="l" defTabSz="1219170" rtl="0" eaLnBrk="1" latinLnBrk="0" hangingPunct="1">
+        <a:defRPr sz="2400" kern="1200">
           <a:solidFill>
             <a:schemeClr val="tx1"/>
           </a:solidFill>
@@ -2986,7 +2986,7 @@
         </p:blipFill>
         <p:spPr>
           <a:xfrm>
-            <a:off x="2764922" y="4026735"/>
+            <a:off x="2764922" y="5699456"/>
             <a:ext cx="6628930" cy="943268"/>
           </a:xfrm>
           <a:prstGeom prst="rect">
@@ -3009,7 +3009,7 @@
         </p:blipFill>
         <p:spPr>
           <a:xfrm>
-            <a:off x="2529157" y="1766744"/>
+            <a:off x="2529157" y="3550300"/>
             <a:ext cx="7086600" cy="1428750"/>
           </a:xfrm>
           <a:prstGeom prst="rect">
@@ -3025,7 +3025,7 @@
         </p:nvCxnSpPr>
         <p:spPr>
           <a:xfrm>
-            <a:off x="1763487" y="3292587"/>
+            <a:off x="1763488" y="5076143"/>
             <a:ext cx="8193315" cy="40482"/>
           </a:xfrm>
           <a:prstGeom prst="straightConnector1">
@@ -3061,7 +3061,7 @@
         </p:nvSpPr>
         <p:spPr>
           <a:xfrm>
-            <a:off x="9474169" y="2151224"/>
+            <a:off x="9474170" y="4533874"/>
             <a:ext cx="3483429" cy="523220"/>
           </a:xfrm>
           <a:prstGeom prst="rect">
@@ -3076,7 +3076,10 @@
           <a:lstStyle/>
           <a:p>
             <a:r>
-              <a:rPr lang="en-US" sz="2800" dirty="0"/>
+              <a:rPr lang="en-US" sz="2800" i="1" dirty="0">
+                <a:latin typeface="Times New Roman" panose="02020603050405020304" pitchFamily="18" charset="0"/>
+                <a:cs typeface="Times New Roman" panose="02020603050405020304" pitchFamily="18" charset="0"/>
+              </a:rPr>
               <a:t>x</a:t>
             </a:r>
           </a:p>
@@ -3090,7 +3093,7 @@
         </p:nvCxnSpPr>
         <p:spPr>
           <a:xfrm flipV="1">
-            <a:off x="5339400" y="2023428"/>
+            <a:off x="5339400" y="3806985"/>
             <a:ext cx="0" cy="1309641"/>
           </a:xfrm>
           <a:prstGeom prst="line">
@@ -3126,7 +3129,7 @@
         </p:nvSpPr>
         <p:spPr>
           <a:xfrm>
-            <a:off x="5177501" y="3170990"/>
+            <a:off x="5177502" y="4954546"/>
             <a:ext cx="3483429" cy="523220"/>
           </a:xfrm>
           <a:prstGeom prst="rect">
@@ -3141,14 +3144,23 @@
           <a:lstStyle/>
           <a:p>
             <a:r>
-              <a:rPr lang="en-US" sz="2800" dirty="0" err="1"/>
+              <a:rPr lang="en-US" sz="2800" i="1" dirty="0" err="1">
+                <a:latin typeface="Times New Roman" panose="02020603050405020304" pitchFamily="18" charset="0"/>
+                <a:cs typeface="Times New Roman" panose="02020603050405020304" pitchFamily="18" charset="0"/>
+              </a:rPr>
               <a:t>x</a:t>
             </a:r>
             <a:r>
-              <a:rPr lang="en-US" dirty="0" err="1"/>
+              <a:rPr lang="en-US" i="1" dirty="0" err="1">
+                <a:latin typeface="Times New Roman" panose="02020603050405020304" pitchFamily="18" charset="0"/>
+                <a:cs typeface="Times New Roman" panose="02020603050405020304" pitchFamily="18" charset="0"/>
+              </a:rPr>
               <a:t>s</a:t>
             </a:r>
-            <a:endParaRPr lang="en-US" dirty="0"/>
+            <a:endParaRPr lang="en-US" i="1" dirty="0">
+              <a:latin typeface="Times New Roman" panose="02020603050405020304" pitchFamily="18" charset="0"/>
+              <a:cs typeface="Times New Roman" panose="02020603050405020304" pitchFamily="18" charset="0"/>
+            </a:endParaRPr>
           </a:p>
         </p:txBody>
       </p:sp>
@@ -3160,7 +3172,7 @@
         </p:nvCxnSpPr>
         <p:spPr>
           <a:xfrm>
-            <a:off x="6919215" y="3881447"/>
+            <a:off x="6939997" y="3586821"/>
             <a:ext cx="385101" cy="639110"/>
           </a:xfrm>
           <a:prstGeom prst="straightConnector1">
@@ -3196,7 +3208,7 @@
         </p:nvCxnSpPr>
         <p:spPr>
           <a:xfrm flipH="1">
-            <a:off x="5439733" y="1456608"/>
+            <a:off x="5439734" y="3240165"/>
             <a:ext cx="145983" cy="846697"/>
           </a:xfrm>
           <a:prstGeom prst="straightConnector1">
@@ -3232,7 +3244,7 @@
         </p:nvCxnSpPr>
         <p:spPr>
           <a:xfrm>
-            <a:off x="3479740" y="1548161"/>
+            <a:off x="3479741" y="3331718"/>
             <a:ext cx="338855" cy="739287"/>
           </a:xfrm>
           <a:prstGeom prst="straightConnector1">
@@ -3268,7 +3280,7 @@
         </p:nvSpPr>
         <p:spPr>
           <a:xfrm>
-            <a:off x="4807478" y="1121080"/>
+            <a:off x="4807479" y="2904636"/>
             <a:ext cx="3983037" cy="369332"/>
           </a:xfrm>
           <a:prstGeom prst="rect">
@@ -3283,10 +3295,12 @@
           <a:lstStyle/>
           <a:p>
             <a:r>
-              <a:rPr lang="en-US" dirty="0"/>
+              <a:rPr lang="en-US" dirty="0">
+                <a:latin typeface="Times New Roman" panose="02020603050405020304" pitchFamily="18" charset="0"/>
+                <a:cs typeface="Times New Roman" panose="02020603050405020304" pitchFamily="18" charset="0"/>
+              </a:rPr>
               <a:t>Ferromagnetic sphere</a:t>
             </a:r>
-            <a:endParaRPr lang="en-US" dirty="0"/>
           </a:p>
         </p:txBody>
       </p:sp>
@@ -3298,7 +3312,7 @@
         </p:nvSpPr>
         <p:spPr>
           <a:xfrm>
-            <a:off x="6175828" y="3512115"/>
+            <a:off x="6175829" y="3252124"/>
             <a:ext cx="3983037" cy="369332"/>
           </a:xfrm>
           <a:prstGeom prst="rect">
@@ -3313,10 +3327,12 @@
           <a:lstStyle/>
           <a:p>
             <a:r>
-              <a:rPr lang="en-US" dirty="0"/>
+              <a:rPr lang="en-US" dirty="0">
+                <a:latin typeface="Times New Roman" panose="02020603050405020304" pitchFamily="18" charset="0"/>
+                <a:cs typeface="Times New Roman" panose="02020603050405020304" pitchFamily="18" charset="0"/>
+              </a:rPr>
               <a:t>Impact plate</a:t>
             </a:r>
-            <a:endParaRPr lang="en-US" dirty="0"/>
           </a:p>
         </p:txBody>
       </p:sp>
@@ -3328,7 +3344,7 @@
         </p:nvSpPr>
         <p:spPr>
           <a:xfrm>
-            <a:off x="2825413" y="1130282"/>
+            <a:off x="2815960" y="2911785"/>
             <a:ext cx="3983037" cy="369332"/>
           </a:xfrm>
           <a:prstGeom prst="rect">
@@ -3343,10 +3359,12 @@
           <a:lstStyle/>
           <a:p>
             <a:r>
-              <a:rPr lang="en-US" dirty="0"/>
+              <a:rPr lang="en-US" dirty="0">
+                <a:latin typeface="Times New Roman" panose="02020603050405020304" pitchFamily="18" charset="0"/>
+                <a:cs typeface="Times New Roman" panose="02020603050405020304" pitchFamily="18" charset="0"/>
+              </a:rPr>
               <a:t>Spring</a:t>
             </a:r>
-            <a:endParaRPr lang="en-US" dirty="0"/>
           </a:p>
         </p:txBody>
       </p:sp>
@@ -3358,7 +3376,7 @@
         </p:nvCxnSpPr>
         <p:spPr>
           <a:xfrm flipV="1">
-            <a:off x="1839688" y="5281009"/>
+            <a:off x="1839688" y="7064565"/>
             <a:ext cx="8049380" cy="45394"/>
           </a:xfrm>
           <a:prstGeom prst="straightConnector1">
@@ -3394,7 +3412,7 @@
         </p:nvCxnSpPr>
         <p:spPr>
           <a:xfrm flipV="1">
-            <a:off x="4266981" y="4109718"/>
+            <a:off x="4266981" y="5893275"/>
             <a:ext cx="0" cy="1309641"/>
           </a:xfrm>
           <a:prstGeom prst="line">
@@ -3430,7 +3448,7 @@
         </p:nvSpPr>
         <p:spPr>
           <a:xfrm>
-            <a:off x="4094375" y="5281009"/>
+            <a:off x="4094376" y="7064565"/>
             <a:ext cx="3483429" cy="523220"/>
           </a:xfrm>
           <a:prstGeom prst="rect">
@@ -3445,22 +3463,33 @@
           <a:lstStyle/>
           <a:p>
             <a:r>
-              <a:rPr lang="en-US" sz="2800" dirty="0" err="1"/>
+              <a:rPr lang="en-US" sz="2800" i="1" dirty="0" err="1">
+                <a:latin typeface="Times New Roman" panose="02020603050405020304" pitchFamily="18" charset="0"/>
+                <a:cs typeface="Times New Roman" panose="02020603050405020304" pitchFamily="18" charset="0"/>
+              </a:rPr>
               <a:t>x</a:t>
             </a:r>
             <a:r>
-              <a:rPr lang="en-US" dirty="0" err="1"/>
+              <a:rPr lang="en-US" i="1" dirty="0" err="1">
+                <a:latin typeface="Times New Roman" panose="02020603050405020304" pitchFamily="18" charset="0"/>
+                <a:cs typeface="Times New Roman" panose="02020603050405020304" pitchFamily="18" charset="0"/>
+              </a:rPr>
               <a:t>s</a:t>
             </a:r>
             <a:r>
-              <a:rPr lang="en-US" sz="2800" dirty="0"/>
+              <a:rPr lang="en-US" sz="2800" i="1" dirty="0">
+                <a:latin typeface="Times New Roman" panose="02020603050405020304" pitchFamily="18" charset="0"/>
+                <a:cs typeface="Times New Roman" panose="02020603050405020304" pitchFamily="18" charset="0"/>
+              </a:rPr>
               <a:t>=</a:t>
             </a:r>
             <a:r>
-              <a:rPr lang="en-US" sz="2400" dirty="0"/>
+              <a:rPr lang="en-US" sz="2400" i="1" dirty="0">
+                <a:latin typeface="Times New Roman" panose="02020603050405020304" pitchFamily="18" charset="0"/>
+                <a:cs typeface="Times New Roman" panose="02020603050405020304" pitchFamily="18" charset="0"/>
+              </a:rPr>
               <a:t>0</a:t>
             </a:r>
-            <a:endParaRPr lang="en-US" sz="2400" dirty="0"/>
           </a:p>
         </p:txBody>
       </p:sp>
@@ -3472,7 +3501,7 @@
         </p:nvSpPr>
         <p:spPr>
           <a:xfrm>
-            <a:off x="9474169" y="4185038"/>
+            <a:off x="9474170" y="6567688"/>
             <a:ext cx="3483429" cy="523220"/>
           </a:xfrm>
           <a:prstGeom prst="rect">
@@ -3487,7 +3516,10 @@
           <a:lstStyle/>
           <a:p>
             <a:r>
-              <a:rPr lang="en-US" sz="2800" dirty="0"/>
+              <a:rPr lang="en-US" sz="2800" i="1" dirty="0">
+                <a:latin typeface="Times New Roman" panose="02020603050405020304" pitchFamily="18" charset="0"/>
+                <a:cs typeface="Times New Roman" panose="02020603050405020304" pitchFamily="18" charset="0"/>
+              </a:rPr>
               <a:t>x</a:t>
             </a:r>
           </a:p>
@@ -3495,33 +3527,172 @@
       </p:sp>
       <p:pic>
         <p:nvPicPr>
-          <p:cNvPr id="18" name="Picture 17"/>
+          <p:cNvPr id="4" name="Picture 3"/>
           <p:cNvPicPr>
             <a:picLocks noChangeAspect="1"/>
           </p:cNvPicPr>
           <p:nvPr/>
         </p:nvPicPr>
         <p:blipFill rotWithShape="1">
-          <a:blip r:embed="rId4" cstate="print">
-            <a:extLst>
-              <a:ext uri="{28A0092B-C50C-407E-A947-70E740481C1C}">
-                <a14:useLocalDpi xmlns:a14="http://schemas.microsoft.com/office/drawing/2010/main" val="0"/>
-              </a:ext>
-            </a:extLst>
-          </a:blip>
-          <a:srcRect l="8438" t="38055" r="15625" b="26389"/>
+          <a:blip r:embed="rId4"/>
+          <a:srcRect t="7375" b="5610"/>
           <a:stretch/>
         </p:blipFill>
         <p:spPr>
           <a:xfrm>
-            <a:off x="1862407" y="6033800"/>
-            <a:ext cx="8179380" cy="2154240"/>
+            <a:off x="3185940" y="7721936"/>
+            <a:ext cx="5883476" cy="3119531"/>
           </a:xfrm>
           <a:prstGeom prst="rect">
             <a:avLst/>
           </a:prstGeom>
         </p:spPr>
       </p:pic>
+      <p:cxnSp>
+        <p:nvCxnSpPr>
+          <p:cNvPr id="21" name="Straight Connector 20"/>
+          <p:cNvCxnSpPr/>
+          <p:nvPr/>
+        </p:nvCxnSpPr>
+        <p:spPr>
+          <a:xfrm flipH="1" flipV="1">
+            <a:off x="4544074" y="5907128"/>
+            <a:ext cx="217" cy="922170"/>
+          </a:xfrm>
+          <a:prstGeom prst="line">
+            <a:avLst/>
+          </a:prstGeom>
+          <a:ln w="12700">
+            <a:solidFill>
+              <a:schemeClr val="tx1"/>
+            </a:solidFill>
+            <a:prstDash val="sysDash"/>
+          </a:ln>
+        </p:spPr>
+        <p:style>
+          <a:lnRef idx="1">
+            <a:schemeClr val="accent1"/>
+          </a:lnRef>
+          <a:fillRef idx="0">
+            <a:schemeClr val="accent1"/>
+          </a:fillRef>
+          <a:effectRef idx="0">
+            <a:schemeClr val="accent1"/>
+          </a:effectRef>
+          <a:fontRef idx="minor">
+            <a:schemeClr val="tx1"/>
+          </a:fontRef>
+        </p:style>
+      </p:cxnSp>
+      <p:cxnSp>
+        <p:nvCxnSpPr>
+          <p:cNvPr id="22" name="Straight Connector 21"/>
+          <p:cNvCxnSpPr/>
+          <p:nvPr/>
+        </p:nvCxnSpPr>
+        <p:spPr>
+          <a:xfrm flipV="1">
+            <a:off x="7232073" y="5920982"/>
+            <a:ext cx="6715" cy="889874"/>
+          </a:xfrm>
+          <a:prstGeom prst="line">
+            <a:avLst/>
+          </a:prstGeom>
+          <a:ln w="12700">
+            <a:solidFill>
+              <a:schemeClr val="tx1"/>
+            </a:solidFill>
+            <a:prstDash val="sysDash"/>
+          </a:ln>
+        </p:spPr>
+        <p:style>
+          <a:lnRef idx="1">
+            <a:schemeClr val="accent1"/>
+          </a:lnRef>
+          <a:fillRef idx="0">
+            <a:schemeClr val="accent1"/>
+          </a:fillRef>
+          <a:effectRef idx="0">
+            <a:schemeClr val="accent1"/>
+          </a:effectRef>
+          <a:fontRef idx="minor">
+            <a:schemeClr val="tx1"/>
+          </a:fontRef>
+        </p:style>
+      </p:cxnSp>
+      <p:cxnSp>
+        <p:nvCxnSpPr>
+          <p:cNvPr id="11" name="Straight Arrow Connector 10"/>
+          <p:cNvCxnSpPr/>
+          <p:nvPr/>
+        </p:nvCxnSpPr>
+        <p:spPr>
+          <a:xfrm>
+            <a:off x="4544074" y="6719455"/>
+            <a:ext cx="2687999" cy="0"/>
+          </a:xfrm>
+          <a:prstGeom prst="straightConnector1">
+            <a:avLst/>
+          </a:prstGeom>
+          <a:ln w="12700">
+            <a:solidFill>
+              <a:schemeClr val="tx1"/>
+            </a:solidFill>
+            <a:headEnd type="arrow"/>
+            <a:tailEnd type="arrow"/>
+          </a:ln>
+        </p:spPr>
+        <p:style>
+          <a:lnRef idx="1">
+            <a:schemeClr val="accent1"/>
+          </a:lnRef>
+          <a:fillRef idx="0">
+            <a:schemeClr val="accent1"/>
+          </a:fillRef>
+          <a:effectRef idx="0">
+            <a:schemeClr val="accent1"/>
+          </a:effectRef>
+          <a:fontRef idx="minor">
+            <a:schemeClr val="tx1"/>
+          </a:fontRef>
+        </p:style>
+      </p:cxnSp>
+      <p:sp>
+        <p:nvSpPr>
+          <p:cNvPr id="31" name="TextBox 30"/>
+          <p:cNvSpPr txBox="1"/>
+          <p:nvPr/>
+        </p:nvSpPr>
+        <p:spPr>
+          <a:xfrm>
+            <a:off x="5656476" y="6645465"/>
+            <a:ext cx="3483429" cy="400110"/>
+          </a:xfrm>
+          <a:prstGeom prst="rect">
+            <a:avLst/>
+          </a:prstGeom>
+          <a:noFill/>
+        </p:spPr>
+        <p:txBody>
+          <a:bodyPr wrap="square" rtlCol="0">
+            <a:spAutoFit/>
+          </a:bodyPr>
+          <a:lstStyle/>
+          <a:p>
+            <a:r>
+              <a:rPr lang="en-US" sz="2000" i="1" dirty="0" smtClean="0">
+                <a:latin typeface="Times New Roman" panose="02020603050405020304" pitchFamily="18" charset="0"/>
+                <a:cs typeface="Times New Roman" panose="02020603050405020304" pitchFamily="18" charset="0"/>
+              </a:rPr>
+              <a:t>l</a:t>
+            </a:r>
+            <a:endParaRPr lang="en-US" i="1" dirty="0">
+              <a:latin typeface="Times New Roman" panose="02020603050405020304" pitchFamily="18" charset="0"/>
+              <a:cs typeface="Times New Roman" panose="02020603050405020304" pitchFamily="18" charset="0"/>
+            </a:endParaRPr>
+          </a:p>
+        </p:txBody>
+      </p:sp>
     </p:spTree>
     <p:extLst>
       <p:ext uri="{BB962C8B-B14F-4D97-AF65-F5344CB8AC3E}">

</xml_diff>